<commit_message>
(Pres.) Title slide & table of contents added
</commit_message>
<xml_diff>
--- a/Presentation ASHRAE.pptx
+++ b/Presentation ASHRAE.pptx
@@ -2,10 +2,11 @@
 <file path=ppt/presentation.xml><?xml version="1.0" encoding="utf-8"?>
 <p:presentation xmlns:a="http://schemas.openxmlformats.org/drawingml/2006/main" xmlns:r="http://schemas.openxmlformats.org/officeDocument/2006/relationships" xmlns:p="http://schemas.openxmlformats.org/presentationml/2006/main" saveSubsetFonts="1">
   <p:sldMasterIdLst>
-    <p:sldMasterId id="2147483648" r:id="rId1"/>
+    <p:sldMasterId id="2147483660" r:id="rId1"/>
   </p:sldMasterIdLst>
   <p:sldIdLst>
     <p:sldId id="256" r:id="rId2"/>
+    <p:sldId id="257" r:id="rId3"/>
   </p:sldIdLst>
   <p:sldSz cx="9144000" cy="6858000" type="screen4x3"/>
   <p:notesSz cx="6858000" cy="9144000"/>
@@ -108,7 +109,7 @@
 </file>
 
 <file path=ppt/slideLayouts/slideLayout1.xml><?xml version="1.0" encoding="utf-8"?>
-<p:sldLayout xmlns:a="http://schemas.openxmlformats.org/drawingml/2006/main" xmlns:r="http://schemas.openxmlformats.org/officeDocument/2006/relationships" xmlns:p="http://schemas.openxmlformats.org/presentationml/2006/main" type="title" preserve="1">
+<p:sldLayout xmlns:a="http://schemas.openxmlformats.org/drawingml/2006/main" xmlns:r="http://schemas.openxmlformats.org/officeDocument/2006/relationships" xmlns:p="http://schemas.openxmlformats.org/presentationml/2006/main" showMasterSp="0" type="title" preserve="1">
   <p:cSld name="Title Slide">
     <p:spTree>
       <p:nvGrpSpPr>
@@ -126,7 +127,529 @@
       </p:grpSpPr>
       <p:sp>
         <p:nvSpPr>
-          <p:cNvPr id="2" name="Title 1"/>
+          <p:cNvPr id="23" name="Rectangle 22"/>
+          <p:cNvSpPr/>
+          <p:nvPr/>
+        </p:nvSpPr>
+        <p:spPr>
+          <a:xfrm flipV="1">
+            <a:off x="5410182" y="3810000"/>
+            <a:ext cx="3733819" cy="91087"/>
+          </a:xfrm>
+          <a:prstGeom prst="rect">
+            <a:avLst/>
+          </a:prstGeom>
+          <a:solidFill>
+            <a:schemeClr val="accent2">
+              <a:alpha val="100000"/>
+            </a:schemeClr>
+          </a:solidFill>
+          <a:ln w="50800" cap="rnd" cmpd="thickThin" algn="ctr">
+            <a:noFill/>
+            <a:prstDash val="solid"/>
+          </a:ln>
+          <a:effectLst/>
+        </p:spPr>
+        <p:style>
+          <a:lnRef idx="3">
+            <a:schemeClr val="lt1"/>
+          </a:lnRef>
+          <a:fillRef idx="1">
+            <a:schemeClr val="accent1"/>
+          </a:fillRef>
+          <a:effectRef idx="1">
+            <a:schemeClr val="accent1"/>
+          </a:effectRef>
+          <a:fontRef idx="minor">
+            <a:schemeClr val="lt1"/>
+          </a:fontRef>
+        </p:style>
+        <p:txBody>
+          <a:bodyPr anchor="ctr"/>
+          <a:lstStyle/>
+          <a:p>
+            <a:pPr algn="ctr" eaLnBrk="1" latinLnBrk="0" hangingPunct="1"/>
+            <a:endParaRPr kumimoji="0" lang="en-US"/>
+          </a:p>
+        </p:txBody>
+      </p:sp>
+      <p:sp>
+        <p:nvSpPr>
+          <p:cNvPr id="24" name="Rectangle 23"/>
+          <p:cNvSpPr/>
+          <p:nvPr/>
+        </p:nvSpPr>
+        <p:spPr>
+          <a:xfrm flipV="1">
+            <a:off x="5410200" y="3897010"/>
+            <a:ext cx="3733801" cy="192024"/>
+          </a:xfrm>
+          <a:prstGeom prst="rect">
+            <a:avLst/>
+          </a:prstGeom>
+          <a:solidFill>
+            <a:schemeClr val="accent2">
+              <a:alpha val="50000"/>
+            </a:schemeClr>
+          </a:solidFill>
+          <a:ln w="50800" cap="rnd" cmpd="thickThin" algn="ctr">
+            <a:noFill/>
+            <a:prstDash val="solid"/>
+          </a:ln>
+          <a:effectLst/>
+        </p:spPr>
+        <p:style>
+          <a:lnRef idx="3">
+            <a:schemeClr val="lt1"/>
+          </a:lnRef>
+          <a:fillRef idx="1">
+            <a:schemeClr val="accent1"/>
+          </a:fillRef>
+          <a:effectRef idx="1">
+            <a:schemeClr val="accent1"/>
+          </a:effectRef>
+          <a:fontRef idx="minor">
+            <a:schemeClr val="lt1"/>
+          </a:fontRef>
+        </p:style>
+        <p:txBody>
+          <a:bodyPr anchor="ctr"/>
+          <a:lstStyle/>
+          <a:p>
+            <a:pPr algn="ctr" eaLnBrk="1" latinLnBrk="0" hangingPunct="1"/>
+            <a:endParaRPr kumimoji="0" lang="en-US"/>
+          </a:p>
+        </p:txBody>
+      </p:sp>
+      <p:sp>
+        <p:nvSpPr>
+          <p:cNvPr id="25" name="Rectangle 24"/>
+          <p:cNvSpPr/>
+          <p:nvPr/>
+        </p:nvSpPr>
+        <p:spPr>
+          <a:xfrm flipV="1">
+            <a:off x="5410200" y="4115167"/>
+            <a:ext cx="3733801" cy="9144"/>
+          </a:xfrm>
+          <a:prstGeom prst="rect">
+            <a:avLst/>
+          </a:prstGeom>
+          <a:solidFill>
+            <a:schemeClr val="accent2">
+              <a:alpha val="65000"/>
+            </a:schemeClr>
+          </a:solidFill>
+          <a:ln w="50800" cap="rnd" cmpd="thickThin" algn="ctr">
+            <a:noFill/>
+            <a:prstDash val="solid"/>
+          </a:ln>
+          <a:effectLst/>
+        </p:spPr>
+        <p:style>
+          <a:lnRef idx="3">
+            <a:schemeClr val="lt1"/>
+          </a:lnRef>
+          <a:fillRef idx="1">
+            <a:schemeClr val="accent1"/>
+          </a:fillRef>
+          <a:effectRef idx="1">
+            <a:schemeClr val="accent1"/>
+          </a:effectRef>
+          <a:fontRef idx="minor">
+            <a:schemeClr val="lt1"/>
+          </a:fontRef>
+        </p:style>
+        <p:txBody>
+          <a:bodyPr anchor="ctr"/>
+          <a:lstStyle/>
+          <a:p>
+            <a:pPr algn="ctr" eaLnBrk="1" latinLnBrk="0" hangingPunct="1"/>
+            <a:endParaRPr kumimoji="0" lang="en-US"/>
+          </a:p>
+        </p:txBody>
+      </p:sp>
+      <p:sp>
+        <p:nvSpPr>
+          <p:cNvPr id="26" name="Rectangle 25"/>
+          <p:cNvSpPr/>
+          <p:nvPr/>
+        </p:nvSpPr>
+        <p:spPr>
+          <a:xfrm flipV="1">
+            <a:off x="5410200" y="4164403"/>
+            <a:ext cx="1965960" cy="18288"/>
+          </a:xfrm>
+          <a:prstGeom prst="rect">
+            <a:avLst/>
+          </a:prstGeom>
+          <a:solidFill>
+            <a:schemeClr val="accent2">
+              <a:alpha val="60000"/>
+            </a:schemeClr>
+          </a:solidFill>
+          <a:ln w="50800" cap="rnd" cmpd="thickThin" algn="ctr">
+            <a:noFill/>
+            <a:prstDash val="solid"/>
+          </a:ln>
+          <a:effectLst/>
+        </p:spPr>
+        <p:style>
+          <a:lnRef idx="3">
+            <a:schemeClr val="lt1"/>
+          </a:lnRef>
+          <a:fillRef idx="1">
+            <a:schemeClr val="accent1"/>
+          </a:fillRef>
+          <a:effectRef idx="1">
+            <a:schemeClr val="accent1"/>
+          </a:effectRef>
+          <a:fontRef idx="minor">
+            <a:schemeClr val="lt1"/>
+          </a:fontRef>
+        </p:style>
+        <p:txBody>
+          <a:bodyPr anchor="ctr"/>
+          <a:lstStyle/>
+          <a:p>
+            <a:pPr algn="ctr" eaLnBrk="1" latinLnBrk="0" hangingPunct="1"/>
+            <a:endParaRPr kumimoji="0" lang="en-US"/>
+          </a:p>
+        </p:txBody>
+      </p:sp>
+      <p:sp>
+        <p:nvSpPr>
+          <p:cNvPr id="27" name="Rectangle 26"/>
+          <p:cNvSpPr/>
+          <p:nvPr/>
+        </p:nvSpPr>
+        <p:spPr>
+          <a:xfrm flipV="1">
+            <a:off x="5410200" y="4199572"/>
+            <a:ext cx="1965960" cy="9144"/>
+          </a:xfrm>
+          <a:prstGeom prst="rect">
+            <a:avLst/>
+          </a:prstGeom>
+          <a:solidFill>
+            <a:schemeClr val="accent2">
+              <a:alpha val="65000"/>
+            </a:schemeClr>
+          </a:solidFill>
+          <a:ln w="50800" cap="rnd" cmpd="thickThin" algn="ctr">
+            <a:noFill/>
+            <a:prstDash val="solid"/>
+          </a:ln>
+          <a:effectLst/>
+        </p:spPr>
+        <p:style>
+          <a:lnRef idx="3">
+            <a:schemeClr val="lt1"/>
+          </a:lnRef>
+          <a:fillRef idx="1">
+            <a:schemeClr val="accent1"/>
+          </a:fillRef>
+          <a:effectRef idx="1">
+            <a:schemeClr val="accent1"/>
+          </a:effectRef>
+          <a:fontRef idx="minor">
+            <a:schemeClr val="lt1"/>
+          </a:fontRef>
+        </p:style>
+        <p:txBody>
+          <a:bodyPr anchor="ctr"/>
+          <a:lstStyle/>
+          <a:p>
+            <a:pPr algn="ctr" eaLnBrk="1" latinLnBrk="0" hangingPunct="1"/>
+            <a:endParaRPr kumimoji="0" lang="en-US"/>
+          </a:p>
+        </p:txBody>
+      </p:sp>
+      <p:sp useBgFill="1">
+        <p:nvSpPr>
+          <p:cNvPr id="30" name="Rounded Rectangle 29"/>
+          <p:cNvSpPr/>
+          <p:nvPr/>
+        </p:nvSpPr>
+        <p:spPr bwMode="white">
+          <a:xfrm>
+            <a:off x="5410200" y="3962400"/>
+            <a:ext cx="3063240" cy="27432"/>
+          </a:xfrm>
+          <a:prstGeom prst="roundRect">
+            <a:avLst>
+              <a:gd name="adj" fmla="val 16667"/>
+            </a:avLst>
+          </a:prstGeom>
+          <a:ln w="50800" cap="rnd" cmpd="thickThin" algn="ctr">
+            <a:noFill/>
+            <a:prstDash val="solid"/>
+          </a:ln>
+          <a:effectLst/>
+        </p:spPr>
+        <p:style>
+          <a:lnRef idx="3">
+            <a:schemeClr val="lt1"/>
+          </a:lnRef>
+          <a:fillRef idx="1">
+            <a:schemeClr val="accent1"/>
+          </a:fillRef>
+          <a:effectRef idx="1">
+            <a:schemeClr val="accent1"/>
+          </a:effectRef>
+          <a:fontRef idx="minor">
+            <a:schemeClr val="lt1"/>
+          </a:fontRef>
+        </p:style>
+        <p:txBody>
+          <a:bodyPr anchor="ctr"/>
+          <a:lstStyle/>
+          <a:p>
+            <a:pPr algn="ctr" eaLnBrk="1" latinLnBrk="0" hangingPunct="1"/>
+            <a:endParaRPr kumimoji="0" lang="en-US"/>
+          </a:p>
+        </p:txBody>
+      </p:sp>
+      <p:sp useBgFill="1">
+        <p:nvSpPr>
+          <p:cNvPr id="31" name="Rounded Rectangle 30"/>
+          <p:cNvSpPr/>
+          <p:nvPr/>
+        </p:nvSpPr>
+        <p:spPr bwMode="white">
+          <a:xfrm>
+            <a:off x="7376507" y="4060983"/>
+            <a:ext cx="1600200" cy="36576"/>
+          </a:xfrm>
+          <a:prstGeom prst="roundRect">
+            <a:avLst>
+              <a:gd name="adj" fmla="val 16667"/>
+            </a:avLst>
+          </a:prstGeom>
+          <a:ln w="50800" cap="rnd" cmpd="thickThin" algn="ctr">
+            <a:noFill/>
+            <a:prstDash val="solid"/>
+          </a:ln>
+          <a:effectLst/>
+        </p:spPr>
+        <p:style>
+          <a:lnRef idx="3">
+            <a:schemeClr val="lt1"/>
+          </a:lnRef>
+          <a:fillRef idx="1">
+            <a:schemeClr val="accent1"/>
+          </a:fillRef>
+          <a:effectRef idx="1">
+            <a:schemeClr val="accent1"/>
+          </a:effectRef>
+          <a:fontRef idx="minor">
+            <a:schemeClr val="lt1"/>
+          </a:fontRef>
+        </p:style>
+        <p:txBody>
+          <a:bodyPr anchor="ctr"/>
+          <a:lstStyle/>
+          <a:p>
+            <a:pPr algn="ctr" eaLnBrk="1" latinLnBrk="0" hangingPunct="1"/>
+            <a:endParaRPr kumimoji="0" lang="en-US"/>
+          </a:p>
+        </p:txBody>
+      </p:sp>
+      <p:sp>
+        <p:nvSpPr>
+          <p:cNvPr id="7" name="Rectangle 6"/>
+          <p:cNvSpPr/>
+          <p:nvPr/>
+        </p:nvSpPr>
+        <p:spPr>
+          <a:xfrm>
+            <a:off x="1" y="3649662"/>
+            <a:ext cx="9144000" cy="244170"/>
+          </a:xfrm>
+          <a:prstGeom prst="rect">
+            <a:avLst/>
+          </a:prstGeom>
+          <a:solidFill>
+            <a:schemeClr val="accent2">
+              <a:alpha val="50000"/>
+            </a:schemeClr>
+          </a:solidFill>
+          <a:ln w="50800" cap="rnd" cmpd="thickThin" algn="ctr">
+            <a:noFill/>
+            <a:prstDash val="solid"/>
+          </a:ln>
+          <a:effectLst/>
+        </p:spPr>
+        <p:style>
+          <a:lnRef idx="3">
+            <a:schemeClr val="lt1"/>
+          </a:lnRef>
+          <a:fillRef idx="1">
+            <a:schemeClr val="accent1"/>
+          </a:fillRef>
+          <a:effectRef idx="1">
+            <a:schemeClr val="accent1"/>
+          </a:effectRef>
+          <a:fontRef idx="minor">
+            <a:schemeClr val="lt1"/>
+          </a:fontRef>
+        </p:style>
+        <p:txBody>
+          <a:bodyPr anchor="ctr"/>
+          <a:lstStyle/>
+          <a:p>
+            <a:pPr algn="ctr" eaLnBrk="1" latinLnBrk="0" hangingPunct="1"/>
+            <a:endParaRPr kumimoji="0" lang="en-US"/>
+          </a:p>
+        </p:txBody>
+      </p:sp>
+      <p:sp>
+        <p:nvSpPr>
+          <p:cNvPr id="10" name="Rectangle 9"/>
+          <p:cNvSpPr/>
+          <p:nvPr/>
+        </p:nvSpPr>
+        <p:spPr>
+          <a:xfrm>
+            <a:off x="0" y="3675527"/>
+            <a:ext cx="9144001" cy="140677"/>
+          </a:xfrm>
+          <a:prstGeom prst="rect">
+            <a:avLst/>
+          </a:prstGeom>
+          <a:solidFill>
+            <a:schemeClr val="accent2">
+              <a:alpha val="100000"/>
+            </a:schemeClr>
+          </a:solidFill>
+          <a:ln w="50800" cap="rnd" cmpd="thickThin" algn="ctr">
+            <a:noFill/>
+            <a:prstDash val="solid"/>
+          </a:ln>
+          <a:effectLst/>
+        </p:spPr>
+        <p:style>
+          <a:lnRef idx="3">
+            <a:schemeClr val="lt1"/>
+          </a:lnRef>
+          <a:fillRef idx="1">
+            <a:schemeClr val="accent1"/>
+          </a:fillRef>
+          <a:effectRef idx="1">
+            <a:schemeClr val="accent1"/>
+          </a:effectRef>
+          <a:fontRef idx="minor">
+            <a:schemeClr val="lt1"/>
+          </a:fontRef>
+        </p:style>
+        <p:txBody>
+          <a:bodyPr anchor="ctr"/>
+          <a:lstStyle/>
+          <a:p>
+            <a:pPr algn="ctr" eaLnBrk="1" latinLnBrk="0" hangingPunct="1"/>
+            <a:endParaRPr kumimoji="0" lang="en-US"/>
+          </a:p>
+        </p:txBody>
+      </p:sp>
+      <p:sp>
+        <p:nvSpPr>
+          <p:cNvPr id="11" name="Rectangle 10"/>
+          <p:cNvSpPr/>
+          <p:nvPr/>
+        </p:nvSpPr>
+        <p:spPr>
+          <a:xfrm flipV="1">
+            <a:off x="6414051" y="3643090"/>
+            <a:ext cx="2729950" cy="248432"/>
+          </a:xfrm>
+          <a:prstGeom prst="rect">
+            <a:avLst/>
+          </a:prstGeom>
+          <a:solidFill>
+            <a:schemeClr val="accent2">
+              <a:alpha val="100000"/>
+            </a:schemeClr>
+          </a:solidFill>
+          <a:ln w="50800" cap="rnd" cmpd="thickThin" algn="ctr">
+            <a:noFill/>
+            <a:prstDash val="solid"/>
+          </a:ln>
+          <a:effectLst/>
+        </p:spPr>
+        <p:style>
+          <a:lnRef idx="3">
+            <a:schemeClr val="lt1"/>
+          </a:lnRef>
+          <a:fillRef idx="1">
+            <a:schemeClr val="accent1"/>
+          </a:fillRef>
+          <a:effectRef idx="1">
+            <a:schemeClr val="accent1"/>
+          </a:effectRef>
+          <a:fontRef idx="minor">
+            <a:schemeClr val="lt1"/>
+          </a:fontRef>
+        </p:style>
+        <p:txBody>
+          <a:bodyPr anchor="ctr"/>
+          <a:lstStyle/>
+          <a:p>
+            <a:pPr algn="ctr" eaLnBrk="1" latinLnBrk="0" hangingPunct="1"/>
+            <a:endParaRPr kumimoji="0" lang="en-US"/>
+          </a:p>
+        </p:txBody>
+      </p:sp>
+      <p:sp>
+        <p:nvSpPr>
+          <p:cNvPr id="19" name="Rectangle 18"/>
+          <p:cNvSpPr/>
+          <p:nvPr/>
+        </p:nvSpPr>
+        <p:spPr>
+          <a:xfrm>
+            <a:off x="0" y="0"/>
+            <a:ext cx="9144000" cy="3701700"/>
+          </a:xfrm>
+          <a:prstGeom prst="rect">
+            <a:avLst/>
+          </a:prstGeom>
+          <a:solidFill>
+            <a:schemeClr val="tx2">
+              <a:alpha val="100000"/>
+            </a:schemeClr>
+          </a:solidFill>
+          <a:ln w="50800" cap="rnd" cmpd="thickThin" algn="ctr">
+            <a:noFill/>
+            <a:prstDash val="solid"/>
+          </a:ln>
+          <a:effectLst/>
+        </p:spPr>
+        <p:style>
+          <a:lnRef idx="3">
+            <a:schemeClr val="lt1"/>
+          </a:lnRef>
+          <a:fillRef idx="1">
+            <a:schemeClr val="accent1"/>
+          </a:fillRef>
+          <a:effectRef idx="1">
+            <a:schemeClr val="accent1"/>
+          </a:effectRef>
+          <a:fontRef idx="minor">
+            <a:schemeClr val="lt1"/>
+          </a:fontRef>
+        </p:style>
+        <p:txBody>
+          <a:bodyPr anchor="ctr"/>
+          <a:lstStyle/>
+          <a:p>
+            <a:pPr algn="ctr" eaLnBrk="1" latinLnBrk="0" hangingPunct="1"/>
+            <a:endParaRPr kumimoji="0" lang="en-US"/>
+          </a:p>
+        </p:txBody>
+      </p:sp>
+      <p:sp>
+        <p:nvSpPr>
+          <p:cNvPr id="8" name="Title 7"/>
           <p:cNvSpPr>
             <a:spLocks noGrp="1"/>
           </p:cNvSpPr>
@@ -136,25 +659,33 @@
         </p:nvSpPr>
         <p:spPr>
           <a:xfrm>
-            <a:off x="685800" y="2130425"/>
-            <a:ext cx="7772400" cy="1470025"/>
-          </a:xfrm>
-        </p:spPr>
-        <p:txBody>
-          <a:bodyPr/>
-          <a:lstStyle/>
-          <a:p>
-            <a:r>
-              <a:rPr lang="en-US" smtClean="0"/>
+            <a:off x="457200" y="2401887"/>
+            <a:ext cx="8458200" cy="1470025"/>
+          </a:xfrm>
+        </p:spPr>
+        <p:txBody>
+          <a:bodyPr anchor="b"/>
+          <a:lstStyle>
+            <a:lvl1pPr>
+              <a:defRPr sz="4400">
+                <a:solidFill>
+                  <a:schemeClr val="bg1"/>
+                </a:solidFill>
+              </a:defRPr>
+            </a:lvl1pPr>
+          </a:lstStyle>
+          <a:p>
+            <a:r>
+              <a:rPr kumimoji="0" lang="en-US" smtClean="0"/>
               <a:t>Click to edit Master title style</a:t>
             </a:r>
-            <a:endParaRPr lang="uk-UA"/>
-          </a:p>
-        </p:txBody>
-      </p:sp>
-      <p:sp>
-        <p:nvSpPr>
-          <p:cNvPr id="3" name="Subtitle 2"/>
+            <a:endParaRPr kumimoji="0" lang="en-US"/>
+          </a:p>
+        </p:txBody>
+      </p:sp>
+      <p:sp>
+        <p:nvSpPr>
+          <p:cNvPr id="9" name="Subtitle 8"/>
           <p:cNvSpPr>
             <a:spLocks noGrp="1"/>
           </p:cNvSpPr>
@@ -164,169 +695,134 @@
         </p:nvSpPr>
         <p:spPr>
           <a:xfrm>
-            <a:off x="1371600" y="3886200"/>
-            <a:ext cx="6400800" cy="1752600"/>
+            <a:off x="457200" y="3899938"/>
+            <a:ext cx="4953000" cy="1752600"/>
           </a:xfrm>
         </p:spPr>
         <p:txBody>
           <a:bodyPr/>
           <a:lstStyle>
-            <a:lvl1pPr marL="0" indent="0" algn="ctr">
+            <a:lvl1pPr marL="64008" indent="0" algn="l">
               <a:buNone/>
-              <a:defRPr>
+              <a:defRPr sz="2400">
                 <a:solidFill>
-                  <a:schemeClr val="tx1">
-                    <a:tint val="75000"/>
-                  </a:schemeClr>
+                  <a:schemeClr val="tx2"/>
                 </a:solidFill>
               </a:defRPr>
             </a:lvl1pPr>
             <a:lvl2pPr marL="457200" indent="0" algn="ctr">
               <a:buNone/>
-              <a:defRPr>
-                <a:solidFill>
-                  <a:schemeClr val="tx1">
-                    <a:tint val="75000"/>
-                  </a:schemeClr>
-                </a:solidFill>
-              </a:defRPr>
             </a:lvl2pPr>
             <a:lvl3pPr marL="914400" indent="0" algn="ctr">
               <a:buNone/>
-              <a:defRPr>
-                <a:solidFill>
-                  <a:schemeClr val="tx1">
-                    <a:tint val="75000"/>
-                  </a:schemeClr>
-                </a:solidFill>
-              </a:defRPr>
             </a:lvl3pPr>
             <a:lvl4pPr marL="1371600" indent="0" algn="ctr">
               <a:buNone/>
-              <a:defRPr>
-                <a:solidFill>
-                  <a:schemeClr val="tx1">
-                    <a:tint val="75000"/>
-                  </a:schemeClr>
-                </a:solidFill>
-              </a:defRPr>
             </a:lvl4pPr>
             <a:lvl5pPr marL="1828800" indent="0" algn="ctr">
               <a:buNone/>
-              <a:defRPr>
-                <a:solidFill>
-                  <a:schemeClr val="tx1">
-                    <a:tint val="75000"/>
-                  </a:schemeClr>
-                </a:solidFill>
-              </a:defRPr>
             </a:lvl5pPr>
             <a:lvl6pPr marL="2286000" indent="0" algn="ctr">
               <a:buNone/>
-              <a:defRPr>
-                <a:solidFill>
-                  <a:schemeClr val="tx1">
-                    <a:tint val="75000"/>
-                  </a:schemeClr>
-                </a:solidFill>
-              </a:defRPr>
             </a:lvl6pPr>
             <a:lvl7pPr marL="2743200" indent="0" algn="ctr">
               <a:buNone/>
-              <a:defRPr>
-                <a:solidFill>
-                  <a:schemeClr val="tx1">
-                    <a:tint val="75000"/>
-                  </a:schemeClr>
-                </a:solidFill>
-              </a:defRPr>
             </a:lvl7pPr>
             <a:lvl8pPr marL="3200400" indent="0" algn="ctr">
               <a:buNone/>
-              <a:defRPr>
-                <a:solidFill>
-                  <a:schemeClr val="tx1">
-                    <a:tint val="75000"/>
-                  </a:schemeClr>
-                </a:solidFill>
-              </a:defRPr>
             </a:lvl8pPr>
             <a:lvl9pPr marL="3657600" indent="0" algn="ctr">
               <a:buNone/>
-              <a:defRPr>
+            </a:lvl9pPr>
+          </a:lstStyle>
+          <a:p>
+            <a:r>
+              <a:rPr kumimoji="0" lang="en-US" smtClean="0"/>
+              <a:t>Click to edit Master subtitle style</a:t>
+            </a:r>
+            <a:endParaRPr kumimoji="0" lang="en-US"/>
+          </a:p>
+        </p:txBody>
+      </p:sp>
+      <p:sp>
+        <p:nvSpPr>
+          <p:cNvPr id="28" name="Date Placeholder 27"/>
+          <p:cNvSpPr>
+            <a:spLocks noGrp="1"/>
+          </p:cNvSpPr>
+          <p:nvPr>
+            <p:ph type="dt" sz="half" idx="10"/>
+          </p:nvPr>
+        </p:nvSpPr>
+        <p:spPr>
+          <a:xfrm>
+            <a:off x="6705600" y="4206240"/>
+            <a:ext cx="960120" cy="457200"/>
+          </a:xfrm>
+        </p:spPr>
+        <p:txBody>
+          <a:bodyPr/>
+          <a:lstStyle/>
+          <a:p>
+            <a:fld id="{7F104D85-F20C-42E7-AB62-E5B99C7A82F1}" type="datetimeFigureOut">
+              <a:rPr lang="uk-UA" smtClean="0"/>
+              <a:t>26.01.2024</a:t>
+            </a:fld>
+            <a:endParaRPr lang="uk-UA"/>
+          </a:p>
+        </p:txBody>
+      </p:sp>
+      <p:sp>
+        <p:nvSpPr>
+          <p:cNvPr id="17" name="Footer Placeholder 16"/>
+          <p:cNvSpPr>
+            <a:spLocks noGrp="1"/>
+          </p:cNvSpPr>
+          <p:nvPr>
+            <p:ph type="ftr" sz="quarter" idx="11"/>
+          </p:nvPr>
+        </p:nvSpPr>
+        <p:spPr>
+          <a:xfrm>
+            <a:off x="5410200" y="4205288"/>
+            <a:ext cx="1295400" cy="457200"/>
+          </a:xfrm>
+        </p:spPr>
+        <p:txBody>
+          <a:bodyPr/>
+          <a:lstStyle/>
+          <a:p>
+            <a:endParaRPr lang="uk-UA"/>
+          </a:p>
+        </p:txBody>
+      </p:sp>
+      <p:sp>
+        <p:nvSpPr>
+          <p:cNvPr id="29" name="Slide Number Placeholder 28"/>
+          <p:cNvSpPr>
+            <a:spLocks noGrp="1"/>
+          </p:cNvSpPr>
+          <p:nvPr>
+            <p:ph type="sldNum" sz="quarter" idx="12"/>
+          </p:nvPr>
+        </p:nvSpPr>
+        <p:spPr>
+          <a:xfrm>
+            <a:off x="8320088" y="1136"/>
+            <a:ext cx="747712" cy="365760"/>
+          </a:xfrm>
+        </p:spPr>
+        <p:txBody>
+          <a:bodyPr/>
+          <a:lstStyle>
+            <a:lvl1pPr algn="r">
+              <a:defRPr sz="1800">
                 <a:solidFill>
-                  <a:schemeClr val="tx1">
-                    <a:tint val="75000"/>
-                  </a:schemeClr>
+                  <a:schemeClr val="bg1"/>
                 </a:solidFill>
               </a:defRPr>
-            </a:lvl9pPr>
+            </a:lvl1pPr>
           </a:lstStyle>
-          <a:p>
-            <a:r>
-              <a:rPr lang="en-US" smtClean="0"/>
-              <a:t>Click to edit Master subtitle style</a:t>
-            </a:r>
-            <a:endParaRPr lang="uk-UA"/>
-          </a:p>
-        </p:txBody>
-      </p:sp>
-      <p:sp>
-        <p:nvSpPr>
-          <p:cNvPr id="4" name="Date Placeholder 3"/>
-          <p:cNvSpPr>
-            <a:spLocks noGrp="1"/>
-          </p:cNvSpPr>
-          <p:nvPr>
-            <p:ph type="dt" sz="half" idx="10"/>
-          </p:nvPr>
-        </p:nvSpPr>
-        <p:spPr/>
-        <p:txBody>
-          <a:bodyPr/>
-          <a:lstStyle/>
-          <a:p>
-            <a:fld id="{7F104D85-F20C-42E7-AB62-E5B99C7A82F1}" type="datetimeFigureOut">
-              <a:rPr lang="uk-UA" smtClean="0"/>
-              <a:t>25.01.2024</a:t>
-            </a:fld>
-            <a:endParaRPr lang="uk-UA"/>
-          </a:p>
-        </p:txBody>
-      </p:sp>
-      <p:sp>
-        <p:nvSpPr>
-          <p:cNvPr id="5" name="Footer Placeholder 4"/>
-          <p:cNvSpPr>
-            <a:spLocks noGrp="1"/>
-          </p:cNvSpPr>
-          <p:nvPr>
-            <p:ph type="ftr" sz="quarter" idx="11"/>
-          </p:nvPr>
-        </p:nvSpPr>
-        <p:spPr/>
-        <p:txBody>
-          <a:bodyPr/>
-          <a:lstStyle/>
-          <a:p>
-            <a:endParaRPr lang="uk-UA"/>
-          </a:p>
-        </p:txBody>
-      </p:sp>
-      <p:sp>
-        <p:nvSpPr>
-          <p:cNvPr id="6" name="Slide Number Placeholder 5"/>
-          <p:cNvSpPr>
-            <a:spLocks noGrp="1"/>
-          </p:cNvSpPr>
-          <p:nvPr>
-            <p:ph type="sldNum" sz="quarter" idx="12"/>
-          </p:nvPr>
-        </p:nvSpPr>
-        <p:spPr/>
-        <p:txBody>
-          <a:bodyPr/>
-          <a:lstStyle/>
           <a:p>
             <a:fld id="{7A3FA973-5953-4A62-8B90-016A3CA2C5F6}" type="slidenum">
               <a:rPr lang="uk-UA" smtClean="0"/>
@@ -337,11 +833,6 @@
         </p:txBody>
       </p:sp>
     </p:spTree>
-    <p:extLst>
-      <p:ext uri="{BB962C8B-B14F-4D97-AF65-F5344CB8AC3E}">
-        <p14:creationId xmlns:p14="http://schemas.microsoft.com/office/powerpoint/2010/main" val="3698138529"/>
-      </p:ext>
-    </p:extLst>
   </p:cSld>
   <p:clrMapOvr>
     <a:masterClrMapping/>
@@ -382,10 +873,10 @@
           <a:lstStyle/>
           <a:p>
             <a:r>
-              <a:rPr lang="en-US" smtClean="0"/>
+              <a:rPr kumimoji="0" lang="en-US" smtClean="0"/>
               <a:t>Click to edit Master title style</a:t>
             </a:r>
-            <a:endParaRPr lang="uk-UA"/>
+            <a:endParaRPr kumimoji="0" lang="en-US"/>
           </a:p>
         </p:txBody>
       </p:sp>
@@ -404,40 +895,40 @@
           <a:bodyPr vert="eaVert"/>
           <a:lstStyle/>
           <a:p>
-            <a:pPr lvl="0"/>
+            <a:pPr lvl="0" eaLnBrk="1" latinLnBrk="0" hangingPunct="1"/>
             <a:r>
               <a:rPr lang="en-US" smtClean="0"/>
               <a:t>Click to edit Master text styles</a:t>
             </a:r>
           </a:p>
           <a:p>
-            <a:pPr lvl="1"/>
+            <a:pPr lvl="1" eaLnBrk="1" latinLnBrk="0" hangingPunct="1"/>
             <a:r>
               <a:rPr lang="en-US" smtClean="0"/>
               <a:t>Second level</a:t>
             </a:r>
           </a:p>
           <a:p>
-            <a:pPr lvl="2"/>
+            <a:pPr lvl="2" eaLnBrk="1" latinLnBrk="0" hangingPunct="1"/>
             <a:r>
               <a:rPr lang="en-US" smtClean="0"/>
               <a:t>Third level</a:t>
             </a:r>
           </a:p>
           <a:p>
-            <a:pPr lvl="3"/>
+            <a:pPr lvl="3" eaLnBrk="1" latinLnBrk="0" hangingPunct="1"/>
             <a:r>
               <a:rPr lang="en-US" smtClean="0"/>
               <a:t>Fourth level</a:t>
             </a:r>
           </a:p>
           <a:p>
-            <a:pPr lvl="4"/>
+            <a:pPr lvl="4" eaLnBrk="1" latinLnBrk="0" hangingPunct="1"/>
             <a:r>
               <a:rPr lang="en-US" smtClean="0"/>
               <a:t>Fifth level</a:t>
             </a:r>
-            <a:endParaRPr lang="uk-UA"/>
+            <a:endParaRPr kumimoji="0" lang="en-US"/>
           </a:p>
         </p:txBody>
       </p:sp>
@@ -458,7 +949,7 @@
           <a:p>
             <a:fld id="{7F104D85-F20C-42E7-AB62-E5B99C7A82F1}" type="datetimeFigureOut">
               <a:rPr lang="uk-UA" smtClean="0"/>
-              <a:t>25.01.2024</a:t>
+              <a:t>26.01.2024</a:t>
             </a:fld>
             <a:endParaRPr lang="uk-UA"/>
           </a:p>
@@ -507,11 +998,6 @@
         </p:txBody>
       </p:sp>
     </p:spTree>
-    <p:extLst>
-      <p:ext uri="{BB962C8B-B14F-4D97-AF65-F5344CB8AC3E}">
-        <p14:creationId xmlns:p14="http://schemas.microsoft.com/office/powerpoint/2010/main" val="788472435"/>
-      </p:ext>
-    </p:extLst>
   </p:cSld>
   <p:clrMapOvr>
     <a:masterClrMapping/>
@@ -548,8 +1034,8 @@
         </p:nvSpPr>
         <p:spPr>
           <a:xfrm>
-            <a:off x="6629400" y="274638"/>
-            <a:ext cx="2057400" cy="5851525"/>
+            <a:off x="6781800" y="1143000"/>
+            <a:ext cx="1905000" cy="5486400"/>
           </a:xfrm>
         </p:spPr>
         <p:txBody>
@@ -557,10 +1043,10 @@
           <a:lstStyle/>
           <a:p>
             <a:r>
-              <a:rPr lang="en-US" smtClean="0"/>
+              <a:rPr kumimoji="0" lang="en-US" smtClean="0"/>
               <a:t>Click to edit Master title style</a:t>
             </a:r>
-            <a:endParaRPr lang="uk-UA"/>
+            <a:endParaRPr kumimoji="0" lang="en-US"/>
           </a:p>
         </p:txBody>
       </p:sp>
@@ -576,48 +1062,48 @@
         </p:nvSpPr>
         <p:spPr>
           <a:xfrm>
-            <a:off x="457200" y="274638"/>
-            <a:ext cx="6019800" cy="5851525"/>
+            <a:off x="457200" y="1143000"/>
+            <a:ext cx="6248400" cy="5486400"/>
           </a:xfrm>
         </p:spPr>
         <p:txBody>
           <a:bodyPr vert="eaVert"/>
           <a:lstStyle/>
           <a:p>
-            <a:pPr lvl="0"/>
+            <a:pPr lvl="0" eaLnBrk="1" latinLnBrk="0" hangingPunct="1"/>
             <a:r>
               <a:rPr lang="en-US" smtClean="0"/>
               <a:t>Click to edit Master text styles</a:t>
             </a:r>
           </a:p>
           <a:p>
-            <a:pPr lvl="1"/>
+            <a:pPr lvl="1" eaLnBrk="1" latinLnBrk="0" hangingPunct="1"/>
             <a:r>
               <a:rPr lang="en-US" smtClean="0"/>
               <a:t>Second level</a:t>
             </a:r>
           </a:p>
           <a:p>
-            <a:pPr lvl="2"/>
+            <a:pPr lvl="2" eaLnBrk="1" latinLnBrk="0" hangingPunct="1"/>
             <a:r>
               <a:rPr lang="en-US" smtClean="0"/>
               <a:t>Third level</a:t>
             </a:r>
           </a:p>
           <a:p>
-            <a:pPr lvl="3"/>
+            <a:pPr lvl="3" eaLnBrk="1" latinLnBrk="0" hangingPunct="1"/>
             <a:r>
               <a:rPr lang="en-US" smtClean="0"/>
               <a:t>Fourth level</a:t>
             </a:r>
           </a:p>
           <a:p>
-            <a:pPr lvl="4"/>
+            <a:pPr lvl="4" eaLnBrk="1" latinLnBrk="0" hangingPunct="1"/>
             <a:r>
               <a:rPr lang="en-US" smtClean="0"/>
               <a:t>Fifth level</a:t>
             </a:r>
-            <a:endParaRPr lang="uk-UA"/>
+            <a:endParaRPr kumimoji="0" lang="en-US"/>
           </a:p>
         </p:txBody>
       </p:sp>
@@ -638,7 +1124,7 @@
           <a:p>
             <a:fld id="{7F104D85-F20C-42E7-AB62-E5B99C7A82F1}" type="datetimeFigureOut">
               <a:rPr lang="uk-UA" smtClean="0"/>
-              <a:t>25.01.2024</a:t>
+              <a:t>26.01.2024</a:t>
             </a:fld>
             <a:endParaRPr lang="uk-UA"/>
           </a:p>
@@ -687,11 +1173,6 @@
         </p:txBody>
       </p:sp>
     </p:spTree>
-    <p:extLst>
-      <p:ext uri="{BB962C8B-B14F-4D97-AF65-F5344CB8AC3E}">
-        <p14:creationId xmlns:p14="http://schemas.microsoft.com/office/powerpoint/2010/main" val="3319511471"/>
-      </p:ext>
-    </p:extLst>
   </p:cSld>
   <p:clrMapOvr>
     <a:masterClrMapping/>
@@ -732,10 +1213,10 @@
           <a:lstStyle/>
           <a:p>
             <a:r>
-              <a:rPr lang="en-US" smtClean="0"/>
+              <a:rPr kumimoji="0" lang="en-US" smtClean="0"/>
               <a:t>Click to edit Master title style</a:t>
             </a:r>
-            <a:endParaRPr lang="uk-UA"/>
+            <a:endParaRPr kumimoji="0" lang="en-US"/>
           </a:p>
         </p:txBody>
       </p:sp>
@@ -754,40 +1235,40 @@
           <a:bodyPr/>
           <a:lstStyle/>
           <a:p>
-            <a:pPr lvl="0"/>
+            <a:pPr lvl="0" eaLnBrk="1" latinLnBrk="0" hangingPunct="1"/>
             <a:r>
               <a:rPr lang="en-US" smtClean="0"/>
               <a:t>Click to edit Master text styles</a:t>
             </a:r>
           </a:p>
           <a:p>
-            <a:pPr lvl="1"/>
+            <a:pPr lvl="1" eaLnBrk="1" latinLnBrk="0" hangingPunct="1"/>
             <a:r>
               <a:rPr lang="en-US" smtClean="0"/>
               <a:t>Second level</a:t>
             </a:r>
           </a:p>
           <a:p>
-            <a:pPr lvl="2"/>
+            <a:pPr lvl="2" eaLnBrk="1" latinLnBrk="0" hangingPunct="1"/>
             <a:r>
               <a:rPr lang="en-US" smtClean="0"/>
               <a:t>Third level</a:t>
             </a:r>
           </a:p>
           <a:p>
-            <a:pPr lvl="3"/>
+            <a:pPr lvl="3" eaLnBrk="1" latinLnBrk="0" hangingPunct="1"/>
             <a:r>
               <a:rPr lang="en-US" smtClean="0"/>
               <a:t>Fourth level</a:t>
             </a:r>
           </a:p>
           <a:p>
-            <a:pPr lvl="4"/>
+            <a:pPr lvl="4" eaLnBrk="1" latinLnBrk="0" hangingPunct="1"/>
             <a:r>
               <a:rPr lang="en-US" smtClean="0"/>
               <a:t>Fifth level</a:t>
             </a:r>
-            <a:endParaRPr lang="uk-UA"/>
+            <a:endParaRPr kumimoji="0" lang="en-US"/>
           </a:p>
         </p:txBody>
       </p:sp>
@@ -808,7 +1289,7 @@
           <a:p>
             <a:fld id="{7F104D85-F20C-42E7-AB62-E5B99C7A82F1}" type="datetimeFigureOut">
               <a:rPr lang="uk-UA" smtClean="0"/>
-              <a:t>25.01.2024</a:t>
+              <a:t>26.01.2024</a:t>
             </a:fld>
             <a:endParaRPr lang="uk-UA"/>
           </a:p>
@@ -857,11 +1338,6 @@
         </p:txBody>
       </p:sp>
     </p:spTree>
-    <p:extLst>
-      <p:ext uri="{BB962C8B-B14F-4D97-AF65-F5344CB8AC3E}">
-        <p14:creationId xmlns:p14="http://schemas.microsoft.com/office/powerpoint/2010/main" val="1307858918"/>
-      </p:ext>
-    </p:extLst>
   </p:cSld>
   <p:clrMapOvr>
     <a:masterClrMapping/>
@@ -898,56 +1374,76 @@
         </p:nvSpPr>
         <p:spPr>
           <a:xfrm>
-            <a:off x="722313" y="4406900"/>
+            <a:off x="722313" y="1981200"/>
             <a:ext cx="7772400" cy="1362075"/>
+          </a:xfrm>
+        </p:spPr>
+        <p:txBody>
+          <a:bodyPr anchor="b">
+            <a:noAutofit/>
+          </a:bodyPr>
+          <a:lstStyle>
+            <a:lvl1pPr algn="l">
+              <a:buNone/>
+              <a:defRPr sz="4300" b="1" cap="none" baseline="0">
+                <a:ln w="12700">
+                  <a:solidFill>
+                    <a:schemeClr val="accent2">
+                      <a:shade val="90000"/>
+                      <a:satMod val="150000"/>
+                    </a:schemeClr>
+                  </a:solidFill>
+                </a:ln>
+                <a:solidFill>
+                  <a:srgbClr val="FFFFFF"/>
+                </a:solidFill>
+                <a:effectLst>
+                  <a:outerShdw blurRad="38100" dist="38100" dir="5400000" algn="tl" rotWithShape="0">
+                    <a:srgbClr val="000000">
+                      <a:alpha val="25000"/>
+                    </a:srgbClr>
+                  </a:outerShdw>
+                </a:effectLst>
+              </a:defRPr>
+            </a:lvl1pPr>
+          </a:lstStyle>
+          <a:p>
+            <a:r>
+              <a:rPr kumimoji="0" lang="en-US" smtClean="0"/>
+              <a:t>Click to edit Master title style</a:t>
+            </a:r>
+            <a:endParaRPr kumimoji="0" lang="en-US"/>
+          </a:p>
+        </p:txBody>
+      </p:sp>
+      <p:sp>
+        <p:nvSpPr>
+          <p:cNvPr id="3" name="Text Placeholder 2"/>
+          <p:cNvSpPr>
+            <a:spLocks noGrp="1"/>
+          </p:cNvSpPr>
+          <p:nvPr>
+            <p:ph type="body" idx="1"/>
+          </p:nvPr>
+        </p:nvSpPr>
+        <p:spPr>
+          <a:xfrm>
+            <a:off x="722313" y="3367088"/>
+            <a:ext cx="7772400" cy="1509712"/>
           </a:xfrm>
         </p:spPr>
         <p:txBody>
           <a:bodyPr anchor="t"/>
           <a:lstStyle>
-            <a:lvl1pPr algn="l">
-              <a:defRPr sz="4000" b="1" cap="all"/>
-            </a:lvl1pPr>
-          </a:lstStyle>
-          <a:p>
-            <a:r>
-              <a:rPr lang="en-US" smtClean="0"/>
-              <a:t>Click to edit Master title style</a:t>
-            </a:r>
-            <a:endParaRPr lang="uk-UA"/>
-          </a:p>
-        </p:txBody>
-      </p:sp>
-      <p:sp>
-        <p:nvSpPr>
-          <p:cNvPr id="3" name="Text Placeholder 2"/>
-          <p:cNvSpPr>
-            <a:spLocks noGrp="1"/>
-          </p:cNvSpPr>
-          <p:nvPr>
-            <p:ph type="body" idx="1"/>
-          </p:nvPr>
-        </p:nvSpPr>
-        <p:spPr>
-          <a:xfrm>
-            <a:off x="722313" y="2906713"/>
-            <a:ext cx="7772400" cy="1500187"/>
-          </a:xfrm>
-        </p:spPr>
-        <p:txBody>
-          <a:bodyPr anchor="b"/>
-          <a:lstStyle>
-            <a:lvl1pPr marL="0" indent="0">
+            <a:lvl1pPr marL="45720" indent="0">
               <a:buNone/>
-              <a:defRPr sz="2000">
+              <a:defRPr sz="2100" b="0">
                 <a:solidFill>
-                  <a:schemeClr val="tx1">
-                    <a:tint val="75000"/>
-                  </a:schemeClr>
+                  <a:schemeClr val="tx2"/>
                 </a:solidFill>
               </a:defRPr>
             </a:lvl1pPr>
-            <a:lvl2pPr marL="457200" indent="0">
+            <a:lvl2pPr>
               <a:buNone/>
               <a:defRPr sz="1800">
                 <a:solidFill>
@@ -957,7 +1453,7 @@
                 </a:solidFill>
               </a:defRPr>
             </a:lvl2pPr>
-            <a:lvl3pPr marL="914400" indent="0">
+            <a:lvl3pPr>
               <a:buNone/>
               <a:defRPr sz="1600">
                 <a:solidFill>
@@ -967,7 +1463,7 @@
                 </a:solidFill>
               </a:defRPr>
             </a:lvl3pPr>
-            <a:lvl4pPr marL="1371600" indent="0">
+            <a:lvl4pPr>
               <a:buNone/>
               <a:defRPr sz="1400">
                 <a:solidFill>
@@ -977,7 +1473,7 @@
                 </a:solidFill>
               </a:defRPr>
             </a:lvl4pPr>
-            <a:lvl5pPr marL="1828800" indent="0">
+            <a:lvl5pPr>
               <a:buNone/>
               <a:defRPr sz="1400">
                 <a:solidFill>
@@ -987,51 +1483,11 @@
                 </a:solidFill>
               </a:defRPr>
             </a:lvl5pPr>
-            <a:lvl6pPr marL="2286000" indent="0">
-              <a:buNone/>
-              <a:defRPr sz="1400">
-                <a:solidFill>
-                  <a:schemeClr val="tx1">
-                    <a:tint val="75000"/>
-                  </a:schemeClr>
-                </a:solidFill>
-              </a:defRPr>
-            </a:lvl6pPr>
-            <a:lvl7pPr marL="2743200" indent="0">
-              <a:buNone/>
-              <a:defRPr sz="1400">
-                <a:solidFill>
-                  <a:schemeClr val="tx1">
-                    <a:tint val="75000"/>
-                  </a:schemeClr>
-                </a:solidFill>
-              </a:defRPr>
-            </a:lvl7pPr>
-            <a:lvl8pPr marL="3200400" indent="0">
-              <a:buNone/>
-              <a:defRPr sz="1400">
-                <a:solidFill>
-                  <a:schemeClr val="tx1">
-                    <a:tint val="75000"/>
-                  </a:schemeClr>
-                </a:solidFill>
-              </a:defRPr>
-            </a:lvl8pPr>
-            <a:lvl9pPr marL="3657600" indent="0">
-              <a:buNone/>
-              <a:defRPr sz="1400">
-                <a:solidFill>
-                  <a:schemeClr val="tx1">
-                    <a:tint val="75000"/>
-                  </a:schemeClr>
-                </a:solidFill>
-              </a:defRPr>
-            </a:lvl9pPr>
           </a:lstStyle>
           <a:p>
-            <a:pPr lvl="0"/>
-            <a:r>
-              <a:rPr lang="en-US" smtClean="0"/>
+            <a:pPr lvl="0" eaLnBrk="1" latinLnBrk="0" hangingPunct="1"/>
+            <a:r>
+              <a:rPr kumimoji="0" lang="en-US" smtClean="0"/>
               <a:t>Click to edit Master text styles</a:t>
             </a:r>
           </a:p>
@@ -1054,7 +1510,7 @@
           <a:p>
             <a:fld id="{7F104D85-F20C-42E7-AB62-E5B99C7A82F1}" type="datetimeFigureOut">
               <a:rPr lang="uk-UA" smtClean="0"/>
-              <a:t>25.01.2024</a:t>
+              <a:t>26.01.2024</a:t>
             </a:fld>
             <a:endParaRPr lang="uk-UA"/>
           </a:p>
@@ -1103,11 +1559,6 @@
         </p:txBody>
       </p:sp>
     </p:spTree>
-    <p:extLst>
-      <p:ext uri="{BB962C8B-B14F-4D97-AF65-F5344CB8AC3E}">
-        <p14:creationId xmlns:p14="http://schemas.microsoft.com/office/powerpoint/2010/main" val="3136089587"/>
-      </p:ext>
-    </p:extLst>
   </p:cSld>
   <p:clrMapOvr>
     <a:masterClrMapping/>
@@ -1148,10 +1599,10 @@
           <a:lstStyle/>
           <a:p>
             <a:r>
-              <a:rPr lang="en-US" smtClean="0"/>
+              <a:rPr kumimoji="0" lang="en-US" smtClean="0"/>
               <a:t>Click to edit Master title style</a:t>
             </a:r>
-            <a:endParaRPr lang="uk-UA"/>
+            <a:endParaRPr kumimoji="0" lang="en-US"/>
           </a:p>
         </p:txBody>
       </p:sp>
@@ -1167,7 +1618,7 @@
         </p:nvSpPr>
         <p:spPr>
           <a:xfrm>
-            <a:off x="457200" y="1600200"/>
+            <a:off x="457200" y="2249424"/>
             <a:ext cx="4038600" cy="4525963"/>
           </a:xfrm>
         </p:spPr>
@@ -1175,13 +1626,13 @@
           <a:bodyPr/>
           <a:lstStyle>
             <a:lvl1pPr>
-              <a:defRPr sz="2800"/>
+              <a:defRPr sz="2000"/>
             </a:lvl1pPr>
             <a:lvl2pPr>
-              <a:defRPr sz="2400"/>
+              <a:defRPr sz="1900"/>
             </a:lvl2pPr>
             <a:lvl3pPr>
-              <a:defRPr sz="2000"/>
+              <a:defRPr sz="1800"/>
             </a:lvl3pPr>
             <a:lvl4pPr>
               <a:defRPr sz="1800"/>
@@ -1189,54 +1640,42 @@
             <a:lvl5pPr>
               <a:defRPr sz="1800"/>
             </a:lvl5pPr>
-            <a:lvl6pPr>
-              <a:defRPr sz="1800"/>
-            </a:lvl6pPr>
-            <a:lvl7pPr>
-              <a:defRPr sz="1800"/>
-            </a:lvl7pPr>
-            <a:lvl8pPr>
-              <a:defRPr sz="1800"/>
-            </a:lvl8pPr>
-            <a:lvl9pPr>
-              <a:defRPr sz="1800"/>
-            </a:lvl9pPr>
           </a:lstStyle>
           <a:p>
-            <a:pPr lvl="0"/>
+            <a:pPr lvl="0" eaLnBrk="1" latinLnBrk="0" hangingPunct="1"/>
             <a:r>
               <a:rPr lang="en-US" smtClean="0"/>
               <a:t>Click to edit Master text styles</a:t>
             </a:r>
           </a:p>
           <a:p>
-            <a:pPr lvl="1"/>
+            <a:pPr lvl="1" eaLnBrk="1" latinLnBrk="0" hangingPunct="1"/>
             <a:r>
               <a:rPr lang="en-US" smtClean="0"/>
               <a:t>Second level</a:t>
             </a:r>
           </a:p>
           <a:p>
-            <a:pPr lvl="2"/>
+            <a:pPr lvl="2" eaLnBrk="1" latinLnBrk="0" hangingPunct="1"/>
             <a:r>
               <a:rPr lang="en-US" smtClean="0"/>
               <a:t>Third level</a:t>
             </a:r>
           </a:p>
           <a:p>
-            <a:pPr lvl="3"/>
+            <a:pPr lvl="3" eaLnBrk="1" latinLnBrk="0" hangingPunct="1"/>
             <a:r>
               <a:rPr lang="en-US" smtClean="0"/>
               <a:t>Fourth level</a:t>
             </a:r>
           </a:p>
           <a:p>
-            <a:pPr lvl="4"/>
+            <a:pPr lvl="4" eaLnBrk="1" latinLnBrk="0" hangingPunct="1"/>
             <a:r>
               <a:rPr lang="en-US" smtClean="0"/>
               <a:t>Fifth level</a:t>
             </a:r>
-            <a:endParaRPr lang="uk-UA"/>
+            <a:endParaRPr kumimoji="0" lang="en-US"/>
           </a:p>
         </p:txBody>
       </p:sp>
@@ -1252,7 +1691,7 @@
         </p:nvSpPr>
         <p:spPr>
           <a:xfrm>
-            <a:off x="4648200" y="1600200"/>
+            <a:off x="4648200" y="2249424"/>
             <a:ext cx="4038600" cy="4525963"/>
           </a:xfrm>
         </p:spPr>
@@ -1260,13 +1699,13 @@
           <a:bodyPr/>
           <a:lstStyle>
             <a:lvl1pPr>
-              <a:defRPr sz="2800"/>
+              <a:defRPr sz="2000"/>
             </a:lvl1pPr>
             <a:lvl2pPr>
-              <a:defRPr sz="2400"/>
+              <a:defRPr sz="1900"/>
             </a:lvl2pPr>
             <a:lvl3pPr>
-              <a:defRPr sz="2000"/>
+              <a:defRPr sz="1800"/>
             </a:lvl3pPr>
             <a:lvl4pPr>
               <a:defRPr sz="1800"/>
@@ -1274,54 +1713,42 @@
             <a:lvl5pPr>
               <a:defRPr sz="1800"/>
             </a:lvl5pPr>
-            <a:lvl6pPr>
-              <a:defRPr sz="1800"/>
-            </a:lvl6pPr>
-            <a:lvl7pPr>
-              <a:defRPr sz="1800"/>
-            </a:lvl7pPr>
-            <a:lvl8pPr>
-              <a:defRPr sz="1800"/>
-            </a:lvl8pPr>
-            <a:lvl9pPr>
-              <a:defRPr sz="1800"/>
-            </a:lvl9pPr>
           </a:lstStyle>
           <a:p>
-            <a:pPr lvl="0"/>
+            <a:pPr lvl="0" eaLnBrk="1" latinLnBrk="0" hangingPunct="1"/>
             <a:r>
               <a:rPr lang="en-US" smtClean="0"/>
               <a:t>Click to edit Master text styles</a:t>
             </a:r>
           </a:p>
           <a:p>
-            <a:pPr lvl="1"/>
+            <a:pPr lvl="1" eaLnBrk="1" latinLnBrk="0" hangingPunct="1"/>
             <a:r>
               <a:rPr lang="en-US" smtClean="0"/>
               <a:t>Second level</a:t>
             </a:r>
           </a:p>
           <a:p>
-            <a:pPr lvl="2"/>
+            <a:pPr lvl="2" eaLnBrk="1" latinLnBrk="0" hangingPunct="1"/>
             <a:r>
               <a:rPr lang="en-US" smtClean="0"/>
               <a:t>Third level</a:t>
             </a:r>
           </a:p>
           <a:p>
-            <a:pPr lvl="3"/>
+            <a:pPr lvl="3" eaLnBrk="1" latinLnBrk="0" hangingPunct="1"/>
             <a:r>
               <a:rPr lang="en-US" smtClean="0"/>
               <a:t>Fourth level</a:t>
             </a:r>
           </a:p>
           <a:p>
-            <a:pPr lvl="4"/>
+            <a:pPr lvl="4" eaLnBrk="1" latinLnBrk="0" hangingPunct="1"/>
             <a:r>
               <a:rPr lang="en-US" smtClean="0"/>
               <a:t>Fifth level</a:t>
             </a:r>
-            <a:endParaRPr lang="uk-UA"/>
+            <a:endParaRPr kumimoji="0" lang="en-US"/>
           </a:p>
         </p:txBody>
       </p:sp>
@@ -1342,7 +1769,7 @@
           <a:p>
             <a:fld id="{7F104D85-F20C-42E7-AB62-E5B99C7A82F1}" type="datetimeFigureOut">
               <a:rPr lang="uk-UA" smtClean="0"/>
-              <a:t>25.01.2024</a:t>
+              <a:t>26.01.2024</a:t>
             </a:fld>
             <a:endParaRPr lang="uk-UA"/>
           </a:p>
@@ -1391,11 +1818,6 @@
         </p:txBody>
       </p:sp>
     </p:spTree>
-    <p:extLst>
-      <p:ext uri="{BB962C8B-B14F-4D97-AF65-F5344CB8AC3E}">
-        <p14:creationId xmlns:p14="http://schemas.microsoft.com/office/powerpoint/2010/main" val="677368102"/>
-      </p:ext>
-    </p:extLst>
   </p:cSld>
   <p:clrMapOvr>
     <a:masterClrMapping/>
@@ -1430,109 +1852,185 @@
             <p:ph type="title"/>
           </p:nvPr>
         </p:nvSpPr>
-        <p:spPr/>
+        <p:spPr>
+          <a:xfrm>
+            <a:off x="381000" y="1143000"/>
+            <a:ext cx="8382000" cy="1069848"/>
+          </a:xfrm>
+        </p:spPr>
+        <p:txBody>
+          <a:bodyPr anchor="ctr"/>
+          <a:lstStyle>
+            <a:lvl1pPr>
+              <a:defRPr sz="4000" b="0" i="0" cap="none" baseline="0"/>
+            </a:lvl1pPr>
+          </a:lstStyle>
+          <a:p>
+            <a:r>
+              <a:rPr kumimoji="0" lang="en-US" smtClean="0"/>
+              <a:t>Click to edit Master title style</a:t>
+            </a:r>
+            <a:endParaRPr kumimoji="0" lang="en-US"/>
+          </a:p>
+        </p:txBody>
+      </p:sp>
+      <p:sp>
+        <p:nvSpPr>
+          <p:cNvPr id="3" name="Text Placeholder 2"/>
+          <p:cNvSpPr>
+            <a:spLocks noGrp="1"/>
+          </p:cNvSpPr>
+          <p:nvPr>
+            <p:ph type="body" idx="1"/>
+          </p:nvPr>
+        </p:nvSpPr>
+        <p:spPr>
+          <a:xfrm>
+            <a:off x="381000" y="2244970"/>
+            <a:ext cx="4041648" cy="457200"/>
+          </a:xfrm>
+          <a:solidFill>
+            <a:schemeClr val="accent2">
+              <a:satMod val="150000"/>
+              <a:alpha val="25000"/>
+            </a:schemeClr>
+          </a:solidFill>
+          <a:ln w="12700">
+            <a:solidFill>
+              <a:schemeClr val="accent2"/>
+            </a:solidFill>
+          </a:ln>
+        </p:spPr>
+        <p:txBody>
+          <a:bodyPr anchor="ctr">
+            <a:noAutofit/>
+          </a:bodyPr>
+          <a:lstStyle>
+            <a:lvl1pPr marL="45720" indent="0">
+              <a:buNone/>
+              <a:defRPr sz="1900" b="1">
+                <a:solidFill>
+                  <a:schemeClr val="tx1">
+                    <a:tint val="95000"/>
+                  </a:schemeClr>
+                </a:solidFill>
+              </a:defRPr>
+            </a:lvl1pPr>
+            <a:lvl2pPr>
+              <a:buNone/>
+              <a:defRPr sz="2000" b="1"/>
+            </a:lvl2pPr>
+            <a:lvl3pPr>
+              <a:buNone/>
+              <a:defRPr sz="1800" b="1"/>
+            </a:lvl3pPr>
+            <a:lvl4pPr>
+              <a:buNone/>
+              <a:defRPr sz="1600" b="1"/>
+            </a:lvl4pPr>
+            <a:lvl5pPr>
+              <a:buNone/>
+              <a:defRPr sz="1600" b="1"/>
+            </a:lvl5pPr>
+          </a:lstStyle>
+          <a:p>
+            <a:pPr lvl="0" eaLnBrk="1" latinLnBrk="0" hangingPunct="1"/>
+            <a:r>
+              <a:rPr kumimoji="0" lang="en-US" smtClean="0"/>
+              <a:t>Click to edit Master text styles</a:t>
+            </a:r>
+          </a:p>
+        </p:txBody>
+      </p:sp>
+      <p:sp>
+        <p:nvSpPr>
+          <p:cNvPr id="4" name="Text Placeholder 3"/>
+          <p:cNvSpPr>
+            <a:spLocks noGrp="1"/>
+          </p:cNvSpPr>
+          <p:nvPr>
+            <p:ph type="body" sz="half" idx="3"/>
+          </p:nvPr>
+        </p:nvSpPr>
+        <p:spPr>
+          <a:xfrm>
+            <a:off x="4721225" y="2244970"/>
+            <a:ext cx="4041775" cy="457200"/>
+          </a:xfrm>
+          <a:solidFill>
+            <a:schemeClr val="accent2">
+              <a:satMod val="150000"/>
+              <a:alpha val="25000"/>
+            </a:schemeClr>
+          </a:solidFill>
+          <a:ln w="12700">
+            <a:solidFill>
+              <a:schemeClr val="accent2"/>
+            </a:solidFill>
+          </a:ln>
+        </p:spPr>
+        <p:txBody>
+          <a:bodyPr anchor="ctr">
+            <a:noAutofit/>
+          </a:bodyPr>
+          <a:lstStyle>
+            <a:lvl1pPr marL="45720" indent="0">
+              <a:buNone/>
+              <a:defRPr sz="1900" b="1">
+                <a:solidFill>
+                  <a:schemeClr val="tx1">
+                    <a:tint val="95000"/>
+                  </a:schemeClr>
+                </a:solidFill>
+              </a:defRPr>
+            </a:lvl1pPr>
+            <a:lvl2pPr>
+              <a:buNone/>
+              <a:defRPr sz="2000" b="1"/>
+            </a:lvl2pPr>
+            <a:lvl3pPr>
+              <a:buNone/>
+              <a:defRPr sz="1800" b="1"/>
+            </a:lvl3pPr>
+            <a:lvl4pPr>
+              <a:buNone/>
+              <a:defRPr sz="1600" b="1"/>
+            </a:lvl4pPr>
+            <a:lvl5pPr>
+              <a:buNone/>
+              <a:defRPr sz="1600" b="1"/>
+            </a:lvl5pPr>
+          </a:lstStyle>
+          <a:p>
+            <a:pPr lvl="0" eaLnBrk="1" latinLnBrk="0" hangingPunct="1"/>
+            <a:r>
+              <a:rPr kumimoji="0" lang="en-US" smtClean="0"/>
+              <a:t>Click to edit Master text styles</a:t>
+            </a:r>
+          </a:p>
+        </p:txBody>
+      </p:sp>
+      <p:sp>
+        <p:nvSpPr>
+          <p:cNvPr id="5" name="Content Placeholder 4"/>
+          <p:cNvSpPr>
+            <a:spLocks noGrp="1"/>
+          </p:cNvSpPr>
+          <p:nvPr>
+            <p:ph sz="quarter" idx="2"/>
+          </p:nvPr>
+        </p:nvSpPr>
+        <p:spPr>
+          <a:xfrm>
+            <a:off x="381000" y="2708519"/>
+            <a:ext cx="4041648" cy="3886200"/>
+          </a:xfrm>
+        </p:spPr>
         <p:txBody>
           <a:bodyPr/>
           <a:lstStyle>
             <a:lvl1pPr>
-              <a:defRPr/>
-            </a:lvl1pPr>
-          </a:lstStyle>
-          <a:p>
-            <a:r>
-              <a:rPr lang="en-US" smtClean="0"/>
-              <a:t>Click to edit Master title style</a:t>
-            </a:r>
-            <a:endParaRPr lang="uk-UA"/>
-          </a:p>
-        </p:txBody>
-      </p:sp>
-      <p:sp>
-        <p:nvSpPr>
-          <p:cNvPr id="3" name="Text Placeholder 2"/>
-          <p:cNvSpPr>
-            <a:spLocks noGrp="1"/>
-          </p:cNvSpPr>
-          <p:nvPr>
-            <p:ph type="body" idx="1"/>
-          </p:nvPr>
-        </p:nvSpPr>
-        <p:spPr>
-          <a:xfrm>
-            <a:off x="457200" y="1535113"/>
-            <a:ext cx="4040188" cy="639762"/>
-          </a:xfrm>
-        </p:spPr>
-        <p:txBody>
-          <a:bodyPr anchor="b"/>
-          <a:lstStyle>
-            <a:lvl1pPr marL="0" indent="0">
-              <a:buNone/>
-              <a:defRPr sz="2400" b="1"/>
-            </a:lvl1pPr>
-            <a:lvl2pPr marL="457200" indent="0">
-              <a:buNone/>
-              <a:defRPr sz="2000" b="1"/>
-            </a:lvl2pPr>
-            <a:lvl3pPr marL="914400" indent="0">
-              <a:buNone/>
-              <a:defRPr sz="1800" b="1"/>
-            </a:lvl3pPr>
-            <a:lvl4pPr marL="1371600" indent="0">
-              <a:buNone/>
-              <a:defRPr sz="1600" b="1"/>
-            </a:lvl4pPr>
-            <a:lvl5pPr marL="1828800" indent="0">
-              <a:buNone/>
-              <a:defRPr sz="1600" b="1"/>
-            </a:lvl5pPr>
-            <a:lvl6pPr marL="2286000" indent="0">
-              <a:buNone/>
-              <a:defRPr sz="1600" b="1"/>
-            </a:lvl6pPr>
-            <a:lvl7pPr marL="2743200" indent="0">
-              <a:buNone/>
-              <a:defRPr sz="1600" b="1"/>
-            </a:lvl7pPr>
-            <a:lvl8pPr marL="3200400" indent="0">
-              <a:buNone/>
-              <a:defRPr sz="1600" b="1"/>
-            </a:lvl8pPr>
-            <a:lvl9pPr marL="3657600" indent="0">
-              <a:buNone/>
-              <a:defRPr sz="1600" b="1"/>
-            </a:lvl9pPr>
-          </a:lstStyle>
-          <a:p>
-            <a:pPr lvl="0"/>
-            <a:r>
-              <a:rPr lang="en-US" smtClean="0"/>
-              <a:t>Click to edit Master text styles</a:t>
-            </a:r>
-          </a:p>
-        </p:txBody>
-      </p:sp>
-      <p:sp>
-        <p:nvSpPr>
-          <p:cNvPr id="4" name="Content Placeholder 3"/>
-          <p:cNvSpPr>
-            <a:spLocks noGrp="1"/>
-          </p:cNvSpPr>
-          <p:nvPr>
-            <p:ph sz="half" idx="2"/>
-          </p:nvPr>
-        </p:nvSpPr>
-        <p:spPr>
-          <a:xfrm>
-            <a:off x="457200" y="2174875"/>
-            <a:ext cx="4040188" cy="3951288"/>
-          </a:xfrm>
-        </p:spPr>
-        <p:txBody>
-          <a:bodyPr/>
-          <a:lstStyle>
-            <a:lvl1pPr>
-              <a:defRPr sz="2400"/>
+              <a:defRPr sz="2000"/>
             </a:lvl1pPr>
             <a:lvl2pPr>
               <a:defRPr sz="2000"/>
@@ -1546,143 +2044,66 @@
             <a:lvl5pPr>
               <a:defRPr sz="1600"/>
             </a:lvl5pPr>
-            <a:lvl6pPr>
-              <a:defRPr sz="1600"/>
-            </a:lvl6pPr>
-            <a:lvl7pPr>
-              <a:defRPr sz="1600"/>
-            </a:lvl7pPr>
-            <a:lvl8pPr>
-              <a:defRPr sz="1600"/>
-            </a:lvl8pPr>
-            <a:lvl9pPr>
-              <a:defRPr sz="1600"/>
-            </a:lvl9pPr>
           </a:lstStyle>
           <a:p>
-            <a:pPr lvl="0"/>
+            <a:pPr lvl="0" eaLnBrk="1" latinLnBrk="0" hangingPunct="1"/>
             <a:r>
               <a:rPr lang="en-US" smtClean="0"/>
               <a:t>Click to edit Master text styles</a:t>
             </a:r>
           </a:p>
           <a:p>
-            <a:pPr lvl="1"/>
+            <a:pPr lvl="1" eaLnBrk="1" latinLnBrk="0" hangingPunct="1"/>
             <a:r>
               <a:rPr lang="en-US" smtClean="0"/>
               <a:t>Second level</a:t>
             </a:r>
           </a:p>
           <a:p>
-            <a:pPr lvl="2"/>
+            <a:pPr lvl="2" eaLnBrk="1" latinLnBrk="0" hangingPunct="1"/>
             <a:r>
               <a:rPr lang="en-US" smtClean="0"/>
               <a:t>Third level</a:t>
             </a:r>
           </a:p>
           <a:p>
-            <a:pPr lvl="3"/>
+            <a:pPr lvl="3" eaLnBrk="1" latinLnBrk="0" hangingPunct="1"/>
             <a:r>
               <a:rPr lang="en-US" smtClean="0"/>
               <a:t>Fourth level</a:t>
             </a:r>
           </a:p>
           <a:p>
-            <a:pPr lvl="4"/>
+            <a:pPr lvl="4" eaLnBrk="1" latinLnBrk="0" hangingPunct="1"/>
             <a:r>
               <a:rPr lang="en-US" smtClean="0"/>
               <a:t>Fifth level</a:t>
             </a:r>
-            <a:endParaRPr lang="uk-UA"/>
-          </a:p>
-        </p:txBody>
-      </p:sp>
-      <p:sp>
-        <p:nvSpPr>
-          <p:cNvPr id="5" name="Text Placeholder 4"/>
-          <p:cNvSpPr>
-            <a:spLocks noGrp="1"/>
-          </p:cNvSpPr>
-          <p:nvPr>
-            <p:ph type="body" sz="quarter" idx="3"/>
+            <a:endParaRPr kumimoji="0" lang="en-US"/>
+          </a:p>
+        </p:txBody>
+      </p:sp>
+      <p:sp>
+        <p:nvSpPr>
+          <p:cNvPr id="6" name="Content Placeholder 5"/>
+          <p:cNvSpPr>
+            <a:spLocks noGrp="1"/>
+          </p:cNvSpPr>
+          <p:nvPr>
+            <p:ph sz="quarter" idx="4"/>
           </p:nvPr>
         </p:nvSpPr>
         <p:spPr>
           <a:xfrm>
-            <a:off x="4645025" y="1535113"/>
-            <a:ext cx="4041775" cy="639762"/>
-          </a:xfrm>
-        </p:spPr>
-        <p:txBody>
-          <a:bodyPr anchor="b"/>
-          <a:lstStyle>
-            <a:lvl1pPr marL="0" indent="0">
-              <a:buNone/>
-              <a:defRPr sz="2400" b="1"/>
-            </a:lvl1pPr>
-            <a:lvl2pPr marL="457200" indent="0">
-              <a:buNone/>
-              <a:defRPr sz="2000" b="1"/>
-            </a:lvl2pPr>
-            <a:lvl3pPr marL="914400" indent="0">
-              <a:buNone/>
-              <a:defRPr sz="1800" b="1"/>
-            </a:lvl3pPr>
-            <a:lvl4pPr marL="1371600" indent="0">
-              <a:buNone/>
-              <a:defRPr sz="1600" b="1"/>
-            </a:lvl4pPr>
-            <a:lvl5pPr marL="1828800" indent="0">
-              <a:buNone/>
-              <a:defRPr sz="1600" b="1"/>
-            </a:lvl5pPr>
-            <a:lvl6pPr marL="2286000" indent="0">
-              <a:buNone/>
-              <a:defRPr sz="1600" b="1"/>
-            </a:lvl6pPr>
-            <a:lvl7pPr marL="2743200" indent="0">
-              <a:buNone/>
-              <a:defRPr sz="1600" b="1"/>
-            </a:lvl7pPr>
-            <a:lvl8pPr marL="3200400" indent="0">
-              <a:buNone/>
-              <a:defRPr sz="1600" b="1"/>
-            </a:lvl8pPr>
-            <a:lvl9pPr marL="3657600" indent="0">
-              <a:buNone/>
-              <a:defRPr sz="1600" b="1"/>
-            </a:lvl9pPr>
-          </a:lstStyle>
-          <a:p>
-            <a:pPr lvl="0"/>
-            <a:r>
-              <a:rPr lang="en-US" smtClean="0"/>
-              <a:t>Click to edit Master text styles</a:t>
-            </a:r>
-          </a:p>
-        </p:txBody>
-      </p:sp>
-      <p:sp>
-        <p:nvSpPr>
-          <p:cNvPr id="6" name="Content Placeholder 5"/>
-          <p:cNvSpPr>
-            <a:spLocks noGrp="1"/>
-          </p:cNvSpPr>
-          <p:nvPr>
-            <p:ph sz="quarter" idx="4"/>
-          </p:nvPr>
-        </p:nvSpPr>
-        <p:spPr>
-          <a:xfrm>
-            <a:off x="4645025" y="2174875"/>
-            <a:ext cx="4041775" cy="3951288"/>
+            <a:off x="4718304" y="2708519"/>
+            <a:ext cx="4041775" cy="3886200"/>
           </a:xfrm>
         </p:spPr>
         <p:txBody>
           <a:bodyPr/>
           <a:lstStyle>
             <a:lvl1pPr>
-              <a:defRPr sz="2400"/>
+              <a:defRPr sz="2000"/>
             </a:lvl1pPr>
             <a:lvl2pPr>
               <a:defRPr sz="2000"/>
@@ -1696,60 +2117,48 @@
             <a:lvl5pPr>
               <a:defRPr sz="1600"/>
             </a:lvl5pPr>
-            <a:lvl6pPr>
-              <a:defRPr sz="1600"/>
-            </a:lvl6pPr>
-            <a:lvl7pPr>
-              <a:defRPr sz="1600"/>
-            </a:lvl7pPr>
-            <a:lvl8pPr>
-              <a:defRPr sz="1600"/>
-            </a:lvl8pPr>
-            <a:lvl9pPr>
-              <a:defRPr sz="1600"/>
-            </a:lvl9pPr>
           </a:lstStyle>
           <a:p>
-            <a:pPr lvl="0"/>
+            <a:pPr lvl="0" eaLnBrk="1" latinLnBrk="0" hangingPunct="1"/>
             <a:r>
               <a:rPr lang="en-US" smtClean="0"/>
               <a:t>Click to edit Master text styles</a:t>
             </a:r>
           </a:p>
           <a:p>
-            <a:pPr lvl="1"/>
+            <a:pPr lvl="1" eaLnBrk="1" latinLnBrk="0" hangingPunct="1"/>
             <a:r>
               <a:rPr lang="en-US" smtClean="0"/>
               <a:t>Second level</a:t>
             </a:r>
           </a:p>
           <a:p>
-            <a:pPr lvl="2"/>
+            <a:pPr lvl="2" eaLnBrk="1" latinLnBrk="0" hangingPunct="1"/>
             <a:r>
               <a:rPr lang="en-US" smtClean="0"/>
               <a:t>Third level</a:t>
             </a:r>
           </a:p>
           <a:p>
-            <a:pPr lvl="3"/>
+            <a:pPr lvl="3" eaLnBrk="1" latinLnBrk="0" hangingPunct="1"/>
             <a:r>
               <a:rPr lang="en-US" smtClean="0"/>
               <a:t>Fourth level</a:t>
             </a:r>
           </a:p>
           <a:p>
-            <a:pPr lvl="4"/>
+            <a:pPr lvl="4" eaLnBrk="1" latinLnBrk="0" hangingPunct="1"/>
             <a:r>
               <a:rPr lang="en-US" smtClean="0"/>
               <a:t>Fifth level</a:t>
             </a:r>
-            <a:endParaRPr lang="uk-UA"/>
-          </a:p>
-        </p:txBody>
-      </p:sp>
-      <p:sp>
-        <p:nvSpPr>
-          <p:cNvPr id="7" name="Date Placeholder 6"/>
+            <a:endParaRPr kumimoji="0" lang="en-US"/>
+          </a:p>
+        </p:txBody>
+      </p:sp>
+      <p:sp>
+        <p:nvSpPr>
+          <p:cNvPr id="26" name="Date Placeholder 25"/>
           <p:cNvSpPr>
             <a:spLocks noGrp="1"/>
           </p:cNvSpPr>
@@ -1759,12 +2168,12 @@
         </p:nvSpPr>
         <p:spPr/>
         <p:txBody>
-          <a:bodyPr/>
+          <a:bodyPr rtlCol="0"/>
           <a:lstStyle/>
           <a:p>
             <a:fld id="{7F104D85-F20C-42E7-AB62-E5B99C7A82F1}" type="datetimeFigureOut">
               <a:rPr lang="uk-UA" smtClean="0"/>
-              <a:t>25.01.2024</a:t>
+              <a:t>26.01.2024</a:t>
             </a:fld>
             <a:endParaRPr lang="uk-UA"/>
           </a:p>
@@ -1772,36 +2181,17 @@
       </p:sp>
       <p:sp>
         <p:nvSpPr>
-          <p:cNvPr id="8" name="Footer Placeholder 7"/>
-          <p:cNvSpPr>
-            <a:spLocks noGrp="1"/>
-          </p:cNvSpPr>
-          <p:nvPr>
-            <p:ph type="ftr" sz="quarter" idx="11"/>
+          <p:cNvPr id="27" name="Slide Number Placeholder 26"/>
+          <p:cNvSpPr>
+            <a:spLocks noGrp="1"/>
+          </p:cNvSpPr>
+          <p:nvPr>
+            <p:ph type="sldNum" sz="quarter" idx="11"/>
           </p:nvPr>
         </p:nvSpPr>
         <p:spPr/>
         <p:txBody>
-          <a:bodyPr/>
-          <a:lstStyle/>
-          <a:p>
-            <a:endParaRPr lang="uk-UA"/>
-          </a:p>
-        </p:txBody>
-      </p:sp>
-      <p:sp>
-        <p:nvSpPr>
-          <p:cNvPr id="9" name="Slide Number Placeholder 8"/>
-          <p:cNvSpPr>
-            <a:spLocks noGrp="1"/>
-          </p:cNvSpPr>
-          <p:nvPr>
-            <p:ph type="sldNum" sz="quarter" idx="12"/>
-          </p:nvPr>
-        </p:nvSpPr>
-        <p:spPr/>
-        <p:txBody>
-          <a:bodyPr/>
+          <a:bodyPr rtlCol="0"/>
           <a:lstStyle/>
           <a:p>
             <a:fld id="{7A3FA973-5953-4A62-8B90-016A3CA2C5F6}" type="slidenum">
@@ -1812,12 +2202,26 @@
           </a:p>
         </p:txBody>
       </p:sp>
+      <p:sp>
+        <p:nvSpPr>
+          <p:cNvPr id="28" name="Footer Placeholder 27"/>
+          <p:cNvSpPr>
+            <a:spLocks noGrp="1"/>
+          </p:cNvSpPr>
+          <p:nvPr>
+            <p:ph type="ftr" sz="quarter" idx="12"/>
+          </p:nvPr>
+        </p:nvSpPr>
+        <p:spPr/>
+        <p:txBody>
+          <a:bodyPr rtlCol="0"/>
+          <a:lstStyle/>
+          <a:p>
+            <a:endParaRPr lang="uk-UA"/>
+          </a:p>
+        </p:txBody>
+      </p:sp>
     </p:spTree>
-    <p:extLst>
-      <p:ext uri="{BB962C8B-B14F-4D97-AF65-F5344CB8AC3E}">
-        <p14:creationId xmlns:p14="http://schemas.microsoft.com/office/powerpoint/2010/main" val="849366951"/>
-      </p:ext>
-    </p:extLst>
   </p:cSld>
   <p:clrMapOvr>
     <a:masterClrMapping/>
@@ -1852,16 +2256,29 @@
             <p:ph type="title"/>
           </p:nvPr>
         </p:nvSpPr>
-        <p:spPr/>
-        <p:txBody>
-          <a:bodyPr/>
-          <a:lstStyle/>
-          <a:p>
-            <a:r>
-              <a:rPr lang="en-US" smtClean="0"/>
+        <p:spPr>
+          <a:xfrm>
+            <a:off x="457200" y="1143000"/>
+            <a:ext cx="8229600" cy="1069848"/>
+          </a:xfrm>
+        </p:spPr>
+        <p:txBody>
+          <a:bodyPr anchor="ctr"/>
+          <a:lstStyle>
+            <a:lvl1pPr>
+              <a:defRPr sz="4000">
+                <a:solidFill>
+                  <a:schemeClr val="tx2"/>
+                </a:solidFill>
+              </a:defRPr>
+            </a:lvl1pPr>
+          </a:lstStyle>
+          <a:p>
+            <a:r>
+              <a:rPr kumimoji="0" lang="en-US" smtClean="0"/>
               <a:t>Click to edit Master title style</a:t>
             </a:r>
-            <a:endParaRPr lang="uk-UA"/>
+            <a:endParaRPr kumimoji="0" lang="en-US"/>
           </a:p>
         </p:txBody>
       </p:sp>
@@ -1875,14 +2292,19 @@
             <p:ph type="dt" sz="half" idx="10"/>
           </p:nvPr>
         </p:nvSpPr>
-        <p:spPr/>
+        <p:spPr>
+          <a:xfrm>
+            <a:off x="6583680" y="612648"/>
+            <a:ext cx="957264" cy="457200"/>
+          </a:xfrm>
+        </p:spPr>
         <p:txBody>
           <a:bodyPr/>
           <a:lstStyle/>
           <a:p>
             <a:fld id="{7F104D85-F20C-42E7-AB62-E5B99C7A82F1}" type="datetimeFigureOut">
               <a:rPr lang="uk-UA" smtClean="0"/>
-              <a:t>25.01.2024</a:t>
+              <a:t>26.01.2024</a:t>
             </a:fld>
             <a:endParaRPr lang="uk-UA"/>
           </a:p>
@@ -1898,7 +2320,12 @@
             <p:ph type="ftr" sz="quarter" idx="11"/>
           </p:nvPr>
         </p:nvSpPr>
-        <p:spPr/>
+        <p:spPr>
+          <a:xfrm>
+            <a:off x="5257800" y="612648"/>
+            <a:ext cx="1325880" cy="457200"/>
+          </a:xfrm>
+        </p:spPr>
         <p:txBody>
           <a:bodyPr/>
           <a:lstStyle/>
@@ -1917,7 +2344,12 @@
             <p:ph type="sldNum" sz="quarter" idx="12"/>
           </p:nvPr>
         </p:nvSpPr>
-        <p:spPr/>
+        <p:spPr>
+          <a:xfrm>
+            <a:off x="8174736" y="2272"/>
+            <a:ext cx="762000" cy="365760"/>
+          </a:xfrm>
+        </p:spPr>
         <p:txBody>
           <a:bodyPr/>
           <a:lstStyle/>
@@ -1931,11 +2363,6 @@
         </p:txBody>
       </p:sp>
     </p:spTree>
-    <p:extLst>
-      <p:ext uri="{BB962C8B-B14F-4D97-AF65-F5344CB8AC3E}">
-        <p14:creationId xmlns:p14="http://schemas.microsoft.com/office/powerpoint/2010/main" val="2672212372"/>
-      </p:ext>
-    </p:extLst>
   </p:cSld>
   <p:clrMapOvr>
     <a:masterClrMapping/>
@@ -1977,7 +2404,7 @@
           <a:p>
             <a:fld id="{7F104D85-F20C-42E7-AB62-E5B99C7A82F1}" type="datetimeFigureOut">
               <a:rPr lang="uk-UA" smtClean="0"/>
-              <a:t>25.01.2024</a:t>
+              <a:t>26.01.2024</a:t>
             </a:fld>
             <a:endParaRPr lang="uk-UA"/>
           </a:p>
@@ -2026,11 +2453,6 @@
         </p:txBody>
       </p:sp>
     </p:spTree>
-    <p:extLst>
-      <p:ext uri="{BB962C8B-B14F-4D97-AF65-F5344CB8AC3E}">
-        <p14:creationId xmlns:p14="http://schemas.microsoft.com/office/powerpoint/2010/main" val="3236105737"/>
-      </p:ext>
-    </p:extLst>
   </p:cSld>
   <p:clrMapOvr>
     <a:masterClrMapping/>
@@ -2067,40 +2489,90 @@
         </p:nvSpPr>
         <p:spPr>
           <a:xfrm>
-            <a:off x="457200" y="273050"/>
-            <a:ext cx="3008313" cy="1162050"/>
+            <a:off x="5353496" y="1101970"/>
+            <a:ext cx="3383280" cy="877824"/>
           </a:xfrm>
         </p:spPr>
         <p:txBody>
           <a:bodyPr anchor="b"/>
           <a:lstStyle>
             <a:lvl1pPr algn="l">
-              <a:defRPr sz="2000" b="1"/>
+              <a:buNone/>
+              <a:defRPr sz="1800" b="1"/>
             </a:lvl1pPr>
           </a:lstStyle>
           <a:p>
             <a:r>
-              <a:rPr lang="en-US" smtClean="0"/>
+              <a:rPr kumimoji="0" lang="en-US" smtClean="0"/>
               <a:t>Click to edit Master title style</a:t>
             </a:r>
-            <a:endParaRPr lang="uk-UA"/>
-          </a:p>
-        </p:txBody>
-      </p:sp>
-      <p:sp>
-        <p:nvSpPr>
-          <p:cNvPr id="3" name="Content Placeholder 2"/>
-          <p:cNvSpPr>
-            <a:spLocks noGrp="1"/>
-          </p:cNvSpPr>
-          <p:nvPr>
-            <p:ph idx="1"/>
+            <a:endParaRPr kumimoji="0" lang="en-US"/>
+          </a:p>
+        </p:txBody>
+      </p:sp>
+      <p:sp>
+        <p:nvSpPr>
+          <p:cNvPr id="3" name="Text Placeholder 2"/>
+          <p:cNvSpPr>
+            <a:spLocks noGrp="1"/>
+          </p:cNvSpPr>
+          <p:nvPr>
+            <p:ph type="body" idx="2"/>
           </p:nvPr>
         </p:nvSpPr>
         <p:spPr>
           <a:xfrm>
-            <a:off x="3575050" y="273050"/>
-            <a:ext cx="5111750" cy="5853113"/>
+            <a:off x="5353496" y="2010727"/>
+            <a:ext cx="3383280" cy="4617720"/>
+          </a:xfrm>
+        </p:spPr>
+        <p:txBody>
+          <a:bodyPr/>
+          <a:lstStyle>
+            <a:lvl1pPr marL="9144" indent="0">
+              <a:buNone/>
+              <a:defRPr sz="1400"/>
+            </a:lvl1pPr>
+            <a:lvl2pPr>
+              <a:buNone/>
+              <a:defRPr sz="1200"/>
+            </a:lvl2pPr>
+            <a:lvl3pPr>
+              <a:buNone/>
+              <a:defRPr sz="1000"/>
+            </a:lvl3pPr>
+            <a:lvl4pPr>
+              <a:buNone/>
+              <a:defRPr sz="900"/>
+            </a:lvl4pPr>
+            <a:lvl5pPr>
+              <a:buNone/>
+              <a:defRPr sz="900"/>
+            </a:lvl5pPr>
+          </a:lstStyle>
+          <a:p>
+            <a:pPr lvl="0" eaLnBrk="1" latinLnBrk="0" hangingPunct="1"/>
+            <a:r>
+              <a:rPr kumimoji="0" lang="en-US" smtClean="0"/>
+              <a:t>Click to edit Master text styles</a:t>
+            </a:r>
+          </a:p>
+        </p:txBody>
+      </p:sp>
+      <p:sp>
+        <p:nvSpPr>
+          <p:cNvPr id="4" name="Content Placeholder 3"/>
+          <p:cNvSpPr>
+            <a:spLocks noGrp="1"/>
+          </p:cNvSpPr>
+          <p:nvPr>
+            <p:ph sz="half" idx="1"/>
+          </p:nvPr>
+        </p:nvSpPr>
+        <p:spPr>
+          <a:xfrm>
+            <a:off x="152400" y="776287"/>
+            <a:ext cx="5102352" cy="5852160"/>
           </a:xfrm>
         </p:spPr>
         <p:txBody>
@@ -2121,119 +2593,42 @@
             <a:lvl5pPr>
               <a:defRPr sz="2000"/>
             </a:lvl5pPr>
-            <a:lvl6pPr>
-              <a:defRPr sz="2000"/>
-            </a:lvl6pPr>
-            <a:lvl7pPr>
-              <a:defRPr sz="2000"/>
-            </a:lvl7pPr>
-            <a:lvl8pPr>
-              <a:defRPr sz="2000"/>
-            </a:lvl8pPr>
-            <a:lvl9pPr>
-              <a:defRPr sz="2000"/>
-            </a:lvl9pPr>
           </a:lstStyle>
           <a:p>
-            <a:pPr lvl="0"/>
+            <a:pPr lvl="0" eaLnBrk="1" latinLnBrk="0" hangingPunct="1"/>
             <a:r>
               <a:rPr lang="en-US" smtClean="0"/>
               <a:t>Click to edit Master text styles</a:t>
             </a:r>
           </a:p>
           <a:p>
-            <a:pPr lvl="1"/>
+            <a:pPr lvl="1" eaLnBrk="1" latinLnBrk="0" hangingPunct="1"/>
             <a:r>
               <a:rPr lang="en-US" smtClean="0"/>
               <a:t>Second level</a:t>
             </a:r>
           </a:p>
           <a:p>
-            <a:pPr lvl="2"/>
+            <a:pPr lvl="2" eaLnBrk="1" latinLnBrk="0" hangingPunct="1"/>
             <a:r>
               <a:rPr lang="en-US" smtClean="0"/>
               <a:t>Third level</a:t>
             </a:r>
           </a:p>
           <a:p>
-            <a:pPr lvl="3"/>
+            <a:pPr lvl="3" eaLnBrk="1" latinLnBrk="0" hangingPunct="1"/>
             <a:r>
               <a:rPr lang="en-US" smtClean="0"/>
               <a:t>Fourth level</a:t>
             </a:r>
           </a:p>
           <a:p>
-            <a:pPr lvl="4"/>
+            <a:pPr lvl="4" eaLnBrk="1" latinLnBrk="0" hangingPunct="1"/>
             <a:r>
               <a:rPr lang="en-US" smtClean="0"/>
               <a:t>Fifth level</a:t>
             </a:r>
-            <a:endParaRPr lang="uk-UA"/>
-          </a:p>
-        </p:txBody>
-      </p:sp>
-      <p:sp>
-        <p:nvSpPr>
-          <p:cNvPr id="4" name="Text Placeholder 3"/>
-          <p:cNvSpPr>
-            <a:spLocks noGrp="1"/>
-          </p:cNvSpPr>
-          <p:nvPr>
-            <p:ph type="body" sz="half" idx="2"/>
-          </p:nvPr>
-        </p:nvSpPr>
-        <p:spPr>
-          <a:xfrm>
-            <a:off x="457200" y="1435100"/>
-            <a:ext cx="3008313" cy="4691063"/>
-          </a:xfrm>
-        </p:spPr>
-        <p:txBody>
-          <a:bodyPr/>
-          <a:lstStyle>
-            <a:lvl1pPr marL="0" indent="0">
-              <a:buNone/>
-              <a:defRPr sz="1400"/>
-            </a:lvl1pPr>
-            <a:lvl2pPr marL="457200" indent="0">
-              <a:buNone/>
-              <a:defRPr sz="1200"/>
-            </a:lvl2pPr>
-            <a:lvl3pPr marL="914400" indent="0">
-              <a:buNone/>
-              <a:defRPr sz="1000"/>
-            </a:lvl3pPr>
-            <a:lvl4pPr marL="1371600" indent="0">
-              <a:buNone/>
-              <a:defRPr sz="900"/>
-            </a:lvl4pPr>
-            <a:lvl5pPr marL="1828800" indent="0">
-              <a:buNone/>
-              <a:defRPr sz="900"/>
-            </a:lvl5pPr>
-            <a:lvl6pPr marL="2286000" indent="0">
-              <a:buNone/>
-              <a:defRPr sz="900"/>
-            </a:lvl6pPr>
-            <a:lvl7pPr marL="2743200" indent="0">
-              <a:buNone/>
-              <a:defRPr sz="900"/>
-            </a:lvl7pPr>
-            <a:lvl8pPr marL="3200400" indent="0">
-              <a:buNone/>
-              <a:defRPr sz="900"/>
-            </a:lvl8pPr>
-            <a:lvl9pPr marL="3657600" indent="0">
-              <a:buNone/>
-              <a:defRPr sz="900"/>
-            </a:lvl9pPr>
-          </a:lstStyle>
-          <a:p>
-            <a:pPr lvl="0"/>
-            <a:r>
-              <a:rPr lang="en-US" smtClean="0"/>
-              <a:t>Click to edit Master text styles</a:t>
-            </a:r>
+            <a:endParaRPr kumimoji="0" lang="en-US"/>
           </a:p>
         </p:txBody>
       </p:sp>
@@ -2254,7 +2649,7 @@
           <a:p>
             <a:fld id="{7F104D85-F20C-42E7-AB62-E5B99C7A82F1}" type="datetimeFigureOut">
               <a:rPr lang="uk-UA" smtClean="0"/>
-              <a:t>25.01.2024</a:t>
+              <a:t>26.01.2024</a:t>
             </a:fld>
             <a:endParaRPr lang="uk-UA"/>
           </a:p>
@@ -2303,11 +2698,6 @@
         </p:txBody>
       </p:sp>
     </p:spTree>
-    <p:extLst>
-      <p:ext uri="{BB962C8B-B14F-4D97-AF65-F5344CB8AC3E}">
-        <p14:creationId xmlns:p14="http://schemas.microsoft.com/office/powerpoint/2010/main" val="1510729839"/>
-      </p:ext>
-    </p:extLst>
   </p:cSld>
   <p:clrMapOvr>
     <a:masterClrMapping/>
@@ -2344,23 +2734,24 @@
         </p:nvSpPr>
         <p:spPr>
           <a:xfrm>
-            <a:off x="1792288" y="4800600"/>
-            <a:ext cx="5486400" cy="566738"/>
-          </a:xfrm>
-        </p:spPr>
-        <p:txBody>
-          <a:bodyPr anchor="b"/>
+            <a:off x="5440434" y="1109160"/>
+            <a:ext cx="586803" cy="4681637"/>
+          </a:xfrm>
+        </p:spPr>
+        <p:txBody>
+          <a:bodyPr vert="vert270" lIns="45720" tIns="0" rIns="45720" anchor="t"/>
           <a:lstStyle>
-            <a:lvl1pPr algn="l">
+            <a:lvl1pPr algn="ctr">
+              <a:buNone/>
               <a:defRPr sz="2000" b="1"/>
             </a:lvl1pPr>
           </a:lstStyle>
           <a:p>
             <a:r>
-              <a:rPr lang="en-US" smtClean="0"/>
+              <a:rPr kumimoji="0" lang="en-US" smtClean="0"/>
               <a:t>Click to edit Master title style</a:t>
             </a:r>
-            <a:endParaRPr lang="uk-UA"/>
+            <a:endParaRPr kumimoji="0" lang="en-US"/>
           </a:p>
         </p:txBody>
       </p:sp>
@@ -2376,9 +2767,37 @@
         </p:nvSpPr>
         <p:spPr>
           <a:xfrm>
-            <a:off x="1792288" y="612775"/>
-            <a:ext cx="5486400" cy="4114800"/>
-          </a:xfrm>
+            <a:off x="403671" y="1143000"/>
+            <a:ext cx="4572000" cy="4572000"/>
+          </a:xfrm>
+          <a:solidFill>
+            <a:srgbClr val="EAEAEA"/>
+          </a:solidFill>
+          <a:ln w="50800">
+            <a:solidFill>
+              <a:srgbClr val="FFFFFF"/>
+            </a:solidFill>
+            <a:miter lim="800000"/>
+          </a:ln>
+          <a:effectLst>
+            <a:outerShdw blurRad="57150" dist="31750" dir="4800000" algn="tl" rotWithShape="0">
+              <a:srgbClr val="000000">
+                <a:alpha val="25000"/>
+              </a:srgbClr>
+            </a:outerShdw>
+          </a:effectLst>
+          <a:scene3d>
+            <a:camera prst="orthographicFront"/>
+            <a:lightRig rig="twoPt" dir="t">
+              <a:rot lat="0" lon="0" rev="7200000"/>
+            </a:lightRig>
+          </a:scene3d>
+          <a:sp3d contourW="2540">
+            <a:bevelT w="25400" h="19050"/>
+            <a:contourClr>
+              <a:srgbClr val="AEAEAE"/>
+            </a:contourClr>
+          </a:sp3d>
         </p:spPr>
         <p:txBody>
           <a:bodyPr/>
@@ -2387,41 +2806,13 @@
               <a:buNone/>
               <a:defRPr sz="3200"/>
             </a:lvl1pPr>
-            <a:lvl2pPr marL="457200" indent="0">
-              <a:buNone/>
-              <a:defRPr sz="2800"/>
-            </a:lvl2pPr>
-            <a:lvl3pPr marL="914400" indent="0">
-              <a:buNone/>
-              <a:defRPr sz="2400"/>
-            </a:lvl3pPr>
-            <a:lvl4pPr marL="1371600" indent="0">
-              <a:buNone/>
-              <a:defRPr sz="2000"/>
-            </a:lvl4pPr>
-            <a:lvl5pPr marL="1828800" indent="0">
-              <a:buNone/>
-              <a:defRPr sz="2000"/>
-            </a:lvl5pPr>
-            <a:lvl6pPr marL="2286000" indent="0">
-              <a:buNone/>
-              <a:defRPr sz="2000"/>
-            </a:lvl6pPr>
-            <a:lvl7pPr marL="2743200" indent="0">
-              <a:buNone/>
-              <a:defRPr sz="2000"/>
-            </a:lvl7pPr>
-            <a:lvl8pPr marL="3200400" indent="0">
-              <a:buNone/>
-              <a:defRPr sz="2000"/>
-            </a:lvl8pPr>
-            <a:lvl9pPr marL="3657600" indent="0">
-              <a:buNone/>
-              <a:defRPr sz="2000"/>
-            </a:lvl9pPr>
           </a:lstStyle>
           <a:p>
-            <a:endParaRPr lang="uk-UA"/>
+            <a:r>
+              <a:rPr kumimoji="0" lang="en-US" smtClean="0"/>
+              <a:t>Click icon to add picture</a:t>
+            </a:r>
+            <a:endParaRPr kumimoji="0" lang="en-US" dirty="0"/>
           </a:p>
         </p:txBody>
       </p:sp>
@@ -2437,54 +2828,49 @@
         </p:nvSpPr>
         <p:spPr>
           <a:xfrm>
-            <a:off x="1792288" y="5367338"/>
-            <a:ext cx="5486400" cy="804862"/>
-          </a:xfrm>
-        </p:spPr>
-        <p:txBody>
-          <a:bodyPr/>
+            <a:off x="6088443" y="3274308"/>
+            <a:ext cx="2590800" cy="2516489"/>
+          </a:xfrm>
+        </p:spPr>
+        <p:txBody>
+          <a:bodyPr lIns="0" tIns="0" rIns="45720" anchor="t"/>
           <a:lstStyle>
             <a:lvl1pPr marL="0" indent="0">
+              <a:lnSpc>
+                <a:spcPct val="100000"/>
+              </a:lnSpc>
+              <a:spcBef>
+                <a:spcPts val="0"/>
+              </a:spcBef>
+              <a:buFontTx/>
               <a:buNone/>
-              <a:defRPr sz="1400"/>
+              <a:defRPr sz="1300"/>
             </a:lvl1pPr>
-            <a:lvl2pPr marL="457200" indent="0">
+            <a:lvl2pPr>
+              <a:buFontTx/>
               <a:buNone/>
               <a:defRPr sz="1200"/>
             </a:lvl2pPr>
-            <a:lvl3pPr marL="914400" indent="0">
+            <a:lvl3pPr>
+              <a:buFontTx/>
               <a:buNone/>
               <a:defRPr sz="1000"/>
             </a:lvl3pPr>
-            <a:lvl4pPr marL="1371600" indent="0">
+            <a:lvl4pPr>
+              <a:buFontTx/>
               <a:buNone/>
               <a:defRPr sz="900"/>
             </a:lvl4pPr>
-            <a:lvl5pPr marL="1828800" indent="0">
+            <a:lvl5pPr>
+              <a:buFontTx/>
               <a:buNone/>
               <a:defRPr sz="900"/>
             </a:lvl5pPr>
-            <a:lvl6pPr marL="2286000" indent="0">
-              <a:buNone/>
-              <a:defRPr sz="900"/>
-            </a:lvl6pPr>
-            <a:lvl7pPr marL="2743200" indent="0">
-              <a:buNone/>
-              <a:defRPr sz="900"/>
-            </a:lvl7pPr>
-            <a:lvl8pPr marL="3200400" indent="0">
-              <a:buNone/>
-              <a:defRPr sz="900"/>
-            </a:lvl8pPr>
-            <a:lvl9pPr marL="3657600" indent="0">
-              <a:buNone/>
-              <a:defRPr sz="900"/>
-            </a:lvl9pPr>
           </a:lstStyle>
           <a:p>
-            <a:pPr lvl="0"/>
-            <a:r>
-              <a:rPr lang="en-US" smtClean="0"/>
+            <a:pPr lvl="0" eaLnBrk="1" latinLnBrk="0" hangingPunct="1"/>
+            <a:r>
+              <a:rPr kumimoji="0" lang="en-US" smtClean="0"/>
               <a:t>Click to edit Master text styles</a:t>
             </a:r>
           </a:p>
@@ -2507,7 +2893,7 @@
           <a:p>
             <a:fld id="{7F104D85-F20C-42E7-AB62-E5B99C7A82F1}" type="datetimeFigureOut">
               <a:rPr lang="uk-UA" smtClean="0"/>
-              <a:t>25.01.2024</a:t>
+              <a:t>26.01.2024</a:t>
             </a:fld>
             <a:endParaRPr lang="uk-UA"/>
           </a:p>
@@ -2556,11 +2942,6 @@
         </p:txBody>
       </p:sp>
     </p:spTree>
-    <p:extLst>
-      <p:ext uri="{BB962C8B-B14F-4D97-AF65-F5344CB8AC3E}">
-        <p14:creationId xmlns:p14="http://schemas.microsoft.com/office/powerpoint/2010/main" val="3871922276"/>
-      </p:ext>
-    </p:extLst>
   </p:cSld>
   <p:clrMapOvr>
     <a:masterClrMapping/>
@@ -2592,127 +2973,743 @@
       </p:grpSpPr>
       <p:sp>
         <p:nvSpPr>
-          <p:cNvPr id="2" name="Title Placeholder 1"/>
-          <p:cNvSpPr>
-            <a:spLocks noGrp="1"/>
-          </p:cNvSpPr>
-          <p:nvPr>
-            <p:ph type="title"/>
-          </p:nvPr>
+          <p:cNvPr id="28" name="Rectangle 27"/>
+          <p:cNvSpPr/>
+          <p:nvPr/>
         </p:nvSpPr>
         <p:spPr>
           <a:xfrm>
-            <a:off x="457200" y="274638"/>
-            <a:ext cx="8229600" cy="1143000"/>
+            <a:off x="1" y="366818"/>
+            <a:ext cx="9144000" cy="84407"/>
           </a:xfrm>
           <a:prstGeom prst="rect">
             <a:avLst/>
           </a:prstGeom>
-        </p:spPr>
-        <p:txBody>
-          <a:bodyPr vert="horz" lIns="91440" tIns="45720" rIns="91440" bIns="45720" rtlCol="0" anchor="ctr">
-            <a:normAutofit/>
-          </a:bodyPr>
-          <a:lstStyle/>
-          <a:p>
-            <a:r>
-              <a:rPr lang="en-US" smtClean="0"/>
-              <a:t>Click to edit Master title style</a:t>
-            </a:r>
-            <a:endParaRPr lang="uk-UA"/>
-          </a:p>
-        </p:txBody>
-      </p:sp>
-      <p:sp>
-        <p:nvSpPr>
-          <p:cNvPr id="3" name="Text Placeholder 2"/>
-          <p:cNvSpPr>
-            <a:spLocks noGrp="1"/>
-          </p:cNvSpPr>
-          <p:nvPr>
-            <p:ph type="body" idx="1"/>
-          </p:nvPr>
+          <a:solidFill>
+            <a:schemeClr val="accent2">
+              <a:alpha val="50000"/>
+            </a:schemeClr>
+          </a:solidFill>
+          <a:ln w="50800" cap="rnd" cmpd="thickThin" algn="ctr">
+            <a:noFill/>
+            <a:prstDash val="solid"/>
+          </a:ln>
+          <a:effectLst/>
+        </p:spPr>
+        <p:style>
+          <a:lnRef idx="3">
+            <a:schemeClr val="lt1"/>
+          </a:lnRef>
+          <a:fillRef idx="1">
+            <a:schemeClr val="accent1"/>
+          </a:fillRef>
+          <a:effectRef idx="1">
+            <a:schemeClr val="accent1"/>
+          </a:effectRef>
+          <a:fontRef idx="minor">
+            <a:schemeClr val="lt1"/>
+          </a:fontRef>
+        </p:style>
+        <p:txBody>
+          <a:bodyPr anchor="ctr"/>
+          <a:lstStyle/>
+          <a:p>
+            <a:pPr algn="ctr" eaLnBrk="1" latinLnBrk="0" hangingPunct="1"/>
+            <a:endParaRPr kumimoji="0" lang="en-US"/>
+          </a:p>
+        </p:txBody>
+      </p:sp>
+      <p:sp>
+        <p:nvSpPr>
+          <p:cNvPr id="29" name="Rectangle 28"/>
+          <p:cNvSpPr/>
+          <p:nvPr/>
         </p:nvSpPr>
         <p:spPr>
           <a:xfrm>
-            <a:off x="457200" y="1600200"/>
-            <a:ext cx="8229600" cy="4525963"/>
+            <a:off x="0" y="-1"/>
+            <a:ext cx="9144000" cy="310663"/>
           </a:xfrm>
           <a:prstGeom prst="rect">
             <a:avLst/>
           </a:prstGeom>
-        </p:spPr>
-        <p:txBody>
-          <a:bodyPr vert="horz" lIns="91440" tIns="45720" rIns="91440" bIns="45720" rtlCol="0">
-            <a:normAutofit/>
-          </a:bodyPr>
-          <a:lstStyle/>
-          <a:p>
-            <a:pPr lvl="0"/>
-            <a:r>
-              <a:rPr lang="en-US" smtClean="0"/>
-              <a:t>Click to edit Master text styles</a:t>
-            </a:r>
-          </a:p>
-          <a:p>
-            <a:pPr lvl="1"/>
-            <a:r>
-              <a:rPr lang="en-US" smtClean="0"/>
-              <a:t>Second level</a:t>
-            </a:r>
-          </a:p>
-          <a:p>
-            <a:pPr lvl="2"/>
-            <a:r>
-              <a:rPr lang="en-US" smtClean="0"/>
-              <a:t>Third level</a:t>
-            </a:r>
-          </a:p>
-          <a:p>
-            <a:pPr lvl="3"/>
-            <a:r>
-              <a:rPr lang="en-US" smtClean="0"/>
-              <a:t>Fourth level</a:t>
-            </a:r>
-          </a:p>
-          <a:p>
-            <a:pPr lvl="4"/>
-            <a:r>
-              <a:rPr lang="en-US" smtClean="0"/>
-              <a:t>Fifth level</a:t>
-            </a:r>
-            <a:endParaRPr lang="uk-UA"/>
-          </a:p>
-        </p:txBody>
-      </p:sp>
-      <p:sp>
-        <p:nvSpPr>
-          <p:cNvPr id="4" name="Date Placeholder 3"/>
-          <p:cNvSpPr>
-            <a:spLocks noGrp="1"/>
-          </p:cNvSpPr>
-          <p:nvPr>
-            <p:ph type="dt" sz="half" idx="2"/>
-          </p:nvPr>
+          <a:solidFill>
+            <a:schemeClr val="tx2">
+              <a:alpha val="100000"/>
+            </a:schemeClr>
+          </a:solidFill>
+          <a:ln w="50800" cap="rnd" cmpd="thickThin" algn="ctr">
+            <a:noFill/>
+            <a:prstDash val="solid"/>
+          </a:ln>
+          <a:effectLst/>
+        </p:spPr>
+        <p:style>
+          <a:lnRef idx="3">
+            <a:schemeClr val="lt1"/>
+          </a:lnRef>
+          <a:fillRef idx="1">
+            <a:schemeClr val="accent1"/>
+          </a:fillRef>
+          <a:effectRef idx="1">
+            <a:schemeClr val="accent1"/>
+          </a:effectRef>
+          <a:fontRef idx="minor">
+            <a:schemeClr val="lt1"/>
+          </a:fontRef>
+        </p:style>
+        <p:txBody>
+          <a:bodyPr anchor="ctr"/>
+          <a:lstStyle/>
+          <a:p>
+            <a:pPr algn="ctr" eaLnBrk="1" latinLnBrk="0" hangingPunct="1"/>
+            <a:endParaRPr kumimoji="0" lang="en-US"/>
+          </a:p>
+        </p:txBody>
+      </p:sp>
+      <p:sp>
+        <p:nvSpPr>
+          <p:cNvPr id="30" name="Rectangle 29"/>
+          <p:cNvSpPr/>
+          <p:nvPr/>
         </p:nvSpPr>
         <p:spPr>
           <a:xfrm>
-            <a:off x="457200" y="6356350"/>
-            <a:ext cx="2133600" cy="365125"/>
+            <a:off x="0" y="308276"/>
+            <a:ext cx="9144001" cy="91441"/>
           </a:xfrm>
           <a:prstGeom prst="rect">
             <a:avLst/>
           </a:prstGeom>
-        </p:spPr>
-        <p:txBody>
-          <a:bodyPr vert="horz" lIns="91440" tIns="45720" rIns="91440" bIns="45720" rtlCol="0" anchor="ctr"/>
+          <a:solidFill>
+            <a:schemeClr val="accent2">
+              <a:alpha val="100000"/>
+            </a:schemeClr>
+          </a:solidFill>
+          <a:ln w="50800" cap="rnd" cmpd="thickThin" algn="ctr">
+            <a:noFill/>
+            <a:prstDash val="solid"/>
+          </a:ln>
+          <a:effectLst/>
+        </p:spPr>
+        <p:style>
+          <a:lnRef idx="3">
+            <a:schemeClr val="lt1"/>
+          </a:lnRef>
+          <a:fillRef idx="1">
+            <a:schemeClr val="accent1"/>
+          </a:fillRef>
+          <a:effectRef idx="1">
+            <a:schemeClr val="accent1"/>
+          </a:effectRef>
+          <a:fontRef idx="minor">
+            <a:schemeClr val="lt1"/>
+          </a:fontRef>
+        </p:style>
+        <p:txBody>
+          <a:bodyPr anchor="ctr"/>
+          <a:lstStyle/>
+          <a:p>
+            <a:pPr algn="ctr" eaLnBrk="1" latinLnBrk="0" hangingPunct="1"/>
+            <a:endParaRPr kumimoji="0" lang="en-US"/>
+          </a:p>
+        </p:txBody>
+      </p:sp>
+      <p:sp>
+        <p:nvSpPr>
+          <p:cNvPr id="31" name="Rectangle 30"/>
+          <p:cNvSpPr/>
+          <p:nvPr/>
+        </p:nvSpPr>
+        <p:spPr>
+          <a:xfrm flipV="1">
+            <a:off x="5410182" y="360246"/>
+            <a:ext cx="3733819" cy="91087"/>
+          </a:xfrm>
+          <a:prstGeom prst="rect">
+            <a:avLst/>
+          </a:prstGeom>
+          <a:solidFill>
+            <a:schemeClr val="accent2">
+              <a:alpha val="100000"/>
+            </a:schemeClr>
+          </a:solidFill>
+          <a:ln w="50800" cap="rnd" cmpd="thickThin" algn="ctr">
+            <a:noFill/>
+            <a:prstDash val="solid"/>
+          </a:ln>
+          <a:effectLst/>
+        </p:spPr>
+        <p:style>
+          <a:lnRef idx="3">
+            <a:schemeClr val="lt1"/>
+          </a:lnRef>
+          <a:fillRef idx="1">
+            <a:schemeClr val="accent1"/>
+          </a:fillRef>
+          <a:effectRef idx="1">
+            <a:schemeClr val="accent1"/>
+          </a:effectRef>
+          <a:fontRef idx="minor">
+            <a:schemeClr val="lt1"/>
+          </a:fontRef>
+        </p:style>
+        <p:txBody>
+          <a:bodyPr anchor="ctr"/>
+          <a:lstStyle/>
+          <a:p>
+            <a:pPr algn="ctr" eaLnBrk="1" latinLnBrk="0" hangingPunct="1"/>
+            <a:endParaRPr kumimoji="0" lang="en-US"/>
+          </a:p>
+        </p:txBody>
+      </p:sp>
+      <p:sp>
+        <p:nvSpPr>
+          <p:cNvPr id="32" name="Rectangle 31"/>
+          <p:cNvSpPr/>
+          <p:nvPr/>
+        </p:nvSpPr>
+        <p:spPr>
+          <a:xfrm flipV="1">
+            <a:off x="5410200" y="440112"/>
+            <a:ext cx="3733801" cy="180035"/>
+          </a:xfrm>
+          <a:prstGeom prst="rect">
+            <a:avLst/>
+          </a:prstGeom>
+          <a:solidFill>
+            <a:schemeClr val="accent2">
+              <a:alpha val="50000"/>
+            </a:schemeClr>
+          </a:solidFill>
+          <a:ln w="50800" cap="rnd" cmpd="thickThin" algn="ctr">
+            <a:noFill/>
+            <a:prstDash val="solid"/>
+          </a:ln>
+          <a:effectLst/>
+        </p:spPr>
+        <p:style>
+          <a:lnRef idx="3">
+            <a:schemeClr val="lt1"/>
+          </a:lnRef>
+          <a:fillRef idx="1">
+            <a:schemeClr val="accent1"/>
+          </a:fillRef>
+          <a:effectRef idx="1">
+            <a:schemeClr val="accent1"/>
+          </a:effectRef>
+          <a:fontRef idx="minor">
+            <a:schemeClr val="lt1"/>
+          </a:fontRef>
+        </p:style>
+        <p:txBody>
+          <a:bodyPr anchor="ctr"/>
+          <a:lstStyle/>
+          <a:p>
+            <a:pPr algn="ctr" eaLnBrk="1" latinLnBrk="0" hangingPunct="1"/>
+            <a:endParaRPr kumimoji="0" lang="en-US"/>
+          </a:p>
+        </p:txBody>
+      </p:sp>
+      <p:sp useBgFill="1">
+        <p:nvSpPr>
+          <p:cNvPr id="33" name="Rounded Rectangle 32"/>
+          <p:cNvSpPr/>
+          <p:nvPr/>
+        </p:nvSpPr>
+        <p:spPr bwMode="white">
+          <a:xfrm>
+            <a:off x="5407339" y="497504"/>
+            <a:ext cx="3063240" cy="27432"/>
+          </a:xfrm>
+          <a:prstGeom prst="roundRect">
+            <a:avLst>
+              <a:gd name="adj" fmla="val 16667"/>
+            </a:avLst>
+          </a:prstGeom>
+          <a:ln w="50800" cap="rnd" cmpd="thickThin" algn="ctr">
+            <a:noFill/>
+            <a:prstDash val="solid"/>
+          </a:ln>
+          <a:effectLst/>
+        </p:spPr>
+        <p:style>
+          <a:lnRef idx="3">
+            <a:schemeClr val="lt1"/>
+          </a:lnRef>
+          <a:fillRef idx="1">
+            <a:schemeClr val="accent1"/>
+          </a:fillRef>
+          <a:effectRef idx="1">
+            <a:schemeClr val="accent1"/>
+          </a:effectRef>
+          <a:fontRef idx="minor">
+            <a:schemeClr val="lt1"/>
+          </a:fontRef>
+        </p:style>
+        <p:txBody>
+          <a:bodyPr anchor="ctr"/>
+          <a:lstStyle/>
+          <a:p>
+            <a:pPr algn="ctr" eaLnBrk="1" latinLnBrk="0" hangingPunct="1"/>
+            <a:endParaRPr kumimoji="0" lang="en-US"/>
+          </a:p>
+        </p:txBody>
+      </p:sp>
+      <p:sp useBgFill="1">
+        <p:nvSpPr>
+          <p:cNvPr id="34" name="Rounded Rectangle 33"/>
+          <p:cNvSpPr/>
+          <p:nvPr/>
+        </p:nvSpPr>
+        <p:spPr bwMode="white">
+          <a:xfrm>
+            <a:off x="7373646" y="588943"/>
+            <a:ext cx="1600200" cy="36576"/>
+          </a:xfrm>
+          <a:prstGeom prst="roundRect">
+            <a:avLst>
+              <a:gd name="adj" fmla="val 16667"/>
+            </a:avLst>
+          </a:prstGeom>
+          <a:ln w="50800" cap="rnd" cmpd="thickThin" algn="ctr">
+            <a:noFill/>
+            <a:prstDash val="solid"/>
+          </a:ln>
+          <a:effectLst/>
+        </p:spPr>
+        <p:style>
+          <a:lnRef idx="3">
+            <a:schemeClr val="lt1"/>
+          </a:lnRef>
+          <a:fillRef idx="1">
+            <a:schemeClr val="accent1"/>
+          </a:fillRef>
+          <a:effectRef idx="1">
+            <a:schemeClr val="accent1"/>
+          </a:effectRef>
+          <a:fontRef idx="minor">
+            <a:schemeClr val="lt1"/>
+          </a:fontRef>
+        </p:style>
+        <p:txBody>
+          <a:bodyPr anchor="ctr"/>
+          <a:lstStyle/>
+          <a:p>
+            <a:pPr algn="ctr" eaLnBrk="1" latinLnBrk="0" hangingPunct="1"/>
+            <a:endParaRPr kumimoji="0" lang="en-US"/>
+          </a:p>
+        </p:txBody>
+      </p:sp>
+      <p:sp>
+        <p:nvSpPr>
+          <p:cNvPr id="35" name="Rectangle 34"/>
+          <p:cNvSpPr/>
+          <p:nvPr/>
+        </p:nvSpPr>
+        <p:spPr bwMode="invGray">
+          <a:xfrm>
+            <a:off x="9084966" y="-2001"/>
+            <a:ext cx="57626" cy="621792"/>
+          </a:xfrm>
+          <a:prstGeom prst="rect">
+            <a:avLst/>
+          </a:prstGeom>
+          <a:solidFill>
+            <a:srgbClr val="FFFFFF">
+              <a:alpha val="65098"/>
+            </a:srgbClr>
+          </a:solidFill>
+          <a:ln w="50800" cap="rnd" cmpd="thickThin" algn="ctr">
+            <a:noFill/>
+            <a:prstDash val="solid"/>
+          </a:ln>
+          <a:effectLst/>
+        </p:spPr>
+        <p:style>
+          <a:lnRef idx="3">
+            <a:schemeClr val="lt1"/>
+          </a:lnRef>
+          <a:fillRef idx="1">
+            <a:schemeClr val="accent1"/>
+          </a:fillRef>
+          <a:effectRef idx="1">
+            <a:schemeClr val="accent1"/>
+          </a:effectRef>
+          <a:fontRef idx="minor">
+            <a:schemeClr val="lt1"/>
+          </a:fontRef>
+        </p:style>
+        <p:txBody>
+          <a:bodyPr anchor="ctr"/>
+          <a:lstStyle/>
+          <a:p>
+            <a:pPr algn="ctr" eaLnBrk="1" latinLnBrk="0" hangingPunct="1"/>
+            <a:endParaRPr kumimoji="0" lang="en-US" dirty="0"/>
+          </a:p>
+        </p:txBody>
+      </p:sp>
+      <p:sp>
+        <p:nvSpPr>
+          <p:cNvPr id="36" name="Rectangle 35"/>
+          <p:cNvSpPr/>
+          <p:nvPr/>
+        </p:nvSpPr>
+        <p:spPr bwMode="invGray">
+          <a:xfrm>
+            <a:off x="9044481" y="-2001"/>
+            <a:ext cx="27432" cy="621792"/>
+          </a:xfrm>
+          <a:prstGeom prst="rect">
+            <a:avLst/>
+          </a:prstGeom>
+          <a:solidFill>
+            <a:srgbClr val="FFFFFF">
+              <a:alpha val="65098"/>
+            </a:srgbClr>
+          </a:solidFill>
+          <a:ln w="50800" cap="rnd" cmpd="thickThin" algn="ctr">
+            <a:noFill/>
+            <a:prstDash val="solid"/>
+          </a:ln>
+          <a:effectLst/>
+        </p:spPr>
+        <p:style>
+          <a:lnRef idx="3">
+            <a:schemeClr val="lt1"/>
+          </a:lnRef>
+          <a:fillRef idx="1">
+            <a:schemeClr val="accent1"/>
+          </a:fillRef>
+          <a:effectRef idx="1">
+            <a:schemeClr val="accent1"/>
+          </a:effectRef>
+          <a:fontRef idx="minor">
+            <a:schemeClr val="lt1"/>
+          </a:fontRef>
+        </p:style>
+        <p:txBody>
+          <a:bodyPr anchor="ctr"/>
+          <a:lstStyle/>
+          <a:p>
+            <a:pPr algn="ctr" eaLnBrk="1" latinLnBrk="0" hangingPunct="1"/>
+            <a:endParaRPr kumimoji="0" lang="en-US" dirty="0"/>
+          </a:p>
+        </p:txBody>
+      </p:sp>
+      <p:sp>
+        <p:nvSpPr>
+          <p:cNvPr id="37" name="Rectangle 36"/>
+          <p:cNvSpPr/>
+          <p:nvPr/>
+        </p:nvSpPr>
+        <p:spPr bwMode="invGray">
+          <a:xfrm>
+            <a:off x="9025428" y="-2001"/>
+            <a:ext cx="9144" cy="621792"/>
+          </a:xfrm>
+          <a:prstGeom prst="rect">
+            <a:avLst/>
+          </a:prstGeom>
+          <a:solidFill>
+            <a:srgbClr val="FFFFFF">
+              <a:alpha val="60000"/>
+            </a:srgbClr>
+          </a:solidFill>
+          <a:ln w="50800" cap="rnd" cmpd="thickThin" algn="ctr">
+            <a:noFill/>
+            <a:prstDash val="solid"/>
+          </a:ln>
+          <a:effectLst/>
+        </p:spPr>
+        <p:style>
+          <a:lnRef idx="3">
+            <a:schemeClr val="lt1"/>
+          </a:lnRef>
+          <a:fillRef idx="1">
+            <a:schemeClr val="accent1"/>
+          </a:fillRef>
+          <a:effectRef idx="1">
+            <a:schemeClr val="accent1"/>
+          </a:effectRef>
+          <a:fontRef idx="minor">
+            <a:schemeClr val="lt1"/>
+          </a:fontRef>
+        </p:style>
+        <p:txBody>
+          <a:bodyPr anchor="ctr"/>
+          <a:lstStyle/>
+          <a:p>
+            <a:pPr algn="ctr" eaLnBrk="1" latinLnBrk="0" hangingPunct="1"/>
+            <a:endParaRPr kumimoji="0" lang="en-US"/>
+          </a:p>
+        </p:txBody>
+      </p:sp>
+      <p:sp>
+        <p:nvSpPr>
+          <p:cNvPr id="38" name="Rectangle 37"/>
+          <p:cNvSpPr/>
+          <p:nvPr/>
+        </p:nvSpPr>
+        <p:spPr bwMode="invGray">
+          <a:xfrm>
+            <a:off x="8975423" y="-2001"/>
+            <a:ext cx="27432" cy="621792"/>
+          </a:xfrm>
+          <a:prstGeom prst="rect">
+            <a:avLst/>
+          </a:prstGeom>
+          <a:solidFill>
+            <a:srgbClr val="FFFFFF">
+              <a:alpha val="40000"/>
+            </a:srgbClr>
+          </a:solidFill>
+          <a:ln w="50800" cap="rnd" cmpd="thickThin" algn="ctr">
+            <a:noFill/>
+            <a:prstDash val="solid"/>
+          </a:ln>
+          <a:effectLst/>
+        </p:spPr>
+        <p:style>
+          <a:lnRef idx="3">
+            <a:schemeClr val="lt1"/>
+          </a:lnRef>
+          <a:fillRef idx="1">
+            <a:schemeClr val="accent1"/>
+          </a:fillRef>
+          <a:effectRef idx="1">
+            <a:schemeClr val="accent1"/>
+          </a:effectRef>
+          <a:fontRef idx="minor">
+            <a:schemeClr val="lt1"/>
+          </a:fontRef>
+        </p:style>
+        <p:txBody>
+          <a:bodyPr anchor="ctr"/>
+          <a:lstStyle/>
+          <a:p>
+            <a:pPr algn="ctr" eaLnBrk="1" latinLnBrk="0" hangingPunct="1"/>
+            <a:endParaRPr kumimoji="0" lang="en-US"/>
+          </a:p>
+        </p:txBody>
+      </p:sp>
+      <p:sp>
+        <p:nvSpPr>
+          <p:cNvPr id="39" name="Rectangle 38"/>
+          <p:cNvSpPr/>
+          <p:nvPr/>
+        </p:nvSpPr>
+        <p:spPr bwMode="invGray">
+          <a:xfrm>
+            <a:off x="8915677" y="380"/>
+            <a:ext cx="54864" cy="585216"/>
+          </a:xfrm>
+          <a:prstGeom prst="rect">
+            <a:avLst/>
+          </a:prstGeom>
+          <a:solidFill>
+            <a:srgbClr val="FFFFFF">
+              <a:alpha val="20000"/>
+            </a:srgbClr>
+          </a:solidFill>
+          <a:ln w="50800" cap="rnd" cmpd="thickThin" algn="ctr">
+            <a:noFill/>
+            <a:prstDash val="solid"/>
+          </a:ln>
+          <a:effectLst/>
+        </p:spPr>
+        <p:style>
+          <a:lnRef idx="3">
+            <a:schemeClr val="lt1"/>
+          </a:lnRef>
+          <a:fillRef idx="1">
+            <a:schemeClr val="accent1"/>
+          </a:fillRef>
+          <a:effectRef idx="1">
+            <a:schemeClr val="accent1"/>
+          </a:effectRef>
+          <a:fontRef idx="minor">
+            <a:schemeClr val="lt1"/>
+          </a:fontRef>
+        </p:style>
+        <p:txBody>
+          <a:bodyPr anchor="ctr"/>
+          <a:lstStyle/>
+          <a:p>
+            <a:pPr algn="ctr" eaLnBrk="1" latinLnBrk="0" hangingPunct="1"/>
+            <a:endParaRPr kumimoji="0" lang="en-US"/>
+          </a:p>
+        </p:txBody>
+      </p:sp>
+      <p:sp>
+        <p:nvSpPr>
+          <p:cNvPr id="40" name="Rectangle 39"/>
+          <p:cNvSpPr/>
+          <p:nvPr/>
+        </p:nvSpPr>
+        <p:spPr bwMode="invGray">
+          <a:xfrm>
+            <a:off x="8873475" y="380"/>
+            <a:ext cx="9144" cy="585216"/>
+          </a:xfrm>
+          <a:prstGeom prst="rect">
+            <a:avLst/>
+          </a:prstGeom>
+          <a:solidFill>
+            <a:srgbClr val="FFFFFF">
+              <a:alpha val="30196"/>
+            </a:srgbClr>
+          </a:solidFill>
+          <a:ln w="50800" cap="rnd" cmpd="thickThin" algn="ctr">
+            <a:noFill/>
+            <a:prstDash val="solid"/>
+          </a:ln>
+          <a:effectLst/>
+        </p:spPr>
+        <p:style>
+          <a:lnRef idx="3">
+            <a:schemeClr val="lt1"/>
+          </a:lnRef>
+          <a:fillRef idx="1">
+            <a:schemeClr val="accent1"/>
+          </a:fillRef>
+          <a:effectRef idx="1">
+            <a:schemeClr val="accent1"/>
+          </a:effectRef>
+          <a:fontRef idx="minor">
+            <a:schemeClr val="lt1"/>
+          </a:fontRef>
+        </p:style>
+        <p:txBody>
+          <a:bodyPr anchor="ctr"/>
+          <a:lstStyle/>
+          <a:p>
+            <a:pPr algn="ctr" eaLnBrk="1" latinLnBrk="0" hangingPunct="1"/>
+            <a:endParaRPr kumimoji="0" lang="en-US" dirty="0"/>
+          </a:p>
+        </p:txBody>
+      </p:sp>
+      <p:sp>
+        <p:nvSpPr>
+          <p:cNvPr id="22" name="Title Placeholder 21"/>
+          <p:cNvSpPr>
+            <a:spLocks noGrp="1"/>
+          </p:cNvSpPr>
+          <p:nvPr>
+            <p:ph type="title"/>
+          </p:nvPr>
+        </p:nvSpPr>
+        <p:spPr>
+          <a:xfrm>
+            <a:off x="457200" y="1143000"/>
+            <a:ext cx="8229600" cy="1066800"/>
+          </a:xfrm>
+          <a:prstGeom prst="rect">
+            <a:avLst/>
+          </a:prstGeom>
+        </p:spPr>
+        <p:txBody>
+          <a:bodyPr vert="horz" anchor="ctr">
+            <a:normAutofit/>
+          </a:bodyPr>
+          <a:lstStyle/>
+          <a:p>
+            <a:r>
+              <a:rPr kumimoji="0" lang="en-US" smtClean="0"/>
+              <a:t>Click to edit Master title style</a:t>
+            </a:r>
+            <a:endParaRPr kumimoji="0" lang="en-US"/>
+          </a:p>
+        </p:txBody>
+      </p:sp>
+      <p:sp>
+        <p:nvSpPr>
+          <p:cNvPr id="13" name="Text Placeholder 12"/>
+          <p:cNvSpPr>
+            <a:spLocks noGrp="1"/>
+          </p:cNvSpPr>
+          <p:nvPr>
+            <p:ph type="body" idx="1"/>
+          </p:nvPr>
+        </p:nvSpPr>
+        <p:spPr>
+          <a:xfrm>
+            <a:off x="457200" y="2249424"/>
+            <a:ext cx="8229600" cy="4325112"/>
+          </a:xfrm>
+          <a:prstGeom prst="rect">
+            <a:avLst/>
+          </a:prstGeom>
+        </p:spPr>
+        <p:txBody>
+          <a:bodyPr vert="horz">
+            <a:normAutofit/>
+          </a:bodyPr>
+          <a:lstStyle/>
+          <a:p>
+            <a:pPr lvl="0" eaLnBrk="1" latinLnBrk="0" hangingPunct="1"/>
+            <a:r>
+              <a:rPr kumimoji="0" lang="en-US" smtClean="0"/>
+              <a:t>Click to edit Master text styles</a:t>
+            </a:r>
+          </a:p>
+          <a:p>
+            <a:pPr lvl="1" eaLnBrk="1" latinLnBrk="0" hangingPunct="1"/>
+            <a:r>
+              <a:rPr kumimoji="0" lang="en-US" smtClean="0"/>
+              <a:t>Second level</a:t>
+            </a:r>
+          </a:p>
+          <a:p>
+            <a:pPr lvl="2" eaLnBrk="1" latinLnBrk="0" hangingPunct="1"/>
+            <a:r>
+              <a:rPr kumimoji="0" lang="en-US" smtClean="0"/>
+              <a:t>Third level</a:t>
+            </a:r>
+          </a:p>
+          <a:p>
+            <a:pPr lvl="3" eaLnBrk="1" latinLnBrk="0" hangingPunct="1"/>
+            <a:r>
+              <a:rPr kumimoji="0" lang="en-US" smtClean="0"/>
+              <a:t>Fourth level</a:t>
+            </a:r>
+          </a:p>
+          <a:p>
+            <a:pPr lvl="4" eaLnBrk="1" latinLnBrk="0" hangingPunct="1"/>
+            <a:r>
+              <a:rPr kumimoji="0" lang="en-US" smtClean="0"/>
+              <a:t>Fifth level</a:t>
+            </a:r>
+            <a:endParaRPr kumimoji="0" lang="en-US"/>
+          </a:p>
+        </p:txBody>
+      </p:sp>
+      <p:sp>
+        <p:nvSpPr>
+          <p:cNvPr id="14" name="Date Placeholder 13"/>
+          <p:cNvSpPr>
+            <a:spLocks noGrp="1"/>
+          </p:cNvSpPr>
+          <p:nvPr>
+            <p:ph type="dt" sz="half" idx="2"/>
+          </p:nvPr>
+        </p:nvSpPr>
+        <p:spPr>
+          <a:xfrm>
+            <a:off x="6586536" y="612648"/>
+            <a:ext cx="957264" cy="457200"/>
+          </a:xfrm>
+          <a:prstGeom prst="rect">
+            <a:avLst/>
+          </a:prstGeom>
+        </p:spPr>
+        <p:txBody>
+          <a:bodyPr vert="horz"/>
           <a:lstStyle>
-            <a:lvl1pPr algn="l">
-              <a:defRPr sz="1200">
+            <a:lvl1pPr algn="l" eaLnBrk="1" latinLnBrk="0" hangingPunct="1">
+              <a:defRPr kumimoji="0" sz="800">
                 <a:solidFill>
-                  <a:schemeClr val="tx1">
-                    <a:tint val="75000"/>
-                  </a:schemeClr>
+                  <a:schemeClr val="accent2"/>
                 </a:solidFill>
               </a:defRPr>
             </a:lvl1pPr>
@@ -2720,7 +3717,7 @@
           <a:p>
             <a:fld id="{7F104D85-F20C-42E7-AB62-E5B99C7A82F1}" type="datetimeFigureOut">
               <a:rPr lang="uk-UA" smtClean="0"/>
-              <a:t>25.01.2024</a:t>
+              <a:t>26.01.2024</a:t>
             </a:fld>
             <a:endParaRPr lang="uk-UA"/>
           </a:p>
@@ -2728,7 +3725,7 @@
       </p:sp>
       <p:sp>
         <p:nvSpPr>
-          <p:cNvPr id="5" name="Footer Placeholder 4"/>
+          <p:cNvPr id="3" name="Footer Placeholder 2"/>
           <p:cNvSpPr>
             <a:spLocks noGrp="1"/>
           </p:cNvSpPr>
@@ -2738,22 +3735,20 @@
         </p:nvSpPr>
         <p:spPr>
           <a:xfrm>
-            <a:off x="3124200" y="6356350"/>
-            <a:ext cx="2895600" cy="365125"/>
+            <a:off x="5257800" y="612648"/>
+            <a:ext cx="1325880" cy="457200"/>
           </a:xfrm>
           <a:prstGeom prst="rect">
             <a:avLst/>
           </a:prstGeom>
         </p:spPr>
         <p:txBody>
-          <a:bodyPr vert="horz" lIns="91440" tIns="45720" rIns="91440" bIns="45720" rtlCol="0" anchor="ctr"/>
+          <a:bodyPr vert="horz"/>
           <a:lstStyle>
-            <a:lvl1pPr algn="ctr">
-              <a:defRPr sz="1200">
+            <a:lvl1pPr algn="r" eaLnBrk="1" latinLnBrk="0" hangingPunct="1">
+              <a:defRPr kumimoji="0" sz="800">
                 <a:solidFill>
-                  <a:schemeClr val="tx1">
-                    <a:tint val="75000"/>
-                  </a:schemeClr>
+                  <a:schemeClr val="accent2"/>
                 </a:solidFill>
               </a:defRPr>
             </a:lvl1pPr>
@@ -2765,7 +3760,7 @@
       </p:sp>
       <p:sp>
         <p:nvSpPr>
-          <p:cNvPr id="6" name="Slide Number Placeholder 5"/>
+          <p:cNvPr id="23" name="Slide Number Placeholder 22"/>
           <p:cNvSpPr>
             <a:spLocks noGrp="1"/>
           </p:cNvSpPr>
@@ -2775,22 +3770,20 @@
         </p:nvSpPr>
         <p:spPr>
           <a:xfrm>
-            <a:off x="6553200" y="6356350"/>
-            <a:ext cx="2133600" cy="365125"/>
+            <a:off x="8174736" y="2272"/>
+            <a:ext cx="762000" cy="365760"/>
           </a:xfrm>
           <a:prstGeom prst="rect">
             <a:avLst/>
           </a:prstGeom>
         </p:spPr>
         <p:txBody>
-          <a:bodyPr vert="horz" lIns="91440" tIns="45720" rIns="91440" bIns="45720" rtlCol="0" anchor="ctr"/>
+          <a:bodyPr vert="horz" anchor="b"/>
           <a:lstStyle>
-            <a:lvl1pPr algn="r">
-              <a:defRPr sz="1200">
+            <a:lvl1pPr algn="r" eaLnBrk="1" latinLnBrk="0" hangingPunct="1">
+              <a:defRPr kumimoji="0" sz="1800">
                 <a:solidFill>
-                  <a:schemeClr val="tx1">
-                    <a:tint val="75000"/>
-                  </a:schemeClr>
+                  <a:srgbClr val="FFFFFF"/>
                 </a:solidFill>
               </a:defRPr>
             </a:lvl1pPr>
@@ -2805,36 +3798,31 @@
         </p:txBody>
       </p:sp>
     </p:spTree>
-    <p:extLst>
-      <p:ext uri="{BB962C8B-B14F-4D97-AF65-F5344CB8AC3E}">
-        <p14:creationId xmlns:p14="http://schemas.microsoft.com/office/powerpoint/2010/main" val="3769291164"/>
-      </p:ext>
-    </p:extLst>
   </p:cSld>
   <p:clrMap bg1="lt1" tx1="dk1" bg2="lt2" tx2="dk2" accent1="accent1" accent2="accent2" accent3="accent3" accent4="accent4" accent5="accent5" accent6="accent6" hlink="hlink" folHlink="folHlink"/>
   <p:sldLayoutIdLst>
-    <p:sldLayoutId id="2147483649" r:id="rId1"/>
-    <p:sldLayoutId id="2147483650" r:id="rId2"/>
-    <p:sldLayoutId id="2147483651" r:id="rId3"/>
-    <p:sldLayoutId id="2147483652" r:id="rId4"/>
-    <p:sldLayoutId id="2147483653" r:id="rId5"/>
-    <p:sldLayoutId id="2147483654" r:id="rId6"/>
-    <p:sldLayoutId id="2147483655" r:id="rId7"/>
-    <p:sldLayoutId id="2147483656" r:id="rId8"/>
-    <p:sldLayoutId id="2147483657" r:id="rId9"/>
-    <p:sldLayoutId id="2147483658" r:id="rId10"/>
-    <p:sldLayoutId id="2147483659" r:id="rId11"/>
+    <p:sldLayoutId id="2147483661" r:id="rId1"/>
+    <p:sldLayoutId id="2147483662" r:id="rId2"/>
+    <p:sldLayoutId id="2147483663" r:id="rId3"/>
+    <p:sldLayoutId id="2147483664" r:id="rId4"/>
+    <p:sldLayoutId id="2147483665" r:id="rId5"/>
+    <p:sldLayoutId id="2147483666" r:id="rId6"/>
+    <p:sldLayoutId id="2147483667" r:id="rId7"/>
+    <p:sldLayoutId id="2147483668" r:id="rId8"/>
+    <p:sldLayoutId id="2147483669" r:id="rId9"/>
+    <p:sldLayoutId id="2147483670" r:id="rId10"/>
+    <p:sldLayoutId id="2147483671" r:id="rId11"/>
   </p:sldLayoutIdLst>
   <p:txStyles>
     <p:titleStyle>
-      <a:lvl1pPr algn="ctr" defTabSz="914400" rtl="0" eaLnBrk="1" latinLnBrk="0" hangingPunct="1">
+      <a:lvl1pPr algn="l" rtl="0" eaLnBrk="1" latinLnBrk="0" hangingPunct="1">
         <a:spcBef>
           <a:spcPct val="0"/>
         </a:spcBef>
         <a:buNone/>
-        <a:defRPr sz="4400" kern="1200">
+        <a:defRPr kumimoji="0" sz="4000" kern="1200">
           <a:solidFill>
-            <a:schemeClr val="tx1"/>
+            <a:schemeClr val="tx2"/>
           </a:solidFill>
           <a:latin typeface="+mj-lt"/>
           <a:ea typeface="+mj-ea"/>
@@ -2843,13 +3831,16 @@
       </a:lvl1pPr>
     </p:titleStyle>
     <p:bodyStyle>
-      <a:lvl1pPr marL="342900" indent="-342900" algn="l" defTabSz="914400" rtl="0" eaLnBrk="1" latinLnBrk="0" hangingPunct="1">
+      <a:lvl1pPr marL="365760" indent="-256032" algn="l" rtl="0" eaLnBrk="1" latinLnBrk="0" hangingPunct="1">
         <a:spcBef>
-          <a:spcPct val="20000"/>
+          <a:spcPts val="300"/>
         </a:spcBef>
-        <a:buFont typeface="Arial" panose="020B0604020202020204" pitchFamily="34" charset="0"/>
+        <a:buClr>
+          <a:schemeClr val="accent3"/>
+        </a:buClr>
+        <a:buFont typeface="Georgia"/>
         <a:buChar char="•"/>
-        <a:defRPr sz="3200" kern="1200">
+        <a:defRPr kumimoji="0" sz="2800" kern="1200">
           <a:solidFill>
             <a:schemeClr val="tx1"/>
           </a:solidFill>
@@ -2858,13 +3849,164 @@
           <a:cs typeface="+mn-cs"/>
         </a:defRPr>
       </a:lvl1pPr>
-      <a:lvl2pPr marL="742950" indent="-285750" algn="l" defTabSz="914400" rtl="0" eaLnBrk="1" latinLnBrk="0" hangingPunct="1">
+      <a:lvl2pPr marL="658368" indent="-246888" algn="l" rtl="0" eaLnBrk="1" latinLnBrk="0" hangingPunct="1">
         <a:spcBef>
-          <a:spcPct val="20000"/>
+          <a:spcPts val="300"/>
         </a:spcBef>
-        <a:buFont typeface="Arial" panose="020B0604020202020204" pitchFamily="34" charset="0"/>
-        <a:buChar char="–"/>
-        <a:defRPr sz="2800" kern="1200">
+        <a:buClr>
+          <a:schemeClr val="accent2"/>
+        </a:buClr>
+        <a:buFont typeface="Georgia"/>
+        <a:buChar char="▫"/>
+        <a:defRPr kumimoji="0" sz="2600" kern="1200">
+          <a:solidFill>
+            <a:schemeClr val="accent2"/>
+          </a:solidFill>
+          <a:latin typeface="+mn-lt"/>
+          <a:ea typeface="+mn-ea"/>
+          <a:cs typeface="+mn-cs"/>
+        </a:defRPr>
+      </a:lvl2pPr>
+      <a:lvl3pPr marL="923544" indent="-219456" algn="l" rtl="0" eaLnBrk="1" latinLnBrk="0" hangingPunct="1">
+        <a:spcBef>
+          <a:spcPts val="300"/>
+        </a:spcBef>
+        <a:buClr>
+          <a:schemeClr val="accent1"/>
+        </a:buClr>
+        <a:buFont typeface="Wingdings 2"/>
+        <a:buChar char=""/>
+        <a:defRPr kumimoji="0" sz="2400" kern="1200">
+          <a:solidFill>
+            <a:schemeClr val="accent1"/>
+          </a:solidFill>
+          <a:latin typeface="+mn-lt"/>
+          <a:ea typeface="+mn-ea"/>
+          <a:cs typeface="+mn-cs"/>
+        </a:defRPr>
+      </a:lvl3pPr>
+      <a:lvl4pPr marL="1179576" indent="-201168" algn="l" rtl="0" eaLnBrk="1" latinLnBrk="0" hangingPunct="1">
+        <a:spcBef>
+          <a:spcPts val="300"/>
+        </a:spcBef>
+        <a:buClr>
+          <a:schemeClr val="accent1"/>
+        </a:buClr>
+        <a:buFont typeface="Wingdings 2"/>
+        <a:buChar char=""/>
+        <a:defRPr kumimoji="0" sz="2200" kern="1200">
+          <a:solidFill>
+            <a:schemeClr val="accent1"/>
+          </a:solidFill>
+          <a:latin typeface="+mn-lt"/>
+          <a:ea typeface="+mn-ea"/>
+          <a:cs typeface="+mn-cs"/>
+        </a:defRPr>
+      </a:lvl4pPr>
+      <a:lvl5pPr marL="1389888" indent="-182880" algn="l" rtl="0" eaLnBrk="1" latinLnBrk="0" hangingPunct="1">
+        <a:spcBef>
+          <a:spcPts val="300"/>
+        </a:spcBef>
+        <a:buClr>
+          <a:schemeClr val="accent3"/>
+        </a:buClr>
+        <a:buFont typeface="Georgia"/>
+        <a:buChar char="▫"/>
+        <a:defRPr kumimoji="0" sz="2000" kern="1200">
+          <a:solidFill>
+            <a:schemeClr val="accent3"/>
+          </a:solidFill>
+          <a:latin typeface="+mn-lt"/>
+          <a:ea typeface="+mn-ea"/>
+          <a:cs typeface="+mn-cs"/>
+        </a:defRPr>
+      </a:lvl5pPr>
+      <a:lvl6pPr marL="1609344" indent="-182880" algn="l" rtl="0" eaLnBrk="1" latinLnBrk="0" hangingPunct="1">
+        <a:spcBef>
+          <a:spcPts val="300"/>
+        </a:spcBef>
+        <a:buClr>
+          <a:schemeClr val="accent3"/>
+        </a:buClr>
+        <a:buFont typeface="Georgia"/>
+        <a:buChar char="▫"/>
+        <a:defRPr kumimoji="0" sz="1800" kern="1200">
+          <a:solidFill>
+            <a:schemeClr val="accent3"/>
+          </a:solidFill>
+          <a:latin typeface="+mn-lt"/>
+          <a:ea typeface="+mn-ea"/>
+          <a:cs typeface="+mn-cs"/>
+        </a:defRPr>
+      </a:lvl6pPr>
+      <a:lvl7pPr marL="1828800" indent="-182880" algn="l" rtl="0" eaLnBrk="1" latinLnBrk="0" hangingPunct="1">
+        <a:spcBef>
+          <a:spcPts val="300"/>
+        </a:spcBef>
+        <a:buClr>
+          <a:schemeClr val="accent3"/>
+        </a:buClr>
+        <a:buFont typeface="Georgia"/>
+        <a:buChar char="▫"/>
+        <a:defRPr kumimoji="0" sz="1600" kern="1200">
+          <a:solidFill>
+            <a:schemeClr val="accent3"/>
+          </a:solidFill>
+          <a:latin typeface="+mn-lt"/>
+          <a:ea typeface="+mn-ea"/>
+          <a:cs typeface="+mn-cs"/>
+        </a:defRPr>
+      </a:lvl7pPr>
+      <a:lvl8pPr marL="2029968" indent="-182880" algn="l" rtl="0" eaLnBrk="1" latinLnBrk="0" hangingPunct="1">
+        <a:spcBef>
+          <a:spcPts val="300"/>
+        </a:spcBef>
+        <a:buClr>
+          <a:schemeClr val="accent3"/>
+        </a:buClr>
+        <a:buFont typeface="Georgia"/>
+        <a:buChar char="◦"/>
+        <a:defRPr kumimoji="0" sz="1500" kern="1200">
+          <a:solidFill>
+            <a:schemeClr val="accent3"/>
+          </a:solidFill>
+          <a:latin typeface="+mn-lt"/>
+          <a:ea typeface="+mn-ea"/>
+          <a:cs typeface="+mn-cs"/>
+        </a:defRPr>
+      </a:lvl8pPr>
+      <a:lvl9pPr marL="2240280" indent="-182880" algn="l" rtl="0" eaLnBrk="1" latinLnBrk="0" hangingPunct="1">
+        <a:spcBef>
+          <a:spcPts val="300"/>
+        </a:spcBef>
+        <a:buClr>
+          <a:schemeClr val="accent3"/>
+        </a:buClr>
+        <a:buFont typeface="Georgia"/>
+        <a:buChar char="◦"/>
+        <a:defRPr kumimoji="0" sz="1400" kern="1200" baseline="0">
+          <a:solidFill>
+            <a:schemeClr val="accent3"/>
+          </a:solidFill>
+          <a:latin typeface="+mn-lt"/>
+          <a:ea typeface="+mn-ea"/>
+          <a:cs typeface="+mn-cs"/>
+        </a:defRPr>
+      </a:lvl9pPr>
+    </p:bodyStyle>
+    <p:otherStyle>
+      <a:lvl1pPr marL="0" algn="l" rtl="0" eaLnBrk="1" latinLnBrk="0" hangingPunct="1">
+        <a:defRPr kumimoji="0" kern="1200">
+          <a:solidFill>
+            <a:schemeClr val="tx1"/>
+          </a:solidFill>
+          <a:latin typeface="+mn-lt"/>
+          <a:ea typeface="+mn-ea"/>
+          <a:cs typeface="+mn-cs"/>
+        </a:defRPr>
+      </a:lvl1pPr>
+      <a:lvl2pPr marL="457200" algn="l" rtl="0" eaLnBrk="1" latinLnBrk="0" hangingPunct="1">
+        <a:defRPr kumimoji="0" kern="1200">
           <a:solidFill>
             <a:schemeClr val="tx1"/>
           </a:solidFill>
@@ -2873,13 +4015,8 @@
           <a:cs typeface="+mn-cs"/>
         </a:defRPr>
       </a:lvl2pPr>
-      <a:lvl3pPr marL="1143000" indent="-228600" algn="l" defTabSz="914400" rtl="0" eaLnBrk="1" latinLnBrk="0" hangingPunct="1">
-        <a:spcBef>
-          <a:spcPct val="20000"/>
-        </a:spcBef>
-        <a:buFont typeface="Arial" panose="020B0604020202020204" pitchFamily="34" charset="0"/>
-        <a:buChar char="•"/>
-        <a:defRPr sz="2400" kern="1200">
+      <a:lvl3pPr marL="914400" algn="l" rtl="0" eaLnBrk="1" latinLnBrk="0" hangingPunct="1">
+        <a:defRPr kumimoji="0" kern="1200">
           <a:solidFill>
             <a:schemeClr val="tx1"/>
           </a:solidFill>
@@ -2888,13 +4025,8 @@
           <a:cs typeface="+mn-cs"/>
         </a:defRPr>
       </a:lvl3pPr>
-      <a:lvl4pPr marL="1600200" indent="-228600" algn="l" defTabSz="914400" rtl="0" eaLnBrk="1" latinLnBrk="0" hangingPunct="1">
-        <a:spcBef>
-          <a:spcPct val="20000"/>
-        </a:spcBef>
-        <a:buFont typeface="Arial" panose="020B0604020202020204" pitchFamily="34" charset="0"/>
-        <a:buChar char="–"/>
-        <a:defRPr sz="2000" kern="1200">
+      <a:lvl4pPr marL="1371600" algn="l" rtl="0" eaLnBrk="1" latinLnBrk="0" hangingPunct="1">
+        <a:defRPr kumimoji="0" kern="1200">
           <a:solidFill>
             <a:schemeClr val="tx1"/>
           </a:solidFill>
@@ -2903,13 +4035,8 @@
           <a:cs typeface="+mn-cs"/>
         </a:defRPr>
       </a:lvl4pPr>
-      <a:lvl5pPr marL="2057400" indent="-228600" algn="l" defTabSz="914400" rtl="0" eaLnBrk="1" latinLnBrk="0" hangingPunct="1">
-        <a:spcBef>
-          <a:spcPct val="20000"/>
-        </a:spcBef>
-        <a:buFont typeface="Arial" panose="020B0604020202020204" pitchFamily="34" charset="0"/>
-        <a:buChar char="»"/>
-        <a:defRPr sz="2000" kern="1200">
+      <a:lvl5pPr marL="1828800" algn="l" rtl="0" eaLnBrk="1" latinLnBrk="0" hangingPunct="1">
+        <a:defRPr kumimoji="0" kern="1200">
           <a:solidFill>
             <a:schemeClr val="tx1"/>
           </a:solidFill>
@@ -2918,13 +4045,8 @@
           <a:cs typeface="+mn-cs"/>
         </a:defRPr>
       </a:lvl5pPr>
-      <a:lvl6pPr marL="2514600" indent="-228600" algn="l" defTabSz="914400" rtl="0" eaLnBrk="1" latinLnBrk="0" hangingPunct="1">
-        <a:spcBef>
-          <a:spcPct val="20000"/>
-        </a:spcBef>
-        <a:buFont typeface="Arial" panose="020B0604020202020204" pitchFamily="34" charset="0"/>
-        <a:buChar char="•"/>
-        <a:defRPr sz="2000" kern="1200">
+      <a:lvl6pPr marL="2286000" algn="l" rtl="0" eaLnBrk="1" latinLnBrk="0" hangingPunct="1">
+        <a:defRPr kumimoji="0" kern="1200">
           <a:solidFill>
             <a:schemeClr val="tx1"/>
           </a:solidFill>
@@ -2933,13 +4055,8 @@
           <a:cs typeface="+mn-cs"/>
         </a:defRPr>
       </a:lvl6pPr>
-      <a:lvl7pPr marL="2971800" indent="-228600" algn="l" defTabSz="914400" rtl="0" eaLnBrk="1" latinLnBrk="0" hangingPunct="1">
-        <a:spcBef>
-          <a:spcPct val="20000"/>
-        </a:spcBef>
-        <a:buFont typeface="Arial" panose="020B0604020202020204" pitchFamily="34" charset="0"/>
-        <a:buChar char="•"/>
-        <a:defRPr sz="2000" kern="1200">
+      <a:lvl7pPr marL="2743200" algn="l" rtl="0" eaLnBrk="1" latinLnBrk="0" hangingPunct="1">
+        <a:defRPr kumimoji="0" kern="1200">
           <a:solidFill>
             <a:schemeClr val="tx1"/>
           </a:solidFill>
@@ -2948,13 +4065,8 @@
           <a:cs typeface="+mn-cs"/>
         </a:defRPr>
       </a:lvl7pPr>
-      <a:lvl8pPr marL="3429000" indent="-228600" algn="l" defTabSz="914400" rtl="0" eaLnBrk="1" latinLnBrk="0" hangingPunct="1">
-        <a:spcBef>
-          <a:spcPct val="20000"/>
-        </a:spcBef>
-        <a:buFont typeface="Arial" panose="020B0604020202020204" pitchFamily="34" charset="0"/>
-        <a:buChar char="•"/>
-        <a:defRPr sz="2000" kern="1200">
+      <a:lvl8pPr marL="3200400" algn="l" rtl="0" eaLnBrk="1" latinLnBrk="0" hangingPunct="1">
+        <a:defRPr kumimoji="0" kern="1200">
           <a:solidFill>
             <a:schemeClr val="tx1"/>
           </a:solidFill>
@@ -2963,108 +4075,8 @@
           <a:cs typeface="+mn-cs"/>
         </a:defRPr>
       </a:lvl8pPr>
-      <a:lvl9pPr marL="3886200" indent="-228600" algn="l" defTabSz="914400" rtl="0" eaLnBrk="1" latinLnBrk="0" hangingPunct="1">
-        <a:spcBef>
-          <a:spcPct val="20000"/>
-        </a:spcBef>
-        <a:buFont typeface="Arial" panose="020B0604020202020204" pitchFamily="34" charset="0"/>
-        <a:buChar char="•"/>
-        <a:defRPr sz="2000" kern="1200">
-          <a:solidFill>
-            <a:schemeClr val="tx1"/>
-          </a:solidFill>
-          <a:latin typeface="+mn-lt"/>
-          <a:ea typeface="+mn-ea"/>
-          <a:cs typeface="+mn-cs"/>
-        </a:defRPr>
-      </a:lvl9pPr>
-    </p:bodyStyle>
-    <p:otherStyle>
-      <a:defPPr>
-        <a:defRPr lang="uk-UA"/>
-      </a:defPPr>
-      <a:lvl1pPr marL="0" algn="l" defTabSz="914400" rtl="0" eaLnBrk="1" latinLnBrk="0" hangingPunct="1">
-        <a:defRPr sz="1800" kern="1200">
-          <a:solidFill>
-            <a:schemeClr val="tx1"/>
-          </a:solidFill>
-          <a:latin typeface="+mn-lt"/>
-          <a:ea typeface="+mn-ea"/>
-          <a:cs typeface="+mn-cs"/>
-        </a:defRPr>
-      </a:lvl1pPr>
-      <a:lvl2pPr marL="457200" algn="l" defTabSz="914400" rtl="0" eaLnBrk="1" latinLnBrk="0" hangingPunct="1">
-        <a:defRPr sz="1800" kern="1200">
-          <a:solidFill>
-            <a:schemeClr val="tx1"/>
-          </a:solidFill>
-          <a:latin typeface="+mn-lt"/>
-          <a:ea typeface="+mn-ea"/>
-          <a:cs typeface="+mn-cs"/>
-        </a:defRPr>
-      </a:lvl2pPr>
-      <a:lvl3pPr marL="914400" algn="l" defTabSz="914400" rtl="0" eaLnBrk="1" latinLnBrk="0" hangingPunct="1">
-        <a:defRPr sz="1800" kern="1200">
-          <a:solidFill>
-            <a:schemeClr val="tx1"/>
-          </a:solidFill>
-          <a:latin typeface="+mn-lt"/>
-          <a:ea typeface="+mn-ea"/>
-          <a:cs typeface="+mn-cs"/>
-        </a:defRPr>
-      </a:lvl3pPr>
-      <a:lvl4pPr marL="1371600" algn="l" defTabSz="914400" rtl="0" eaLnBrk="1" latinLnBrk="0" hangingPunct="1">
-        <a:defRPr sz="1800" kern="1200">
-          <a:solidFill>
-            <a:schemeClr val="tx1"/>
-          </a:solidFill>
-          <a:latin typeface="+mn-lt"/>
-          <a:ea typeface="+mn-ea"/>
-          <a:cs typeface="+mn-cs"/>
-        </a:defRPr>
-      </a:lvl4pPr>
-      <a:lvl5pPr marL="1828800" algn="l" defTabSz="914400" rtl="0" eaLnBrk="1" latinLnBrk="0" hangingPunct="1">
-        <a:defRPr sz="1800" kern="1200">
-          <a:solidFill>
-            <a:schemeClr val="tx1"/>
-          </a:solidFill>
-          <a:latin typeface="+mn-lt"/>
-          <a:ea typeface="+mn-ea"/>
-          <a:cs typeface="+mn-cs"/>
-        </a:defRPr>
-      </a:lvl5pPr>
-      <a:lvl6pPr marL="2286000" algn="l" defTabSz="914400" rtl="0" eaLnBrk="1" latinLnBrk="0" hangingPunct="1">
-        <a:defRPr sz="1800" kern="1200">
-          <a:solidFill>
-            <a:schemeClr val="tx1"/>
-          </a:solidFill>
-          <a:latin typeface="+mn-lt"/>
-          <a:ea typeface="+mn-ea"/>
-          <a:cs typeface="+mn-cs"/>
-        </a:defRPr>
-      </a:lvl6pPr>
-      <a:lvl7pPr marL="2743200" algn="l" defTabSz="914400" rtl="0" eaLnBrk="1" latinLnBrk="0" hangingPunct="1">
-        <a:defRPr sz="1800" kern="1200">
-          <a:solidFill>
-            <a:schemeClr val="tx1"/>
-          </a:solidFill>
-          <a:latin typeface="+mn-lt"/>
-          <a:ea typeface="+mn-ea"/>
-          <a:cs typeface="+mn-cs"/>
-        </a:defRPr>
-      </a:lvl7pPr>
-      <a:lvl8pPr marL="3200400" algn="l" defTabSz="914400" rtl="0" eaLnBrk="1" latinLnBrk="0" hangingPunct="1">
-        <a:defRPr sz="1800" kern="1200">
-          <a:solidFill>
-            <a:schemeClr val="tx1"/>
-          </a:solidFill>
-          <a:latin typeface="+mn-lt"/>
-          <a:ea typeface="+mn-ea"/>
-          <a:cs typeface="+mn-cs"/>
-        </a:defRPr>
-      </a:lvl8pPr>
-      <a:lvl9pPr marL="3657600" algn="l" defTabSz="914400" rtl="0" eaLnBrk="1" latinLnBrk="0" hangingPunct="1">
-        <a:defRPr sz="1800" kern="1200">
+      <a:lvl9pPr marL="3657600" algn="l" rtl="0" eaLnBrk="1" latinLnBrk="0" hangingPunct="1">
+        <a:defRPr kumimoji="0" kern="1200">
           <a:solidFill>
             <a:schemeClr val="tx1"/>
           </a:solidFill>
@@ -3105,11 +4117,20 @@
             <p:ph type="ctrTitle"/>
           </p:nvPr>
         </p:nvSpPr>
-        <p:spPr/>
+        <p:spPr>
+          <a:xfrm>
+            <a:off x="457200" y="2204865"/>
+            <a:ext cx="8458200" cy="1512167"/>
+          </a:xfrm>
+        </p:spPr>
         <p:txBody>
           <a:bodyPr/>
           <a:lstStyle/>
           <a:p>
+            <a:r>
+              <a:rPr lang="en-US" smtClean="0"/>
+              <a:t>ML4A Project: ASHRAE Dataset</a:t>
+            </a:r>
             <a:endParaRPr lang="uk-UA"/>
           </a:p>
         </p:txBody>
@@ -3124,12 +4145,256 @@
             <p:ph type="subTitle" idx="1"/>
           </p:nvPr>
         </p:nvSpPr>
-        <p:spPr/>
-        <p:txBody>
-          <a:bodyPr/>
-          <a:lstStyle/>
-          <a:p>
-            <a:endParaRPr lang="uk-UA"/>
+        <p:spPr>
+          <a:xfrm>
+            <a:off x="4175448" y="4149080"/>
+            <a:ext cx="4968552" cy="1440160"/>
+          </a:xfrm>
+        </p:spPr>
+        <p:txBody>
+          <a:bodyPr>
+            <a:normAutofit/>
+          </a:bodyPr>
+          <a:lstStyle/>
+          <a:p>
+            <a:pPr algn="ctr"/>
+            <a:r>
+              <a:rPr lang="en-US" b="1" smtClean="0"/>
+              <a:t>Supervisor</a:t>
+            </a:r>
+            <a:endParaRPr lang="en-US"/>
+          </a:p>
+          <a:p>
+            <a:pPr algn="ctr"/>
+            <a:r>
+              <a:rPr lang="en-US" smtClean="0"/>
+              <a:t>Prof</a:t>
+            </a:r>
+            <a:r>
+              <a:rPr lang="en-US"/>
+              <a:t>. </a:t>
+            </a:r>
+            <a:r>
+              <a:rPr lang="en-US"/>
+              <a:t>Alessandro </a:t>
+            </a:r>
+            <a:r>
+              <a:rPr lang="en-US" smtClean="0"/>
+              <a:t>D'Innocenzo</a:t>
+            </a:r>
+            <a:endParaRPr lang="en-US"/>
+          </a:p>
+        </p:txBody>
+      </p:sp>
+      <p:sp>
+        <p:nvSpPr>
+          <p:cNvPr id="4" name="Subtitle 2"/>
+          <p:cNvSpPr txBox="1">
+            <a:spLocks/>
+          </p:cNvSpPr>
+          <p:nvPr/>
+        </p:nvSpPr>
+        <p:spPr>
+          <a:xfrm>
+            <a:off x="323528" y="4149080"/>
+            <a:ext cx="4176464" cy="1440160"/>
+          </a:xfrm>
+          <a:prstGeom prst="rect">
+            <a:avLst/>
+          </a:prstGeom>
+        </p:spPr>
+        <p:txBody>
+          <a:bodyPr vert="horz">
+            <a:normAutofit/>
+          </a:bodyPr>
+          <a:lstStyle>
+            <a:lvl1pPr marL="64008" indent="0" algn="l" rtl="0" eaLnBrk="1" latinLnBrk="0" hangingPunct="1">
+              <a:spcBef>
+                <a:spcPts val="300"/>
+              </a:spcBef>
+              <a:buClr>
+                <a:schemeClr val="accent3"/>
+              </a:buClr>
+              <a:buFont typeface="Georgia"/>
+              <a:buNone/>
+              <a:defRPr kumimoji="0" sz="2400" kern="1200">
+                <a:solidFill>
+                  <a:schemeClr val="tx2"/>
+                </a:solidFill>
+                <a:latin typeface="+mn-lt"/>
+                <a:ea typeface="+mn-ea"/>
+                <a:cs typeface="+mn-cs"/>
+              </a:defRPr>
+            </a:lvl1pPr>
+            <a:lvl2pPr marL="457200" indent="0" algn="ctr" rtl="0" eaLnBrk="1" latinLnBrk="0" hangingPunct="1">
+              <a:spcBef>
+                <a:spcPts val="300"/>
+              </a:spcBef>
+              <a:buClr>
+                <a:schemeClr val="accent2"/>
+              </a:buClr>
+              <a:buFont typeface="Georgia"/>
+              <a:buNone/>
+              <a:defRPr kumimoji="0" sz="2600" kern="1200">
+                <a:solidFill>
+                  <a:schemeClr val="accent2"/>
+                </a:solidFill>
+                <a:latin typeface="+mn-lt"/>
+                <a:ea typeface="+mn-ea"/>
+                <a:cs typeface="+mn-cs"/>
+              </a:defRPr>
+            </a:lvl2pPr>
+            <a:lvl3pPr marL="914400" indent="0" algn="ctr" rtl="0" eaLnBrk="1" latinLnBrk="0" hangingPunct="1">
+              <a:spcBef>
+                <a:spcPts val="300"/>
+              </a:spcBef>
+              <a:buClr>
+                <a:schemeClr val="accent1"/>
+              </a:buClr>
+              <a:buFont typeface="Wingdings 2"/>
+              <a:buNone/>
+              <a:defRPr kumimoji="0" sz="2400" kern="1200">
+                <a:solidFill>
+                  <a:schemeClr val="accent1"/>
+                </a:solidFill>
+                <a:latin typeface="+mn-lt"/>
+                <a:ea typeface="+mn-ea"/>
+                <a:cs typeface="+mn-cs"/>
+              </a:defRPr>
+            </a:lvl3pPr>
+            <a:lvl4pPr marL="1371600" indent="0" algn="ctr" rtl="0" eaLnBrk="1" latinLnBrk="0" hangingPunct="1">
+              <a:spcBef>
+                <a:spcPts val="300"/>
+              </a:spcBef>
+              <a:buClr>
+                <a:schemeClr val="accent1"/>
+              </a:buClr>
+              <a:buFont typeface="Wingdings 2"/>
+              <a:buNone/>
+              <a:defRPr kumimoji="0" sz="2200" kern="1200">
+                <a:solidFill>
+                  <a:schemeClr val="accent1"/>
+                </a:solidFill>
+                <a:latin typeface="+mn-lt"/>
+                <a:ea typeface="+mn-ea"/>
+                <a:cs typeface="+mn-cs"/>
+              </a:defRPr>
+            </a:lvl4pPr>
+            <a:lvl5pPr marL="1828800" indent="0" algn="ctr" rtl="0" eaLnBrk="1" latinLnBrk="0" hangingPunct="1">
+              <a:spcBef>
+                <a:spcPts val="300"/>
+              </a:spcBef>
+              <a:buClr>
+                <a:schemeClr val="accent3"/>
+              </a:buClr>
+              <a:buFont typeface="Georgia"/>
+              <a:buNone/>
+              <a:defRPr kumimoji="0" sz="2000" kern="1200">
+                <a:solidFill>
+                  <a:schemeClr val="accent3"/>
+                </a:solidFill>
+                <a:latin typeface="+mn-lt"/>
+                <a:ea typeface="+mn-ea"/>
+                <a:cs typeface="+mn-cs"/>
+              </a:defRPr>
+            </a:lvl5pPr>
+            <a:lvl6pPr marL="2286000" indent="0" algn="ctr" rtl="0" eaLnBrk="1" latinLnBrk="0" hangingPunct="1">
+              <a:spcBef>
+                <a:spcPts val="300"/>
+              </a:spcBef>
+              <a:buClr>
+                <a:schemeClr val="accent3"/>
+              </a:buClr>
+              <a:buFont typeface="Georgia"/>
+              <a:buNone/>
+              <a:defRPr kumimoji="0" sz="1800" kern="1200">
+                <a:solidFill>
+                  <a:schemeClr val="accent3"/>
+                </a:solidFill>
+                <a:latin typeface="+mn-lt"/>
+                <a:ea typeface="+mn-ea"/>
+                <a:cs typeface="+mn-cs"/>
+              </a:defRPr>
+            </a:lvl6pPr>
+            <a:lvl7pPr marL="2743200" indent="0" algn="ctr" rtl="0" eaLnBrk="1" latinLnBrk="0" hangingPunct="1">
+              <a:spcBef>
+                <a:spcPts val="300"/>
+              </a:spcBef>
+              <a:buClr>
+                <a:schemeClr val="accent3"/>
+              </a:buClr>
+              <a:buFont typeface="Georgia"/>
+              <a:buNone/>
+              <a:defRPr kumimoji="0" sz="1600" kern="1200">
+                <a:solidFill>
+                  <a:schemeClr val="accent3"/>
+                </a:solidFill>
+                <a:latin typeface="+mn-lt"/>
+                <a:ea typeface="+mn-ea"/>
+                <a:cs typeface="+mn-cs"/>
+              </a:defRPr>
+            </a:lvl7pPr>
+            <a:lvl8pPr marL="3200400" indent="0" algn="ctr" rtl="0" eaLnBrk="1" latinLnBrk="0" hangingPunct="1">
+              <a:spcBef>
+                <a:spcPts val="300"/>
+              </a:spcBef>
+              <a:buClr>
+                <a:schemeClr val="accent3"/>
+              </a:buClr>
+              <a:buFont typeface="Georgia"/>
+              <a:buNone/>
+              <a:defRPr kumimoji="0" sz="1500" kern="1200">
+                <a:solidFill>
+                  <a:schemeClr val="accent3"/>
+                </a:solidFill>
+                <a:latin typeface="+mn-lt"/>
+                <a:ea typeface="+mn-ea"/>
+                <a:cs typeface="+mn-cs"/>
+              </a:defRPr>
+            </a:lvl8pPr>
+            <a:lvl9pPr marL="3657600" indent="0" algn="ctr" rtl="0" eaLnBrk="1" latinLnBrk="0" hangingPunct="1">
+              <a:spcBef>
+                <a:spcPts val="300"/>
+              </a:spcBef>
+              <a:buClr>
+                <a:schemeClr val="accent3"/>
+              </a:buClr>
+              <a:buFont typeface="Georgia"/>
+              <a:buNone/>
+              <a:defRPr kumimoji="0" sz="1400" kern="1200" baseline="0">
+                <a:solidFill>
+                  <a:schemeClr val="accent3"/>
+                </a:solidFill>
+                <a:latin typeface="+mn-lt"/>
+                <a:ea typeface="+mn-ea"/>
+                <a:cs typeface="+mn-cs"/>
+              </a:defRPr>
+            </a:lvl9pPr>
+          </a:lstStyle>
+          <a:p>
+            <a:pPr algn="ctr"/>
+            <a:r>
+              <a:rPr lang="en-US" b="1" smtClean="0"/>
+              <a:t>Students</a:t>
+            </a:r>
+            <a:endParaRPr lang="en-US" smtClean="0"/>
+          </a:p>
+          <a:p>
+            <a:pPr algn="ctr"/>
+            <a:r>
+              <a:rPr lang="en-US" smtClean="0"/>
+              <a:t>Taras Kutsyk</a:t>
+            </a:r>
+          </a:p>
+          <a:p>
+            <a:pPr algn="ctr"/>
+            <a:r>
+              <a:rPr lang="en-US"/>
+              <a:t>Anastasiia Bondarenko</a:t>
+            </a:r>
+            <a:endParaRPr lang="uk-UA">
+              <a:effectLst/>
+            </a:endParaRPr>
           </a:p>
         </p:txBody>
       </p:sp>
@@ -3146,10 +4411,177 @@
 </p:sld>
 </file>
 
+<file path=ppt/slides/slide2.xml><?xml version="1.0" encoding="utf-8"?>
+<p:sld xmlns:a="http://schemas.openxmlformats.org/drawingml/2006/main" xmlns:r="http://schemas.openxmlformats.org/officeDocument/2006/relationships" xmlns:p="http://schemas.openxmlformats.org/presentationml/2006/main">
+  <p:cSld>
+    <p:spTree>
+      <p:nvGrpSpPr>
+        <p:cNvPr id="1" name=""/>
+        <p:cNvGrpSpPr/>
+        <p:nvPr/>
+      </p:nvGrpSpPr>
+      <p:grpSpPr>
+        <a:xfrm>
+          <a:off x="0" y="0"/>
+          <a:ext cx="0" cy="0"/>
+          <a:chOff x="0" y="0"/>
+          <a:chExt cx="0" cy="0"/>
+        </a:xfrm>
+      </p:grpSpPr>
+      <p:sp>
+        <p:nvSpPr>
+          <p:cNvPr id="2" name="Title 1"/>
+          <p:cNvSpPr>
+            <a:spLocks noGrp="1"/>
+          </p:cNvSpPr>
+          <p:nvPr>
+            <p:ph type="title"/>
+          </p:nvPr>
+        </p:nvSpPr>
+        <p:spPr>
+          <a:xfrm>
+            <a:off x="457200" y="836712"/>
+            <a:ext cx="8229600" cy="1373088"/>
+          </a:xfrm>
+        </p:spPr>
+        <p:txBody>
+          <a:bodyPr/>
+          <a:lstStyle/>
+          <a:p>
+            <a:pPr algn="ctr"/>
+            <a:r>
+              <a:rPr lang="en-US" smtClean="0"/>
+              <a:t>Table of contents</a:t>
+            </a:r>
+            <a:endParaRPr lang="uk-UA"/>
+          </a:p>
+        </p:txBody>
+      </p:sp>
+      <p:sp>
+        <p:nvSpPr>
+          <p:cNvPr id="3" name="Content Placeholder 2"/>
+          <p:cNvSpPr>
+            <a:spLocks noGrp="1"/>
+          </p:cNvSpPr>
+          <p:nvPr>
+            <p:ph idx="1"/>
+          </p:nvPr>
+        </p:nvSpPr>
+        <p:spPr/>
+        <p:txBody>
+          <a:bodyPr/>
+          <a:lstStyle/>
+          <a:p>
+            <a:pPr marL="624078" indent="-514350">
+              <a:buFont typeface="+mj-lt"/>
+              <a:buAutoNum type="arabicPeriod"/>
+            </a:pPr>
+            <a:r>
+              <a:rPr lang="en-US"/>
+              <a:t>P</a:t>
+            </a:r>
+            <a:r>
+              <a:rPr lang="en-US" smtClean="0"/>
+              <a:t>roblem </a:t>
+            </a:r>
+            <a:r>
+              <a:rPr lang="en-US"/>
+              <a:t>formulation</a:t>
+            </a:r>
+          </a:p>
+          <a:p>
+            <a:pPr marL="624078" indent="-514350">
+              <a:buFont typeface="+mj-lt"/>
+              <a:buAutoNum type="arabicPeriod"/>
+            </a:pPr>
+            <a:r>
+              <a:rPr lang="en-US" smtClean="0"/>
+              <a:t>Introduction to the ASHRAE dataset</a:t>
+            </a:r>
+            <a:endParaRPr lang="en-US"/>
+          </a:p>
+          <a:p>
+            <a:pPr marL="624078" indent="-514350">
+              <a:buFont typeface="+mj-lt"/>
+              <a:buAutoNum type="arabicPeriod"/>
+            </a:pPr>
+            <a:r>
+              <a:rPr lang="en-US" smtClean="0"/>
+              <a:t>Preprocessing of the dataset</a:t>
+            </a:r>
+            <a:endParaRPr lang="en-US"/>
+          </a:p>
+          <a:p>
+            <a:pPr marL="624078" indent="-514350">
+              <a:buFont typeface="+mj-lt"/>
+              <a:buAutoNum type="arabicPeriod"/>
+            </a:pPr>
+            <a:r>
+              <a:rPr lang="en-US" smtClean="0"/>
+              <a:t>Lag matrix &amp; Forecast matrix</a:t>
+            </a:r>
+            <a:endParaRPr lang="en-US"/>
+          </a:p>
+          <a:p>
+            <a:pPr marL="624078" indent="-514350">
+              <a:buFont typeface="+mj-lt"/>
+              <a:buAutoNum type="arabicPeriod"/>
+            </a:pPr>
+            <a:r>
+              <a:rPr lang="en-US" smtClean="0"/>
+              <a:t>Models we used</a:t>
+            </a:r>
+            <a:endParaRPr lang="en-US"/>
+          </a:p>
+          <a:p>
+            <a:pPr marL="624078" indent="-514350">
+              <a:buFont typeface="+mj-lt"/>
+              <a:buAutoNum type="arabicPeriod"/>
+            </a:pPr>
+            <a:r>
+              <a:rPr lang="en-US" smtClean="0"/>
+              <a:t>Models validation results</a:t>
+            </a:r>
+            <a:endParaRPr lang="en-US"/>
+          </a:p>
+          <a:p>
+            <a:pPr marL="624078" indent="-514350">
+              <a:buFont typeface="+mj-lt"/>
+              <a:buAutoNum type="arabicPeriod"/>
+            </a:pPr>
+            <a:r>
+              <a:rPr lang="en-US"/>
+              <a:t>R</a:t>
+            </a:r>
+            <a:r>
+              <a:rPr lang="en-US" smtClean="0"/>
+              <a:t>esults </a:t>
+            </a:r>
+            <a:r>
+              <a:rPr lang="en-US"/>
+              <a:t>discussion</a:t>
+            </a:r>
+            <a:endParaRPr lang="uk-UA"/>
+          </a:p>
+        </p:txBody>
+      </p:sp>
+    </p:spTree>
+    <p:extLst>
+      <p:ext uri="{BB962C8B-B14F-4D97-AF65-F5344CB8AC3E}">
+        <p14:creationId xmlns:p14="http://schemas.microsoft.com/office/powerpoint/2010/main" val="3626441512"/>
+      </p:ext>
+    </p:extLst>
+  </p:cSld>
+  <p:clrMapOvr>
+    <a:masterClrMapping/>
+  </p:clrMapOvr>
+</p:sld>
+</file>
+
 <file path=ppt/theme/theme1.xml><?xml version="1.0" encoding="utf-8"?>
-<a:theme xmlns:a="http://schemas.openxmlformats.org/drawingml/2006/main" name="Office Theme">
+<a:theme xmlns:a="http://schemas.openxmlformats.org/drawingml/2006/main" name="Urban">
   <a:themeElements>
-    <a:clrScheme name="Office">
+    <a:clrScheme name="Urban">
       <a:dk1>
         <a:sysClr val="windowText" lastClr="000000"/>
       </a:dk1>
@@ -3157,46 +4589,81 @@
         <a:sysClr val="window" lastClr="FFFFFF"/>
       </a:lt1>
       <a:dk2>
-        <a:srgbClr val="1F497D"/>
+        <a:srgbClr val="424456"/>
       </a:dk2>
       <a:lt2>
-        <a:srgbClr val="EEECE1"/>
+        <a:srgbClr val="DEDEDE"/>
       </a:lt2>
       <a:accent1>
-        <a:srgbClr val="4F81BD"/>
+        <a:srgbClr val="53548A"/>
       </a:accent1>
       <a:accent2>
-        <a:srgbClr val="C0504D"/>
+        <a:srgbClr val="438086"/>
       </a:accent2>
       <a:accent3>
-        <a:srgbClr val="9BBB59"/>
+        <a:srgbClr val="A04DA3"/>
       </a:accent3>
       <a:accent4>
-        <a:srgbClr val="8064A2"/>
+        <a:srgbClr val="C4652D"/>
       </a:accent4>
       <a:accent5>
-        <a:srgbClr val="4BACC6"/>
+        <a:srgbClr val="8B5D3D"/>
       </a:accent5>
       <a:accent6>
-        <a:srgbClr val="F79646"/>
+        <a:srgbClr val="5C92B5"/>
       </a:accent6>
       <a:hlink>
-        <a:srgbClr val="0000FF"/>
+        <a:srgbClr val="67AFBD"/>
       </a:hlink>
       <a:folHlink>
-        <a:srgbClr val="800080"/>
+        <a:srgbClr val="C2A874"/>
       </a:folHlink>
     </a:clrScheme>
-    <a:fontScheme name="Office">
+    <a:fontScheme name="Urban">
       <a:majorFont>
-        <a:latin typeface="Calibri"/>
+        <a:latin typeface="Trebuchet MS"/>
         <a:ea typeface=""/>
         <a:cs typeface=""/>
-        <a:font script="Jpan" typeface="ＭＳ Ｐゴシック"/>
+        <a:font script="Jpan" typeface="HGｺﾞｼｯｸM"/>
+        <a:font script="Hang" typeface="맑은 고딕"/>
+        <a:font script="Hans" typeface="方正姚体"/>
+        <a:font script="Hant" typeface="微軟正黑體"/>
+        <a:font script="Arab" typeface="Tahoma"/>
+        <a:font script="Hebr" typeface="Arial"/>
+        <a:font script="Thai" typeface="Cordia New"/>
+        <a:font script="Ethi" typeface="Nyala"/>
+        <a:font script="Beng" typeface="Vrinda"/>
+        <a:font script="Gujr" typeface="Shruti"/>
+        <a:font script="Khmr" typeface="DaunPenh"/>
+        <a:font script="Knda" typeface="Tunga"/>
+        <a:font script="Guru" typeface="Raavi"/>
+        <a:font script="Cans" typeface="Euphemia"/>
+        <a:font script="Cher" typeface="Plantagenet Cherokee"/>
+        <a:font script="Yiii" typeface="Microsoft Yi Baiti"/>
+        <a:font script="Tibt" typeface="Microsoft Himalaya"/>
+        <a:font script="Thaa" typeface="MV Boli"/>
+        <a:font script="Deva" typeface="Mangal"/>
+        <a:font script="Telu" typeface="Gautami"/>
+        <a:font script="Taml" typeface="Latha"/>
+        <a:font script="Syrc" typeface="Estrangelo Edessa"/>
+        <a:font script="Orya" typeface="Kalinga"/>
+        <a:font script="Mlym" typeface="Kartika"/>
+        <a:font script="Laoo" typeface="DokChampa"/>
+        <a:font script="Sinh" typeface="Iskoola Pota"/>
+        <a:font script="Mong" typeface="Mongolian Baiti"/>
+        <a:font script="Viet" typeface="Tahoma"/>
+        <a:font script="Uigh" typeface="Microsoft Uighur"/>
+        <a:font script="Geor" typeface="Sylfaen"/>
+      </a:majorFont>
+      <a:minorFont>
+        <a:latin typeface="Georgia"/>
+        <a:ea typeface=""/>
+        <a:cs typeface=""/>
+        <a:font script="Jpan" typeface="HG明朝B"/>
         <a:font script="Hang" typeface="맑은 고딕"/>
         <a:font script="Hans" typeface="宋体"/>
         <a:font script="Hant" typeface="新細明體"/>
-        <a:font script="Arab" typeface="Times New Roman"/>
+        <a:font script="Arab" typeface="Arial"/>
         <a:font script="Hebr" typeface="Times New Roman"/>
         <a:font script="Thai" typeface="Angsana New"/>
         <a:font script="Ethi" typeface="Nyala"/>
@@ -3222,44 +4689,9 @@
         <a:font script="Viet" typeface="Times New Roman"/>
         <a:font script="Uigh" typeface="Microsoft Uighur"/>
         <a:font script="Geor" typeface="Sylfaen"/>
-      </a:majorFont>
-      <a:minorFont>
-        <a:latin typeface="Calibri"/>
-        <a:ea typeface=""/>
-        <a:cs typeface=""/>
-        <a:font script="Jpan" typeface="ＭＳ Ｐゴシック"/>
-        <a:font script="Hang" typeface="맑은 고딕"/>
-        <a:font script="Hans" typeface="宋体"/>
-        <a:font script="Hant" typeface="新細明體"/>
-        <a:font script="Arab" typeface="Arial"/>
-        <a:font script="Hebr" typeface="Arial"/>
-        <a:font script="Thai" typeface="Cordia New"/>
-        <a:font script="Ethi" typeface="Nyala"/>
-        <a:font script="Beng" typeface="Vrinda"/>
-        <a:font script="Gujr" typeface="Shruti"/>
-        <a:font script="Khmr" typeface="DaunPenh"/>
-        <a:font script="Knda" typeface="Tunga"/>
-        <a:font script="Guru" typeface="Raavi"/>
-        <a:font script="Cans" typeface="Euphemia"/>
-        <a:font script="Cher" typeface="Plantagenet Cherokee"/>
-        <a:font script="Yiii" typeface="Microsoft Yi Baiti"/>
-        <a:font script="Tibt" typeface="Microsoft Himalaya"/>
-        <a:font script="Thaa" typeface="MV Boli"/>
-        <a:font script="Deva" typeface="Mangal"/>
-        <a:font script="Telu" typeface="Gautami"/>
-        <a:font script="Taml" typeface="Latha"/>
-        <a:font script="Syrc" typeface="Estrangelo Edessa"/>
-        <a:font script="Orya" typeface="Kalinga"/>
-        <a:font script="Mlym" typeface="Kartika"/>
-        <a:font script="Laoo" typeface="DokChampa"/>
-        <a:font script="Sinh" typeface="Iskoola Pota"/>
-        <a:font script="Mong" typeface="Mongolian Baiti"/>
-        <a:font script="Viet" typeface="Arial"/>
-        <a:font script="Uigh" typeface="Microsoft Uighur"/>
-        <a:font script="Geor" typeface="Sylfaen"/>
       </a:minorFont>
     </a:fontScheme>
-    <a:fmtScheme name="Office">
+    <a:fmtScheme name="Urban">
       <a:fillStyleLst>
         <a:solidFill>
           <a:schemeClr val="phClr"/>
@@ -3268,66 +4700,66 @@
           <a:gsLst>
             <a:gs pos="0">
               <a:schemeClr val="phClr">
-                <a:tint val="50000"/>
-                <a:satMod val="300000"/>
+                <a:tint val="1000"/>
+                <a:satMod val="255000"/>
               </a:schemeClr>
             </a:gs>
-            <a:gs pos="35000">
+            <a:gs pos="55000">
               <a:schemeClr val="phClr">
-                <a:tint val="37000"/>
-                <a:satMod val="300000"/>
+                <a:tint val="12000"/>
+                <a:satMod val="255000"/>
               </a:schemeClr>
             </a:gs>
             <a:gs pos="100000">
               <a:schemeClr val="phClr">
-                <a:tint val="15000"/>
-                <a:satMod val="350000"/>
+                <a:tint val="45000"/>
+                <a:satMod val="250000"/>
               </a:schemeClr>
             </a:gs>
           </a:gsLst>
-          <a:lin ang="16200000" scaled="1"/>
+          <a:path path="circle">
+            <a:fillToRect l="-40000" t="-90000" r="140000" b="190000"/>
+          </a:path>
         </a:gradFill>
         <a:gradFill rotWithShape="1">
           <a:gsLst>
             <a:gs pos="0">
               <a:schemeClr val="phClr">
-                <a:shade val="51000"/>
-                <a:satMod val="130000"/>
+                <a:tint val="43000"/>
+                <a:satMod val="165000"/>
               </a:schemeClr>
             </a:gs>
-            <a:gs pos="80000">
+            <a:gs pos="55000">
               <a:schemeClr val="phClr">
-                <a:shade val="93000"/>
-                <a:satMod val="130000"/>
+                <a:tint val="83000"/>
+                <a:satMod val="155000"/>
               </a:schemeClr>
             </a:gs>
             <a:gs pos="100000">
               <a:schemeClr val="phClr">
-                <a:shade val="94000"/>
-                <a:satMod val="135000"/>
+                <a:shade val="85000"/>
               </a:schemeClr>
             </a:gs>
           </a:gsLst>
-          <a:lin ang="16200000" scaled="0"/>
+          <a:path path="circle">
+            <a:fillToRect l="-40000" t="-90000" r="140000" b="190000"/>
+          </a:path>
         </a:gradFill>
       </a:fillStyleLst>
       <a:lnStyleLst>
         <a:ln w="9525" cap="flat" cmpd="sng" algn="ctr">
           <a:solidFill>
-            <a:schemeClr val="phClr">
-              <a:shade val="95000"/>
-              <a:satMod val="105000"/>
-            </a:schemeClr>
+            <a:schemeClr val="phClr"/>
           </a:solidFill>
           <a:prstDash val="solid"/>
         </a:ln>
-        <a:ln w="25400" cap="flat" cmpd="sng" algn="ctr">
+        <a:ln w="19050" cap="flat" cmpd="sng" algn="ctr">
           <a:solidFill>
             <a:schemeClr val="phClr"/>
           </a:solidFill>
           <a:prstDash val="solid"/>
         </a:ln>
-        <a:ln w="38100" cap="flat" cmpd="sng" algn="ctr">
+        <a:ln w="31750" cap="flat" cmpd="sng" algn="ctr">
           <a:solidFill>
             <a:schemeClr val="phClr"/>
           </a:solidFill>
@@ -3337,40 +4769,45 @@
       <a:effectStyleLst>
         <a:effectStyle>
           <a:effectLst>
-            <a:outerShdw blurRad="40000" dist="20000" dir="5400000" rotWithShape="0">
+            <a:outerShdw blurRad="51500" dist="25400" dir="5400000" rotWithShape="0">
               <a:srgbClr val="000000">
-                <a:alpha val="38000"/>
+                <a:alpha val="40000"/>
               </a:srgbClr>
             </a:outerShdw>
           </a:effectLst>
         </a:effectStyle>
         <a:effectStyle>
           <a:effectLst>
-            <a:outerShdw blurRad="40000" dist="23000" dir="5400000" rotWithShape="0">
+            <a:outerShdw blurRad="50800" dist="25400" dir="5400000" rotWithShape="0">
               <a:srgbClr val="000000">
-                <a:alpha val="35000"/>
+                <a:alpha val="45000"/>
               </a:srgbClr>
             </a:outerShdw>
           </a:effectLst>
         </a:effectStyle>
         <a:effectStyle>
           <a:effectLst>
-            <a:outerShdw blurRad="40000" dist="23000" dir="5400000" rotWithShape="0">
+            <a:outerShdw blurRad="50800" dist="25400" dir="5400000" rotWithShape="0">
               <a:srgbClr val="000000">
-                <a:alpha val="35000"/>
+                <a:alpha val="45000"/>
               </a:srgbClr>
             </a:outerShdw>
           </a:effectLst>
           <a:scene3d>
-            <a:camera prst="orthographicFront">
+            <a:camera prst="orthographicFront" fov="0">
               <a:rot lat="0" lon="0" rev="0"/>
             </a:camera>
-            <a:lightRig rig="threePt" dir="t">
-              <a:rot lat="0" lon="0" rev="1200000"/>
+            <a:lightRig rig="flat" dir="t">
+              <a:rot lat="0" lon="0" rev="20040000"/>
             </a:lightRig>
           </a:scene3d>
-          <a:sp3d>
-            <a:bevelT w="63500" h="25400"/>
+          <a:sp3d contourW="12700" prstMaterial="dkEdge">
+            <a:bevelT w="25400" h="38100" prst="convex"/>
+            <a:contourClr>
+              <a:schemeClr val="phClr">
+                <a:satMod val="115000"/>
+              </a:schemeClr>
+            </a:contourClr>
           </a:sp3d>
         </a:effectStyle>
       </a:effectStyleLst>
@@ -3380,49 +4817,41 @@
         </a:solidFill>
         <a:gradFill rotWithShape="1">
           <a:gsLst>
+            <a:gs pos="100000">
+              <a:schemeClr val="phClr">
+                <a:tint val="80000"/>
+                <a:satMod val="250000"/>
+              </a:schemeClr>
+            </a:gs>
+            <a:gs pos="60000">
+              <a:schemeClr val="phClr">
+                <a:shade val="38000"/>
+                <a:satMod val="175000"/>
+              </a:schemeClr>
+            </a:gs>
             <a:gs pos="0">
               <a:schemeClr val="phClr">
-                <a:tint val="40000"/>
-                <a:satMod val="350000"/>
-              </a:schemeClr>
-            </a:gs>
-            <a:gs pos="40000">
-              <a:schemeClr val="phClr">
-                <a:tint val="45000"/>
-                <a:shade val="99000"/>
-                <a:satMod val="350000"/>
-              </a:schemeClr>
-            </a:gs>
-            <a:gs pos="100000">
-              <a:schemeClr val="phClr">
-                <a:shade val="20000"/>
-                <a:satMod val="255000"/>
+                <a:shade val="30000"/>
+                <a:satMod val="175000"/>
               </a:schemeClr>
             </a:gs>
           </a:gsLst>
-          <a:path path="circle">
-            <a:fillToRect l="50000" t="-80000" r="50000" b="180000"/>
-          </a:path>
+          <a:lin ang="5400000" scaled="0"/>
         </a:gradFill>
-        <a:gradFill rotWithShape="1">
-          <a:gsLst>
-            <a:gs pos="0">
+        <a:blipFill>
+          <a:blip xmlns:r="http://schemas.openxmlformats.org/officeDocument/2006/relationships" r:embed="rId1">
+            <a:duotone>
               <a:schemeClr val="phClr">
-                <a:tint val="80000"/>
-                <a:satMod val="300000"/>
+                <a:shade val="48000"/>
               </a:schemeClr>
-            </a:gs>
-            <a:gs pos="100000">
               <a:schemeClr val="phClr">
-                <a:shade val="30000"/>
-                <a:satMod val="200000"/>
+                <a:tint val="96000"/>
+                <a:satMod val="150000"/>
               </a:schemeClr>
-            </a:gs>
-          </a:gsLst>
-          <a:path path="circle">
-            <a:fillToRect l="50000" t="50000" r="50000" b="50000"/>
-          </a:path>
-        </a:gradFill>
+            </a:duotone>
+          </a:blip>
+          <a:tile tx="0" ty="0" sx="80000" sy="80000" flip="none" algn="tl"/>
+        </a:blipFill>
       </a:bgFillStyleLst>
     </a:fmtScheme>
   </a:themeElements>

</xml_diff>

<commit_message>
(Pres.) Dataset slides added
</commit_message>
<xml_diff>
--- a/Presentation ASHRAE.pptx
+++ b/Presentation ASHRAE.pptx
@@ -7,6 +7,9 @@
   <p:sldIdLst>
     <p:sldId id="256" r:id="rId2"/>
     <p:sldId id="257" r:id="rId3"/>
+    <p:sldId id="258" r:id="rId4"/>
+    <p:sldId id="259" r:id="rId5"/>
+    <p:sldId id="260" r:id="rId6"/>
   </p:sldIdLst>
   <p:sldSz cx="9144000" cy="6858000" type="screen4x3"/>
   <p:notesSz cx="6858000" cy="9144000"/>
@@ -4172,11 +4175,7 @@
             </a:r>
             <a:r>
               <a:rPr lang="en-US"/>
-              <a:t>. </a:t>
-            </a:r>
-            <a:r>
-              <a:rPr lang="en-US"/>
-              <a:t>Alessandro </a:t>
+              <a:t>. Alessandro </a:t>
             </a:r>
             <a:r>
               <a:rPr lang="en-US" smtClean="0"/>
@@ -4441,7 +4440,7 @@
         <p:spPr>
           <a:xfrm>
             <a:off x="457200" y="836712"/>
-            <a:ext cx="8229600" cy="1373088"/>
+            <a:ext cx="8229600" cy="1440160"/>
           </a:xfrm>
         </p:spPr>
         <p:txBody>
@@ -4477,16 +4476,8 @@
               <a:buAutoNum type="arabicPeriod"/>
             </a:pPr>
             <a:r>
-              <a:rPr lang="en-US"/>
-              <a:t>P</a:t>
-            </a:r>
-            <a:r>
               <a:rPr lang="en-US" smtClean="0"/>
-              <a:t>roblem </a:t>
-            </a:r>
-            <a:r>
-              <a:rPr lang="en-US"/>
-              <a:t>formulation</a:t>
+              <a:t>Introduction to the ASHRAE dataset</a:t>
             </a:r>
           </a:p>
           <a:p>
@@ -4495,8 +4486,12 @@
               <a:buAutoNum type="arabicPeriod"/>
             </a:pPr>
             <a:r>
+              <a:rPr lang="en-US"/>
+              <a:t>Problem </a:t>
+            </a:r>
+            <a:r>
               <a:rPr lang="en-US" smtClean="0"/>
-              <a:t>Introduction to the ASHRAE dataset</a:t>
+              <a:t>formulation</a:t>
             </a:r>
             <a:endParaRPr lang="en-US"/>
           </a:p>
@@ -4569,6 +4564,1206 @@
     <p:extLst>
       <p:ext uri="{BB962C8B-B14F-4D97-AF65-F5344CB8AC3E}">
         <p14:creationId xmlns:p14="http://schemas.microsoft.com/office/powerpoint/2010/main" val="3626441512"/>
+      </p:ext>
+    </p:extLst>
+  </p:cSld>
+  <p:clrMapOvr>
+    <a:masterClrMapping/>
+  </p:clrMapOvr>
+</p:sld>
+</file>
+
+<file path=ppt/slides/slide3.xml><?xml version="1.0" encoding="utf-8"?>
+<p:sld xmlns:a="http://schemas.openxmlformats.org/drawingml/2006/main" xmlns:r="http://schemas.openxmlformats.org/officeDocument/2006/relationships" xmlns:p="http://schemas.openxmlformats.org/presentationml/2006/main">
+  <p:cSld>
+    <p:spTree>
+      <p:nvGrpSpPr>
+        <p:cNvPr id="1" name=""/>
+        <p:cNvGrpSpPr/>
+        <p:nvPr/>
+      </p:nvGrpSpPr>
+      <p:grpSpPr>
+        <a:xfrm>
+          <a:off x="0" y="0"/>
+          <a:ext cx="0" cy="0"/>
+          <a:chOff x="0" y="0"/>
+          <a:chExt cx="0" cy="0"/>
+        </a:xfrm>
+      </p:grpSpPr>
+      <p:sp>
+        <p:nvSpPr>
+          <p:cNvPr id="2" name="Title 1"/>
+          <p:cNvSpPr>
+            <a:spLocks noGrp="1"/>
+          </p:cNvSpPr>
+          <p:nvPr>
+            <p:ph type="title"/>
+          </p:nvPr>
+        </p:nvSpPr>
+        <p:spPr>
+          <a:xfrm>
+            <a:off x="1611152" y="656692"/>
+            <a:ext cx="8229600" cy="1152128"/>
+          </a:xfrm>
+        </p:spPr>
+        <p:txBody>
+          <a:bodyPr>
+            <a:normAutofit/>
+          </a:bodyPr>
+          <a:lstStyle/>
+          <a:p>
+            <a:r>
+              <a:rPr lang="en-US"/>
+              <a:t>ASHRAE </a:t>
+            </a:r>
+            <a:r>
+              <a:rPr lang="en-US" smtClean="0"/>
+              <a:t>dataset: introduction</a:t>
+            </a:r>
+            <a:endParaRPr lang="uk-UA"/>
+          </a:p>
+        </p:txBody>
+      </p:sp>
+      <p:sp>
+        <p:nvSpPr>
+          <p:cNvPr id="3" name="Content Placeholder 2"/>
+          <p:cNvSpPr>
+            <a:spLocks noGrp="1"/>
+          </p:cNvSpPr>
+          <p:nvPr>
+            <p:ph idx="1"/>
+          </p:nvPr>
+        </p:nvSpPr>
+        <p:spPr>
+          <a:xfrm>
+            <a:off x="457200" y="1916832"/>
+            <a:ext cx="8229600" cy="4657704"/>
+          </a:xfrm>
+        </p:spPr>
+        <p:txBody>
+          <a:bodyPr/>
+          <a:lstStyle/>
+          <a:p>
+            <a:pPr marL="109728" indent="0" algn="just">
+              <a:buNone/>
+            </a:pPr>
+            <a:r>
+              <a:rPr lang="en-US" smtClean="0">
+                <a:latin typeface="Calibri" panose="020F0502020204030204" pitchFamily="34" charset="0"/>
+                <a:ea typeface="Calibri" panose="020F0502020204030204" pitchFamily="34" charset="0"/>
+                <a:cs typeface="Calibri" panose="020F0502020204030204" pitchFamily="34" charset="0"/>
+                <a:hlinkClick r:id="rId2"/>
+              </a:rPr>
+              <a:t>ASHRAE</a:t>
+            </a:r>
+            <a:r>
+              <a:rPr lang="en-US" smtClean="0">
+                <a:latin typeface="Calibri" panose="020F0502020204030204" pitchFamily="34" charset="0"/>
+                <a:ea typeface="Calibri" panose="020F0502020204030204" pitchFamily="34" charset="0"/>
+                <a:cs typeface="Calibri" panose="020F0502020204030204" pitchFamily="34" charset="0"/>
+              </a:rPr>
+              <a:t> is </a:t>
+            </a:r>
+            <a:r>
+              <a:rPr lang="en-US">
+                <a:latin typeface="Calibri" panose="020F0502020204030204" pitchFamily="34" charset="0"/>
+                <a:ea typeface="Calibri" panose="020F0502020204030204" pitchFamily="34" charset="0"/>
+                <a:cs typeface="Calibri" panose="020F0502020204030204" pitchFamily="34" charset="0"/>
+              </a:rPr>
+              <a:t>an American </a:t>
+            </a:r>
+            <a:r>
+              <a:rPr lang="en-US" smtClean="0">
+                <a:latin typeface="Calibri" panose="020F0502020204030204" pitchFamily="34" charset="0"/>
+                <a:ea typeface="Calibri" panose="020F0502020204030204" pitchFamily="34" charset="0"/>
+                <a:cs typeface="Calibri" panose="020F0502020204030204" pitchFamily="34" charset="0"/>
+              </a:rPr>
+              <a:t>association that focuses on building systems &amp; energy efficiency. In 2019, it provided a dataset to be used in a </a:t>
+            </a:r>
+            <a:r>
+              <a:rPr lang="en-US" smtClean="0">
+                <a:latin typeface="Calibri" panose="020F0502020204030204" pitchFamily="34" charset="0"/>
+                <a:ea typeface="Calibri" panose="020F0502020204030204" pitchFamily="34" charset="0"/>
+                <a:cs typeface="Calibri" panose="020F0502020204030204" pitchFamily="34" charset="0"/>
+                <a:hlinkClick r:id="rId3"/>
+              </a:rPr>
+              <a:t>Kaggle competition</a:t>
+            </a:r>
+            <a:r>
+              <a:rPr lang="en-US" smtClean="0">
+                <a:latin typeface="Calibri" panose="020F0502020204030204" pitchFamily="34" charset="0"/>
+                <a:ea typeface="Calibri" panose="020F0502020204030204" pitchFamily="34" charset="0"/>
+                <a:cs typeface="Calibri" panose="020F0502020204030204" pitchFamily="34" charset="0"/>
+              </a:rPr>
+              <a:t> for building ML models to </a:t>
+            </a:r>
+            <a:r>
+              <a:rPr lang="en-US" b="1" smtClean="0">
+                <a:latin typeface="Calibri" panose="020F0502020204030204" pitchFamily="34" charset="0"/>
+                <a:ea typeface="Calibri" panose="020F0502020204030204" pitchFamily="34" charset="0"/>
+                <a:cs typeface="Calibri" panose="020F0502020204030204" pitchFamily="34" charset="0"/>
+              </a:rPr>
+              <a:t>predict </a:t>
+            </a:r>
+            <a:r>
+              <a:rPr lang="en-US" b="1">
+                <a:latin typeface="Calibri" panose="020F0502020204030204" pitchFamily="34" charset="0"/>
+                <a:ea typeface="Calibri" panose="020F0502020204030204" pitchFamily="34" charset="0"/>
+                <a:cs typeface="Calibri" panose="020F0502020204030204" pitchFamily="34" charset="0"/>
+              </a:rPr>
+              <a:t>metered building energy usage</a:t>
+            </a:r>
+            <a:r>
+              <a:rPr lang="en-US">
+                <a:latin typeface="Calibri" panose="020F0502020204030204" pitchFamily="34" charset="0"/>
+                <a:ea typeface="Calibri" panose="020F0502020204030204" pitchFamily="34" charset="0"/>
+                <a:cs typeface="Calibri" panose="020F0502020204030204" pitchFamily="34" charset="0"/>
+              </a:rPr>
+              <a:t> in the following areas: chilled water, electric, hot water, and steam meters. </a:t>
+            </a:r>
+            <a:endParaRPr lang="en-US" smtClean="0">
+              <a:latin typeface="Calibri" panose="020F0502020204030204" pitchFamily="34" charset="0"/>
+              <a:ea typeface="Calibri" panose="020F0502020204030204" pitchFamily="34" charset="0"/>
+              <a:cs typeface="Calibri" panose="020F0502020204030204" pitchFamily="34" charset="0"/>
+            </a:endParaRPr>
+          </a:p>
+          <a:p>
+            <a:pPr marL="109728" indent="0" algn="just">
+              <a:buNone/>
+            </a:pPr>
+            <a:endParaRPr lang="en-US">
+              <a:latin typeface="Calibri" panose="020F0502020204030204" pitchFamily="34" charset="0"/>
+              <a:ea typeface="Calibri" panose="020F0502020204030204" pitchFamily="34" charset="0"/>
+              <a:cs typeface="Calibri" panose="020F0502020204030204" pitchFamily="34" charset="0"/>
+            </a:endParaRPr>
+          </a:p>
+          <a:p>
+            <a:pPr marL="109728" indent="0" algn="just">
+              <a:buNone/>
+            </a:pPr>
+            <a:r>
+              <a:rPr lang="en-US" smtClean="0">
+                <a:latin typeface="Calibri" panose="020F0502020204030204" pitchFamily="34" charset="0"/>
+                <a:ea typeface="Calibri" panose="020F0502020204030204" pitchFamily="34" charset="0"/>
+                <a:cs typeface="Calibri" panose="020F0502020204030204" pitchFamily="34" charset="0"/>
+              </a:rPr>
+              <a:t>The </a:t>
+            </a:r>
+            <a:r>
+              <a:rPr lang="en-US">
+                <a:latin typeface="Calibri" panose="020F0502020204030204" pitchFamily="34" charset="0"/>
+                <a:ea typeface="Calibri" panose="020F0502020204030204" pitchFamily="34" charset="0"/>
+                <a:cs typeface="Calibri" panose="020F0502020204030204" pitchFamily="34" charset="0"/>
+              </a:rPr>
+              <a:t>data comes from over 1,000 buildings over a three-year timeframe. </a:t>
+            </a:r>
+            <a:endParaRPr lang="uk-UA">
+              <a:latin typeface="Calibri" panose="020F0502020204030204" pitchFamily="34" charset="0"/>
+              <a:ea typeface="Calibri" panose="020F0502020204030204" pitchFamily="34" charset="0"/>
+              <a:cs typeface="Calibri" panose="020F0502020204030204" pitchFamily="34" charset="0"/>
+            </a:endParaRPr>
+          </a:p>
+        </p:txBody>
+      </p:sp>
+      <p:pic>
+        <p:nvPicPr>
+          <p:cNvPr id="1026" name="Picture 2" descr="https://www.googleapis.com/download/storage/v1/b/kaggle-user-content/o/inbox%2F1095143%2Ff9ab8963dea5e7c1716f47310daa96ab%2FASHRAE_Logo_25.jpg?generation=1570808142334850&amp;alt=media"/>
+          <p:cNvPicPr>
+            <a:picLocks noChangeAspect="1" noChangeArrowheads="1"/>
+          </p:cNvPicPr>
+          <p:nvPr/>
+        </p:nvPicPr>
+        <p:blipFill>
+          <a:blip r:embed="rId4">
+            <a:extLst>
+              <a:ext uri="{28A0092B-C50C-407E-A947-70E740481C1C}">
+                <a14:useLocalDpi xmlns:a14="http://schemas.microsoft.com/office/drawing/2010/main" val="0"/>
+              </a:ext>
+            </a:extLst>
+          </a:blip>
+          <a:srcRect/>
+          <a:stretch>
+            <a:fillRect/>
+          </a:stretch>
+        </p:blipFill>
+        <p:spPr bwMode="auto">
+          <a:xfrm>
+            <a:off x="107504" y="476672"/>
+            <a:ext cx="1512168" cy="1512168"/>
+          </a:xfrm>
+          <a:prstGeom prst="rect">
+            <a:avLst/>
+          </a:prstGeom>
+          <a:noFill/>
+          <a:extLst>
+            <a:ext uri="{909E8E84-426E-40DD-AFC4-6F175D3DCCD1}">
+              <a14:hiddenFill xmlns:a14="http://schemas.microsoft.com/office/drawing/2010/main">
+                <a:solidFill>
+                  <a:srgbClr val="FFFFFF"/>
+                </a:solidFill>
+              </a14:hiddenFill>
+            </a:ext>
+          </a:extLst>
+        </p:spPr>
+      </p:pic>
+    </p:spTree>
+    <p:extLst>
+      <p:ext uri="{BB962C8B-B14F-4D97-AF65-F5344CB8AC3E}">
+        <p14:creationId xmlns:p14="http://schemas.microsoft.com/office/powerpoint/2010/main" val="813909246"/>
+      </p:ext>
+    </p:extLst>
+  </p:cSld>
+  <p:clrMapOvr>
+    <a:masterClrMapping/>
+  </p:clrMapOvr>
+</p:sld>
+</file>
+
+<file path=ppt/slides/slide4.xml><?xml version="1.0" encoding="utf-8"?>
+<p:sld xmlns:a="http://schemas.openxmlformats.org/drawingml/2006/main" xmlns:r="http://schemas.openxmlformats.org/officeDocument/2006/relationships" xmlns:p="http://schemas.openxmlformats.org/presentationml/2006/main">
+  <p:cSld>
+    <p:spTree>
+      <p:nvGrpSpPr>
+        <p:cNvPr id="1" name=""/>
+        <p:cNvGrpSpPr/>
+        <p:nvPr/>
+      </p:nvGrpSpPr>
+      <p:grpSpPr>
+        <a:xfrm>
+          <a:off x="0" y="0"/>
+          <a:ext cx="0" cy="0"/>
+          <a:chOff x="0" y="0"/>
+          <a:chExt cx="0" cy="0"/>
+        </a:xfrm>
+      </p:grpSpPr>
+      <p:sp>
+        <p:nvSpPr>
+          <p:cNvPr id="2" name="Title 1"/>
+          <p:cNvSpPr>
+            <a:spLocks noGrp="1"/>
+          </p:cNvSpPr>
+          <p:nvPr>
+            <p:ph type="title"/>
+          </p:nvPr>
+        </p:nvSpPr>
+        <p:spPr>
+          <a:xfrm>
+            <a:off x="179512" y="188640"/>
+            <a:ext cx="8229600" cy="1296144"/>
+          </a:xfrm>
+        </p:spPr>
+        <p:txBody>
+          <a:bodyPr/>
+          <a:lstStyle/>
+          <a:p>
+            <a:r>
+              <a:rPr lang="en-US" smtClean="0"/>
+              <a:t>ASHRAE dataset: structure</a:t>
+            </a:r>
+            <a:endParaRPr lang="uk-UA"/>
+          </a:p>
+        </p:txBody>
+      </p:sp>
+      <p:sp>
+        <p:nvSpPr>
+          <p:cNvPr id="8" name="Content Placeholder 2"/>
+          <p:cNvSpPr>
+            <a:spLocks noGrp="1"/>
+          </p:cNvSpPr>
+          <p:nvPr>
+            <p:ph idx="1"/>
+          </p:nvPr>
+        </p:nvSpPr>
+        <p:spPr>
+          <a:xfrm>
+            <a:off x="107504" y="1363890"/>
+            <a:ext cx="4320480" cy="2592288"/>
+          </a:xfrm>
+        </p:spPr>
+        <p:txBody>
+          <a:bodyPr>
+            <a:noAutofit/>
+          </a:bodyPr>
+          <a:lstStyle/>
+          <a:p>
+            <a:pPr marL="109728" indent="0" fontAlgn="base">
+              <a:buNone/>
+            </a:pPr>
+            <a:r>
+              <a:rPr lang="en-US" sz="1600" b="1">
+                <a:latin typeface="Calibri" panose="020F0502020204030204" pitchFamily="34" charset="0"/>
+                <a:ea typeface="Calibri" panose="020F0502020204030204" pitchFamily="34" charset="0"/>
+                <a:cs typeface="Calibri" panose="020F0502020204030204" pitchFamily="34" charset="0"/>
+              </a:rPr>
+              <a:t>train.csv</a:t>
+            </a:r>
+          </a:p>
+          <a:p>
+            <a:pPr fontAlgn="base"/>
+            <a:r>
+              <a:rPr lang="en-US" sz="1600">
+                <a:latin typeface="Calibri" panose="020F0502020204030204" pitchFamily="34" charset="0"/>
+                <a:ea typeface="Calibri" panose="020F0502020204030204" pitchFamily="34" charset="0"/>
+                <a:cs typeface="Calibri" panose="020F0502020204030204" pitchFamily="34" charset="0"/>
+              </a:rPr>
+              <a:t>building_id - Foreign key for the building </a:t>
+            </a:r>
+            <a:r>
+              <a:rPr lang="en-US" sz="1600" smtClean="0">
+                <a:latin typeface="Calibri" panose="020F0502020204030204" pitchFamily="34" charset="0"/>
+                <a:ea typeface="Calibri" panose="020F0502020204030204" pitchFamily="34" charset="0"/>
+                <a:cs typeface="Calibri" panose="020F0502020204030204" pitchFamily="34" charset="0"/>
+              </a:rPr>
+              <a:t>metadata</a:t>
+            </a:r>
+          </a:p>
+          <a:p>
+            <a:pPr fontAlgn="base"/>
+            <a:r>
+              <a:rPr lang="en-US" sz="1600" b="1">
+                <a:latin typeface="Calibri" panose="020F0502020204030204" pitchFamily="34" charset="0"/>
+                <a:ea typeface="Calibri" panose="020F0502020204030204" pitchFamily="34" charset="0"/>
+                <a:cs typeface="Calibri" panose="020F0502020204030204" pitchFamily="34" charset="0"/>
+              </a:rPr>
+              <a:t>timestamp</a:t>
+            </a:r>
+            <a:r>
+              <a:rPr lang="en-US" sz="1600">
+                <a:latin typeface="Calibri" panose="020F0502020204030204" pitchFamily="34" charset="0"/>
+                <a:ea typeface="Calibri" panose="020F0502020204030204" pitchFamily="34" charset="0"/>
+                <a:cs typeface="Calibri" panose="020F0502020204030204" pitchFamily="34" charset="0"/>
+              </a:rPr>
+              <a:t> - When the measurement was </a:t>
+            </a:r>
+            <a:r>
+              <a:rPr lang="en-US" sz="1600" smtClean="0">
+                <a:latin typeface="Calibri" panose="020F0502020204030204" pitchFamily="34" charset="0"/>
+                <a:ea typeface="Calibri" panose="020F0502020204030204" pitchFamily="34" charset="0"/>
+                <a:cs typeface="Calibri" panose="020F0502020204030204" pitchFamily="34" charset="0"/>
+              </a:rPr>
+              <a:t>taken</a:t>
+            </a:r>
+            <a:endParaRPr lang="en-US" sz="1600">
+              <a:latin typeface="Calibri" panose="020F0502020204030204" pitchFamily="34" charset="0"/>
+              <a:ea typeface="Calibri" panose="020F0502020204030204" pitchFamily="34" charset="0"/>
+              <a:cs typeface="Calibri" panose="020F0502020204030204" pitchFamily="34" charset="0"/>
+            </a:endParaRPr>
+          </a:p>
+          <a:p>
+            <a:pPr fontAlgn="base"/>
+            <a:r>
+              <a:rPr lang="en-US" sz="1600">
+                <a:latin typeface="Calibri" panose="020F0502020204030204" pitchFamily="34" charset="0"/>
+                <a:ea typeface="Calibri" panose="020F0502020204030204" pitchFamily="34" charset="0"/>
+                <a:cs typeface="Calibri" panose="020F0502020204030204" pitchFamily="34" charset="0"/>
+              </a:rPr>
+              <a:t>meter - The meter id code. Read as {0: electricity, 1: chilledwater, 2: steam, 3: hotwater</a:t>
+            </a:r>
+            <a:r>
+              <a:rPr lang="en-US" sz="1600" smtClean="0">
+                <a:latin typeface="Calibri" panose="020F0502020204030204" pitchFamily="34" charset="0"/>
+                <a:ea typeface="Calibri" panose="020F0502020204030204" pitchFamily="34" charset="0"/>
+                <a:cs typeface="Calibri" panose="020F0502020204030204" pitchFamily="34" charset="0"/>
+              </a:rPr>
+              <a:t>}</a:t>
+            </a:r>
+          </a:p>
+          <a:p>
+            <a:pPr fontAlgn="base"/>
+            <a:r>
+              <a:rPr lang="en-US" sz="1600" smtClean="0">
+                <a:latin typeface="Calibri" panose="020F0502020204030204" pitchFamily="34" charset="0"/>
+                <a:ea typeface="Calibri" panose="020F0502020204030204" pitchFamily="34" charset="0"/>
+                <a:cs typeface="Calibri" panose="020F0502020204030204" pitchFamily="34" charset="0"/>
+              </a:rPr>
+              <a:t>meter_reading</a:t>
+            </a:r>
+            <a:r>
+              <a:rPr lang="en-US" sz="1600">
+                <a:latin typeface="Calibri" panose="020F0502020204030204" pitchFamily="34" charset="0"/>
+                <a:ea typeface="Calibri" panose="020F0502020204030204" pitchFamily="34" charset="0"/>
+                <a:cs typeface="Calibri" panose="020F0502020204030204" pitchFamily="34" charset="0"/>
+              </a:rPr>
+              <a:t> - The target variable. Energy consumption in kWh (or equivalent</a:t>
+            </a:r>
+            <a:r>
+              <a:rPr lang="en-US" sz="1600" smtClean="0">
+                <a:latin typeface="Calibri" panose="020F0502020204030204" pitchFamily="34" charset="0"/>
+                <a:ea typeface="Calibri" panose="020F0502020204030204" pitchFamily="34" charset="0"/>
+                <a:cs typeface="Calibri" panose="020F0502020204030204" pitchFamily="34" charset="0"/>
+              </a:rPr>
+              <a:t>).</a:t>
+            </a:r>
+            <a:endParaRPr lang="en-US" sz="1600">
+              <a:latin typeface="Calibri" panose="020F0502020204030204" pitchFamily="34" charset="0"/>
+              <a:ea typeface="Calibri" panose="020F0502020204030204" pitchFamily="34" charset="0"/>
+              <a:cs typeface="Calibri" panose="020F0502020204030204" pitchFamily="34" charset="0"/>
+            </a:endParaRPr>
+          </a:p>
+        </p:txBody>
+      </p:sp>
+      <p:sp>
+        <p:nvSpPr>
+          <p:cNvPr id="9" name="Content Placeholder 2"/>
+          <p:cNvSpPr txBox="1">
+            <a:spLocks/>
+          </p:cNvSpPr>
+          <p:nvPr/>
+        </p:nvSpPr>
+        <p:spPr>
+          <a:xfrm>
+            <a:off x="4355976" y="1340768"/>
+            <a:ext cx="4392488" cy="2583904"/>
+          </a:xfrm>
+          <a:prstGeom prst="rect">
+            <a:avLst/>
+          </a:prstGeom>
+        </p:spPr>
+        <p:txBody>
+          <a:bodyPr vert="horz">
+            <a:normAutofit/>
+          </a:bodyPr>
+          <a:lstStyle>
+            <a:lvl1pPr marL="365760" indent="-256032" algn="l" rtl="0" eaLnBrk="1" latinLnBrk="0" hangingPunct="1">
+              <a:spcBef>
+                <a:spcPts val="300"/>
+              </a:spcBef>
+              <a:buClr>
+                <a:schemeClr val="accent3"/>
+              </a:buClr>
+              <a:buFont typeface="Georgia"/>
+              <a:buChar char="•"/>
+              <a:defRPr kumimoji="0" sz="2800" kern="1200">
+                <a:solidFill>
+                  <a:schemeClr val="tx1"/>
+                </a:solidFill>
+                <a:latin typeface="+mn-lt"/>
+                <a:ea typeface="+mn-ea"/>
+                <a:cs typeface="+mn-cs"/>
+              </a:defRPr>
+            </a:lvl1pPr>
+            <a:lvl2pPr marL="658368" indent="-246888" algn="l" rtl="0" eaLnBrk="1" latinLnBrk="0" hangingPunct="1">
+              <a:spcBef>
+                <a:spcPts val="300"/>
+              </a:spcBef>
+              <a:buClr>
+                <a:schemeClr val="accent2"/>
+              </a:buClr>
+              <a:buFont typeface="Georgia"/>
+              <a:buChar char="▫"/>
+              <a:defRPr kumimoji="0" sz="2600" kern="1200">
+                <a:solidFill>
+                  <a:schemeClr val="accent2"/>
+                </a:solidFill>
+                <a:latin typeface="+mn-lt"/>
+                <a:ea typeface="+mn-ea"/>
+                <a:cs typeface="+mn-cs"/>
+              </a:defRPr>
+            </a:lvl2pPr>
+            <a:lvl3pPr marL="923544" indent="-219456" algn="l" rtl="0" eaLnBrk="1" latinLnBrk="0" hangingPunct="1">
+              <a:spcBef>
+                <a:spcPts val="300"/>
+              </a:spcBef>
+              <a:buClr>
+                <a:schemeClr val="accent1"/>
+              </a:buClr>
+              <a:buFont typeface="Wingdings 2"/>
+              <a:buChar char=""/>
+              <a:defRPr kumimoji="0" sz="2400" kern="1200">
+                <a:solidFill>
+                  <a:schemeClr val="accent1"/>
+                </a:solidFill>
+                <a:latin typeface="+mn-lt"/>
+                <a:ea typeface="+mn-ea"/>
+                <a:cs typeface="+mn-cs"/>
+              </a:defRPr>
+            </a:lvl3pPr>
+            <a:lvl4pPr marL="1179576" indent="-201168" algn="l" rtl="0" eaLnBrk="1" latinLnBrk="0" hangingPunct="1">
+              <a:spcBef>
+                <a:spcPts val="300"/>
+              </a:spcBef>
+              <a:buClr>
+                <a:schemeClr val="accent1"/>
+              </a:buClr>
+              <a:buFont typeface="Wingdings 2"/>
+              <a:buChar char=""/>
+              <a:defRPr kumimoji="0" sz="2200" kern="1200">
+                <a:solidFill>
+                  <a:schemeClr val="accent1"/>
+                </a:solidFill>
+                <a:latin typeface="+mn-lt"/>
+                <a:ea typeface="+mn-ea"/>
+                <a:cs typeface="+mn-cs"/>
+              </a:defRPr>
+            </a:lvl4pPr>
+            <a:lvl5pPr marL="1389888" indent="-182880" algn="l" rtl="0" eaLnBrk="1" latinLnBrk="0" hangingPunct="1">
+              <a:spcBef>
+                <a:spcPts val="300"/>
+              </a:spcBef>
+              <a:buClr>
+                <a:schemeClr val="accent3"/>
+              </a:buClr>
+              <a:buFont typeface="Georgia"/>
+              <a:buChar char="▫"/>
+              <a:defRPr kumimoji="0" sz="2000" kern="1200">
+                <a:solidFill>
+                  <a:schemeClr val="accent3"/>
+                </a:solidFill>
+                <a:latin typeface="+mn-lt"/>
+                <a:ea typeface="+mn-ea"/>
+                <a:cs typeface="+mn-cs"/>
+              </a:defRPr>
+            </a:lvl5pPr>
+            <a:lvl6pPr marL="1609344" indent="-182880" algn="l" rtl="0" eaLnBrk="1" latinLnBrk="0" hangingPunct="1">
+              <a:spcBef>
+                <a:spcPts val="300"/>
+              </a:spcBef>
+              <a:buClr>
+                <a:schemeClr val="accent3"/>
+              </a:buClr>
+              <a:buFont typeface="Georgia"/>
+              <a:buChar char="▫"/>
+              <a:defRPr kumimoji="0" sz="1800" kern="1200">
+                <a:solidFill>
+                  <a:schemeClr val="accent3"/>
+                </a:solidFill>
+                <a:latin typeface="+mn-lt"/>
+                <a:ea typeface="+mn-ea"/>
+                <a:cs typeface="+mn-cs"/>
+              </a:defRPr>
+            </a:lvl6pPr>
+            <a:lvl7pPr marL="1828800" indent="-182880" algn="l" rtl="0" eaLnBrk="1" latinLnBrk="0" hangingPunct="1">
+              <a:spcBef>
+                <a:spcPts val="300"/>
+              </a:spcBef>
+              <a:buClr>
+                <a:schemeClr val="accent3"/>
+              </a:buClr>
+              <a:buFont typeface="Georgia"/>
+              <a:buChar char="▫"/>
+              <a:defRPr kumimoji="0" sz="1600" kern="1200">
+                <a:solidFill>
+                  <a:schemeClr val="accent3"/>
+                </a:solidFill>
+                <a:latin typeface="+mn-lt"/>
+                <a:ea typeface="+mn-ea"/>
+                <a:cs typeface="+mn-cs"/>
+              </a:defRPr>
+            </a:lvl7pPr>
+            <a:lvl8pPr marL="2029968" indent="-182880" algn="l" rtl="0" eaLnBrk="1" latinLnBrk="0" hangingPunct="1">
+              <a:spcBef>
+                <a:spcPts val="300"/>
+              </a:spcBef>
+              <a:buClr>
+                <a:schemeClr val="accent3"/>
+              </a:buClr>
+              <a:buFont typeface="Georgia"/>
+              <a:buChar char="◦"/>
+              <a:defRPr kumimoji="0" sz="1500" kern="1200">
+                <a:solidFill>
+                  <a:schemeClr val="accent3"/>
+                </a:solidFill>
+                <a:latin typeface="+mn-lt"/>
+                <a:ea typeface="+mn-ea"/>
+                <a:cs typeface="+mn-cs"/>
+              </a:defRPr>
+            </a:lvl8pPr>
+            <a:lvl9pPr marL="2240280" indent="-182880" algn="l" rtl="0" eaLnBrk="1" latinLnBrk="0" hangingPunct="1">
+              <a:spcBef>
+                <a:spcPts val="300"/>
+              </a:spcBef>
+              <a:buClr>
+                <a:schemeClr val="accent3"/>
+              </a:buClr>
+              <a:buFont typeface="Georgia"/>
+              <a:buChar char="◦"/>
+              <a:defRPr kumimoji="0" sz="1400" kern="1200" baseline="0">
+                <a:solidFill>
+                  <a:schemeClr val="accent3"/>
+                </a:solidFill>
+                <a:latin typeface="+mn-lt"/>
+                <a:ea typeface="+mn-ea"/>
+                <a:cs typeface="+mn-cs"/>
+              </a:defRPr>
+            </a:lvl9pPr>
+          </a:lstStyle>
+          <a:p>
+            <a:pPr marL="109728" indent="0" fontAlgn="base">
+              <a:buNone/>
+            </a:pPr>
+            <a:r>
+              <a:rPr lang="en-US" sz="1600" b="1" smtClean="0">
+                <a:latin typeface="Calibri" panose="020F0502020204030204" pitchFamily="34" charset="0"/>
+                <a:ea typeface="Calibri" panose="020F0502020204030204" pitchFamily="34" charset="0"/>
+                <a:cs typeface="Calibri" panose="020F0502020204030204" pitchFamily="34" charset="0"/>
+              </a:rPr>
+              <a:t>building_meta.csv</a:t>
+            </a:r>
+          </a:p>
+          <a:p>
+            <a:pPr fontAlgn="base"/>
+            <a:r>
+              <a:rPr lang="en-US" sz="1600">
+                <a:latin typeface="Calibri" panose="020F0502020204030204" pitchFamily="34" charset="0"/>
+                <a:ea typeface="Calibri" panose="020F0502020204030204" pitchFamily="34" charset="0"/>
+                <a:cs typeface="Calibri" panose="020F0502020204030204" pitchFamily="34" charset="0"/>
+              </a:rPr>
+              <a:t>building_id - Foreign key for </a:t>
+            </a:r>
+            <a:r>
+              <a:rPr lang="en-US" sz="1600" smtClean="0">
+                <a:latin typeface="Calibri" panose="020F0502020204030204" pitchFamily="34" charset="0"/>
+                <a:ea typeface="Calibri" panose="020F0502020204030204" pitchFamily="34" charset="0"/>
+                <a:cs typeface="Calibri" panose="020F0502020204030204" pitchFamily="34" charset="0"/>
+              </a:rPr>
+              <a:t>training.csv</a:t>
+            </a:r>
+            <a:endParaRPr lang="en-US" sz="1600" b="1" smtClean="0">
+              <a:latin typeface="Calibri" panose="020F0502020204030204" pitchFamily="34" charset="0"/>
+              <a:ea typeface="Calibri" panose="020F0502020204030204" pitchFamily="34" charset="0"/>
+              <a:cs typeface="Calibri" panose="020F0502020204030204" pitchFamily="34" charset="0"/>
+            </a:endParaRPr>
+          </a:p>
+          <a:p>
+            <a:pPr fontAlgn="base"/>
+            <a:r>
+              <a:rPr lang="en-US" sz="1600" smtClean="0">
+                <a:latin typeface="Calibri" panose="020F0502020204030204" pitchFamily="34" charset="0"/>
+                <a:ea typeface="Calibri" panose="020F0502020204030204" pitchFamily="34" charset="0"/>
+                <a:cs typeface="Calibri" panose="020F0502020204030204" pitchFamily="34" charset="0"/>
+              </a:rPr>
+              <a:t>site_id</a:t>
+            </a:r>
+            <a:r>
+              <a:rPr lang="en-US" sz="1600">
+                <a:latin typeface="Calibri" panose="020F0502020204030204" pitchFamily="34" charset="0"/>
+                <a:ea typeface="Calibri" panose="020F0502020204030204" pitchFamily="34" charset="0"/>
+                <a:cs typeface="Calibri" panose="020F0502020204030204" pitchFamily="34" charset="0"/>
+              </a:rPr>
+              <a:t> - Foreign key for the weather files.</a:t>
+            </a:r>
+          </a:p>
+          <a:p>
+            <a:pPr fontAlgn="base"/>
+            <a:r>
+              <a:rPr lang="en-US" sz="1600" smtClean="0">
+                <a:latin typeface="Calibri" panose="020F0502020204030204" pitchFamily="34" charset="0"/>
+                <a:ea typeface="Calibri" panose="020F0502020204030204" pitchFamily="34" charset="0"/>
+                <a:cs typeface="Calibri" panose="020F0502020204030204" pitchFamily="34" charset="0"/>
+              </a:rPr>
+              <a:t>primary_use</a:t>
+            </a:r>
+            <a:r>
+              <a:rPr lang="en-US" sz="1600">
+                <a:latin typeface="Calibri" panose="020F0502020204030204" pitchFamily="34" charset="0"/>
+                <a:ea typeface="Calibri" panose="020F0502020204030204" pitchFamily="34" charset="0"/>
+                <a:cs typeface="Calibri" panose="020F0502020204030204" pitchFamily="34" charset="0"/>
+              </a:rPr>
+              <a:t> - Indicator of the primary category of activities for the building based on </a:t>
+            </a:r>
+            <a:r>
+              <a:rPr lang="en-US" sz="1600">
+                <a:latin typeface="Calibri" panose="020F0502020204030204" pitchFamily="34" charset="0"/>
+                <a:ea typeface="Calibri" panose="020F0502020204030204" pitchFamily="34" charset="0"/>
+                <a:cs typeface="Calibri" panose="020F0502020204030204" pitchFamily="34" charset="0"/>
+                <a:hlinkClick r:id="rId2"/>
+              </a:rPr>
+              <a:t>EnergyStar property type definitions</a:t>
+            </a:r>
+            <a:endParaRPr lang="en-US" sz="1600">
+              <a:latin typeface="Calibri" panose="020F0502020204030204" pitchFamily="34" charset="0"/>
+              <a:ea typeface="Calibri" panose="020F0502020204030204" pitchFamily="34" charset="0"/>
+              <a:cs typeface="Calibri" panose="020F0502020204030204" pitchFamily="34" charset="0"/>
+            </a:endParaRPr>
+          </a:p>
+          <a:p>
+            <a:pPr fontAlgn="base"/>
+            <a:r>
+              <a:rPr lang="en-US" sz="1600">
+                <a:latin typeface="Calibri" panose="020F0502020204030204" pitchFamily="34" charset="0"/>
+                <a:ea typeface="Calibri" panose="020F0502020204030204" pitchFamily="34" charset="0"/>
+                <a:cs typeface="Calibri" panose="020F0502020204030204" pitchFamily="34" charset="0"/>
+              </a:rPr>
+              <a:t>square_feet - Gross floor area of the building</a:t>
+            </a:r>
+          </a:p>
+          <a:p>
+            <a:pPr fontAlgn="base"/>
+            <a:r>
+              <a:rPr lang="en-US" sz="1600">
+                <a:latin typeface="Calibri" panose="020F0502020204030204" pitchFamily="34" charset="0"/>
+                <a:ea typeface="Calibri" panose="020F0502020204030204" pitchFamily="34" charset="0"/>
+                <a:cs typeface="Calibri" panose="020F0502020204030204" pitchFamily="34" charset="0"/>
+              </a:rPr>
+              <a:t>year_built - Year building was opened</a:t>
+            </a:r>
+          </a:p>
+          <a:p>
+            <a:pPr fontAlgn="base"/>
+            <a:r>
+              <a:rPr lang="en-US" sz="1600">
+                <a:latin typeface="Calibri" panose="020F0502020204030204" pitchFamily="34" charset="0"/>
+                <a:ea typeface="Calibri" panose="020F0502020204030204" pitchFamily="34" charset="0"/>
+                <a:cs typeface="Calibri" panose="020F0502020204030204" pitchFamily="34" charset="0"/>
+              </a:rPr>
+              <a:t>floor_count - Number of floors of the building</a:t>
+            </a:r>
+          </a:p>
+        </p:txBody>
+      </p:sp>
+      <p:cxnSp>
+        <p:nvCxnSpPr>
+          <p:cNvPr id="7" name="Straight Arrow Connector 6"/>
+          <p:cNvCxnSpPr/>
+          <p:nvPr/>
+        </p:nvCxnSpPr>
+        <p:spPr>
+          <a:xfrm>
+            <a:off x="3995936" y="1801032"/>
+            <a:ext cx="495173" cy="0"/>
+          </a:xfrm>
+          <a:prstGeom prst="straightConnector1">
+            <a:avLst/>
+          </a:prstGeom>
+          <a:ln w="19050">
+            <a:solidFill>
+              <a:srgbClr val="FF0000"/>
+            </a:solidFill>
+            <a:tailEnd type="arrow"/>
+          </a:ln>
+        </p:spPr>
+        <p:style>
+          <a:lnRef idx="1">
+            <a:schemeClr val="accent4"/>
+          </a:lnRef>
+          <a:fillRef idx="0">
+            <a:schemeClr val="accent4"/>
+          </a:fillRef>
+          <a:effectRef idx="0">
+            <a:schemeClr val="accent4"/>
+          </a:effectRef>
+          <a:fontRef idx="minor">
+            <a:schemeClr val="tx1"/>
+          </a:fontRef>
+        </p:style>
+      </p:cxnSp>
+      <p:sp>
+        <p:nvSpPr>
+          <p:cNvPr id="14" name="Content Placeholder 2"/>
+          <p:cNvSpPr txBox="1">
+            <a:spLocks/>
+          </p:cNvSpPr>
+          <p:nvPr/>
+        </p:nvSpPr>
+        <p:spPr>
+          <a:xfrm>
+            <a:off x="671509" y="4279372"/>
+            <a:ext cx="7344816" cy="2245974"/>
+          </a:xfrm>
+          <a:prstGeom prst="rect">
+            <a:avLst/>
+          </a:prstGeom>
+        </p:spPr>
+        <p:txBody>
+          <a:bodyPr vert="horz">
+            <a:normAutofit/>
+          </a:bodyPr>
+          <a:lstStyle>
+            <a:lvl1pPr marL="365760" indent="-256032" algn="l" rtl="0" eaLnBrk="1" latinLnBrk="0" hangingPunct="1">
+              <a:spcBef>
+                <a:spcPts val="300"/>
+              </a:spcBef>
+              <a:buClr>
+                <a:schemeClr val="accent3"/>
+              </a:buClr>
+              <a:buFont typeface="Georgia"/>
+              <a:buChar char="•"/>
+              <a:defRPr kumimoji="0" sz="2800" kern="1200">
+                <a:solidFill>
+                  <a:schemeClr val="tx1"/>
+                </a:solidFill>
+                <a:latin typeface="+mn-lt"/>
+                <a:ea typeface="+mn-ea"/>
+                <a:cs typeface="+mn-cs"/>
+              </a:defRPr>
+            </a:lvl1pPr>
+            <a:lvl2pPr marL="658368" indent="-246888" algn="l" rtl="0" eaLnBrk="1" latinLnBrk="0" hangingPunct="1">
+              <a:spcBef>
+                <a:spcPts val="300"/>
+              </a:spcBef>
+              <a:buClr>
+                <a:schemeClr val="accent2"/>
+              </a:buClr>
+              <a:buFont typeface="Georgia"/>
+              <a:buChar char="▫"/>
+              <a:defRPr kumimoji="0" sz="2600" kern="1200">
+                <a:solidFill>
+                  <a:schemeClr val="accent2"/>
+                </a:solidFill>
+                <a:latin typeface="+mn-lt"/>
+                <a:ea typeface="+mn-ea"/>
+                <a:cs typeface="+mn-cs"/>
+              </a:defRPr>
+            </a:lvl2pPr>
+            <a:lvl3pPr marL="923544" indent="-219456" algn="l" rtl="0" eaLnBrk="1" latinLnBrk="0" hangingPunct="1">
+              <a:spcBef>
+                <a:spcPts val="300"/>
+              </a:spcBef>
+              <a:buClr>
+                <a:schemeClr val="accent1"/>
+              </a:buClr>
+              <a:buFont typeface="Wingdings 2"/>
+              <a:buChar char=""/>
+              <a:defRPr kumimoji="0" sz="2400" kern="1200">
+                <a:solidFill>
+                  <a:schemeClr val="accent1"/>
+                </a:solidFill>
+                <a:latin typeface="+mn-lt"/>
+                <a:ea typeface="+mn-ea"/>
+                <a:cs typeface="+mn-cs"/>
+              </a:defRPr>
+            </a:lvl3pPr>
+            <a:lvl4pPr marL="1179576" indent="-201168" algn="l" rtl="0" eaLnBrk="1" latinLnBrk="0" hangingPunct="1">
+              <a:spcBef>
+                <a:spcPts val="300"/>
+              </a:spcBef>
+              <a:buClr>
+                <a:schemeClr val="accent1"/>
+              </a:buClr>
+              <a:buFont typeface="Wingdings 2"/>
+              <a:buChar char=""/>
+              <a:defRPr kumimoji="0" sz="2200" kern="1200">
+                <a:solidFill>
+                  <a:schemeClr val="accent1"/>
+                </a:solidFill>
+                <a:latin typeface="+mn-lt"/>
+                <a:ea typeface="+mn-ea"/>
+                <a:cs typeface="+mn-cs"/>
+              </a:defRPr>
+            </a:lvl4pPr>
+            <a:lvl5pPr marL="1389888" indent="-182880" algn="l" rtl="0" eaLnBrk="1" latinLnBrk="0" hangingPunct="1">
+              <a:spcBef>
+                <a:spcPts val="300"/>
+              </a:spcBef>
+              <a:buClr>
+                <a:schemeClr val="accent3"/>
+              </a:buClr>
+              <a:buFont typeface="Georgia"/>
+              <a:buChar char="▫"/>
+              <a:defRPr kumimoji="0" sz="2000" kern="1200">
+                <a:solidFill>
+                  <a:schemeClr val="accent3"/>
+                </a:solidFill>
+                <a:latin typeface="+mn-lt"/>
+                <a:ea typeface="+mn-ea"/>
+                <a:cs typeface="+mn-cs"/>
+              </a:defRPr>
+            </a:lvl5pPr>
+            <a:lvl6pPr marL="1609344" indent="-182880" algn="l" rtl="0" eaLnBrk="1" latinLnBrk="0" hangingPunct="1">
+              <a:spcBef>
+                <a:spcPts val="300"/>
+              </a:spcBef>
+              <a:buClr>
+                <a:schemeClr val="accent3"/>
+              </a:buClr>
+              <a:buFont typeface="Georgia"/>
+              <a:buChar char="▫"/>
+              <a:defRPr kumimoji="0" sz="1800" kern="1200">
+                <a:solidFill>
+                  <a:schemeClr val="accent3"/>
+                </a:solidFill>
+                <a:latin typeface="+mn-lt"/>
+                <a:ea typeface="+mn-ea"/>
+                <a:cs typeface="+mn-cs"/>
+              </a:defRPr>
+            </a:lvl6pPr>
+            <a:lvl7pPr marL="1828800" indent="-182880" algn="l" rtl="0" eaLnBrk="1" latinLnBrk="0" hangingPunct="1">
+              <a:spcBef>
+                <a:spcPts val="300"/>
+              </a:spcBef>
+              <a:buClr>
+                <a:schemeClr val="accent3"/>
+              </a:buClr>
+              <a:buFont typeface="Georgia"/>
+              <a:buChar char="▫"/>
+              <a:defRPr kumimoji="0" sz="1600" kern="1200">
+                <a:solidFill>
+                  <a:schemeClr val="accent3"/>
+                </a:solidFill>
+                <a:latin typeface="+mn-lt"/>
+                <a:ea typeface="+mn-ea"/>
+                <a:cs typeface="+mn-cs"/>
+              </a:defRPr>
+            </a:lvl7pPr>
+            <a:lvl8pPr marL="2029968" indent="-182880" algn="l" rtl="0" eaLnBrk="1" latinLnBrk="0" hangingPunct="1">
+              <a:spcBef>
+                <a:spcPts val="300"/>
+              </a:spcBef>
+              <a:buClr>
+                <a:schemeClr val="accent3"/>
+              </a:buClr>
+              <a:buFont typeface="Georgia"/>
+              <a:buChar char="◦"/>
+              <a:defRPr kumimoji="0" sz="1500" kern="1200">
+                <a:solidFill>
+                  <a:schemeClr val="accent3"/>
+                </a:solidFill>
+                <a:latin typeface="+mn-lt"/>
+                <a:ea typeface="+mn-ea"/>
+                <a:cs typeface="+mn-cs"/>
+              </a:defRPr>
+            </a:lvl8pPr>
+            <a:lvl9pPr marL="2240280" indent="-182880" algn="l" rtl="0" eaLnBrk="1" latinLnBrk="0" hangingPunct="1">
+              <a:spcBef>
+                <a:spcPts val="300"/>
+              </a:spcBef>
+              <a:buClr>
+                <a:schemeClr val="accent3"/>
+              </a:buClr>
+              <a:buFont typeface="Georgia"/>
+              <a:buChar char="◦"/>
+              <a:defRPr kumimoji="0" sz="1400" kern="1200" baseline="0">
+                <a:solidFill>
+                  <a:schemeClr val="accent3"/>
+                </a:solidFill>
+                <a:latin typeface="+mn-lt"/>
+                <a:ea typeface="+mn-ea"/>
+                <a:cs typeface="+mn-cs"/>
+              </a:defRPr>
+            </a:lvl9pPr>
+          </a:lstStyle>
+          <a:p>
+            <a:pPr marL="109728" indent="0" algn="ctr" fontAlgn="base">
+              <a:buNone/>
+            </a:pPr>
+            <a:r>
+              <a:rPr lang="en-US" sz="1600" b="1">
+                <a:latin typeface="Calibri" panose="020F0502020204030204" pitchFamily="34" charset="0"/>
+                <a:ea typeface="Calibri" panose="020F0502020204030204" pitchFamily="34" charset="0"/>
+                <a:cs typeface="Calibri" panose="020F0502020204030204" pitchFamily="34" charset="0"/>
+              </a:rPr>
+              <a:t>building_meta.csv</a:t>
+            </a:r>
+          </a:p>
+          <a:p>
+            <a:pPr fontAlgn="base"/>
+            <a:r>
+              <a:rPr lang="en-US" sz="1600">
+                <a:latin typeface="Calibri" panose="020F0502020204030204" pitchFamily="34" charset="0"/>
+                <a:ea typeface="Calibri" panose="020F0502020204030204" pitchFamily="34" charset="0"/>
+                <a:cs typeface="Calibri" panose="020F0502020204030204" pitchFamily="34" charset="0"/>
+              </a:rPr>
+              <a:t>site_id - Foreign key for the weather files.</a:t>
+            </a:r>
+          </a:p>
+          <a:p>
+            <a:pPr fontAlgn="base"/>
+            <a:r>
+              <a:rPr lang="en-US" sz="1600">
+                <a:latin typeface="Calibri" panose="020F0502020204030204" pitchFamily="34" charset="0"/>
+                <a:ea typeface="Calibri" panose="020F0502020204030204" pitchFamily="34" charset="0"/>
+                <a:cs typeface="Calibri" panose="020F0502020204030204" pitchFamily="34" charset="0"/>
+              </a:rPr>
+              <a:t>building_id - Foreign key for training.csv</a:t>
+            </a:r>
+          </a:p>
+          <a:p>
+            <a:pPr fontAlgn="base"/>
+            <a:r>
+              <a:rPr lang="en-US" sz="1600">
+                <a:latin typeface="Calibri" panose="020F0502020204030204" pitchFamily="34" charset="0"/>
+                <a:ea typeface="Calibri" panose="020F0502020204030204" pitchFamily="34" charset="0"/>
+                <a:cs typeface="Calibri" panose="020F0502020204030204" pitchFamily="34" charset="0"/>
+              </a:rPr>
+              <a:t>primary_use - Indicator of the primary category of activities for the </a:t>
+            </a:r>
+            <a:r>
+              <a:rPr lang="en-US" sz="1600" smtClean="0">
+                <a:latin typeface="Calibri" panose="020F0502020204030204" pitchFamily="34" charset="0"/>
+                <a:ea typeface="Calibri" panose="020F0502020204030204" pitchFamily="34" charset="0"/>
+                <a:cs typeface="Calibri" panose="020F0502020204030204" pitchFamily="34" charset="0"/>
+              </a:rPr>
+              <a:t>building</a:t>
+            </a:r>
+          </a:p>
+          <a:p>
+            <a:pPr fontAlgn="base"/>
+            <a:r>
+              <a:rPr lang="en-US" sz="1600" smtClean="0">
+                <a:latin typeface="Calibri" panose="020F0502020204030204" pitchFamily="34" charset="0"/>
+                <a:ea typeface="Calibri" panose="020F0502020204030204" pitchFamily="34" charset="0"/>
+                <a:cs typeface="Calibri" panose="020F0502020204030204" pitchFamily="34" charset="0"/>
+              </a:rPr>
+              <a:t>square_feet</a:t>
+            </a:r>
+            <a:r>
+              <a:rPr lang="en-US" sz="1600">
+                <a:latin typeface="Calibri" panose="020F0502020204030204" pitchFamily="34" charset="0"/>
+                <a:ea typeface="Calibri" panose="020F0502020204030204" pitchFamily="34" charset="0"/>
+                <a:cs typeface="Calibri" panose="020F0502020204030204" pitchFamily="34" charset="0"/>
+              </a:rPr>
+              <a:t> - Gross floor area of the building</a:t>
+            </a:r>
+          </a:p>
+          <a:p>
+            <a:pPr fontAlgn="base"/>
+            <a:r>
+              <a:rPr lang="en-US" sz="1600">
+                <a:latin typeface="Calibri" panose="020F0502020204030204" pitchFamily="34" charset="0"/>
+                <a:ea typeface="Calibri" panose="020F0502020204030204" pitchFamily="34" charset="0"/>
+                <a:cs typeface="Calibri" panose="020F0502020204030204" pitchFamily="34" charset="0"/>
+              </a:rPr>
+              <a:t>year_built - Year building was opened</a:t>
+            </a:r>
+          </a:p>
+          <a:p>
+            <a:pPr fontAlgn="base"/>
+            <a:r>
+              <a:rPr lang="en-US" sz="1600">
+                <a:latin typeface="Calibri" panose="020F0502020204030204" pitchFamily="34" charset="0"/>
+                <a:ea typeface="Calibri" panose="020F0502020204030204" pitchFamily="34" charset="0"/>
+                <a:cs typeface="Calibri" panose="020F0502020204030204" pitchFamily="34" charset="0"/>
+              </a:rPr>
+              <a:t>floor_count - Number of floors of the building</a:t>
+            </a:r>
+          </a:p>
+        </p:txBody>
+      </p:sp>
+      <p:cxnSp>
+        <p:nvCxnSpPr>
+          <p:cNvPr id="13" name="Elbow Connector 12"/>
+          <p:cNvCxnSpPr>
+            <a:endCxn id="14" idx="0"/>
+          </p:cNvCxnSpPr>
+          <p:nvPr/>
+        </p:nvCxnSpPr>
+        <p:spPr>
+          <a:xfrm rot="5400000">
+            <a:off x="3318191" y="3106454"/>
+            <a:ext cx="2198644" cy="147192"/>
+          </a:xfrm>
+          <a:prstGeom prst="bentConnector3">
+            <a:avLst>
+              <a:gd name="adj1" fmla="val -501"/>
+            </a:avLst>
+          </a:prstGeom>
+          <a:ln w="19050">
+            <a:solidFill>
+              <a:srgbClr val="00B0F0"/>
+            </a:solidFill>
+            <a:tailEnd type="arrow"/>
+          </a:ln>
+        </p:spPr>
+        <p:style>
+          <a:lnRef idx="1">
+            <a:schemeClr val="accent1"/>
+          </a:lnRef>
+          <a:fillRef idx="0">
+            <a:schemeClr val="accent1"/>
+          </a:fillRef>
+          <a:effectRef idx="0">
+            <a:schemeClr val="accent1"/>
+          </a:effectRef>
+          <a:fontRef idx="minor">
+            <a:schemeClr val="tx1"/>
+          </a:fontRef>
+        </p:style>
+      </p:cxnSp>
+    </p:spTree>
+    <p:extLst>
+      <p:ext uri="{BB962C8B-B14F-4D97-AF65-F5344CB8AC3E}">
+        <p14:creationId xmlns:p14="http://schemas.microsoft.com/office/powerpoint/2010/main" val="1393798023"/>
+      </p:ext>
+    </p:extLst>
+  </p:cSld>
+  <p:clrMapOvr>
+    <a:masterClrMapping/>
+  </p:clrMapOvr>
+</p:sld>
+</file>
+
+<file path=ppt/slides/slide5.xml><?xml version="1.0" encoding="utf-8"?>
+<p:sld xmlns:a="http://schemas.openxmlformats.org/drawingml/2006/main" xmlns:r="http://schemas.openxmlformats.org/officeDocument/2006/relationships" xmlns:p="http://schemas.openxmlformats.org/presentationml/2006/main">
+  <p:cSld>
+    <p:spTree>
+      <p:nvGrpSpPr>
+        <p:cNvPr id="1" name=""/>
+        <p:cNvGrpSpPr/>
+        <p:nvPr/>
+      </p:nvGrpSpPr>
+      <p:grpSpPr>
+        <a:xfrm>
+          <a:off x="0" y="0"/>
+          <a:ext cx="0" cy="0"/>
+          <a:chOff x="0" y="0"/>
+          <a:chExt cx="0" cy="0"/>
+        </a:xfrm>
+      </p:grpSpPr>
+      <p:sp>
+        <p:nvSpPr>
+          <p:cNvPr id="2" name="Title 1"/>
+          <p:cNvSpPr>
+            <a:spLocks noGrp="1"/>
+          </p:cNvSpPr>
+          <p:nvPr>
+            <p:ph type="title"/>
+          </p:nvPr>
+        </p:nvSpPr>
+        <p:spPr/>
+        <p:txBody>
+          <a:bodyPr>
+            <a:normAutofit/>
+          </a:bodyPr>
+          <a:lstStyle/>
+          <a:p>
+            <a:r>
+              <a:rPr lang="en-US"/>
+              <a:t>Problem </a:t>
+            </a:r>
+            <a:r>
+              <a:rPr lang="en-US" smtClean="0"/>
+              <a:t>formulation</a:t>
+            </a:r>
+            <a:endParaRPr lang="uk-UA"/>
+          </a:p>
+        </p:txBody>
+      </p:sp>
+      <p:sp>
+        <p:nvSpPr>
+          <p:cNvPr id="3" name="Content Placeholder 2"/>
+          <p:cNvSpPr>
+            <a:spLocks noGrp="1"/>
+          </p:cNvSpPr>
+          <p:nvPr>
+            <p:ph idx="1"/>
+          </p:nvPr>
+        </p:nvSpPr>
+        <p:spPr/>
+        <p:txBody>
+          <a:bodyPr/>
+          <a:lstStyle/>
+          <a:p>
+            <a:r>
+              <a:rPr lang="en-US" smtClean="0"/>
+              <a:t>Task #1:</a:t>
+            </a:r>
+          </a:p>
+          <a:p>
+            <a:r>
+              <a:rPr lang="en-US" smtClean="0"/>
+              <a:t>Task #2:</a:t>
+            </a:r>
+            <a:endParaRPr lang="en-US"/>
+          </a:p>
+          <a:p>
+            <a:endParaRPr lang="uk-UA"/>
+          </a:p>
+        </p:txBody>
+      </p:sp>
+    </p:spTree>
+    <p:extLst>
+      <p:ext uri="{BB962C8B-B14F-4D97-AF65-F5344CB8AC3E}">
+        <p14:creationId xmlns:p14="http://schemas.microsoft.com/office/powerpoint/2010/main" val="4243169781"/>
       </p:ext>
     </p:extLst>
   </p:cSld>

</xml_diff>

<commit_message>
New datasets added & pres. update
</commit_message>
<xml_diff>
--- a/Presentation ASHRAE.pptx
+++ b/Presentation ASHRAE.pptx
@@ -10,6 +10,10 @@
     <p:sldId id="258" r:id="rId4"/>
     <p:sldId id="259" r:id="rId5"/>
     <p:sldId id="260" r:id="rId6"/>
+    <p:sldId id="261" r:id="rId7"/>
+    <p:sldId id="262" r:id="rId8"/>
+    <p:sldId id="263" r:id="rId9"/>
+    <p:sldId id="264" r:id="rId10"/>
   </p:sldIdLst>
   <p:sldSz cx="9144000" cy="6858000" type="screen4x3"/>
   <p:notesSz cx="6858000" cy="9144000"/>
@@ -5743,20 +5747,82 @@
           <a:bodyPr/>
           <a:lstStyle/>
           <a:p>
-            <a:r>
-              <a:rPr lang="en-US" smtClean="0"/>
+            <a:pPr algn="just"/>
+            <a:r>
+              <a:rPr lang="en-US" smtClean="0">
+                <a:latin typeface="Calibri" panose="020F0502020204030204" pitchFamily="34" charset="0"/>
+                <a:ea typeface="Calibri" panose="020F0502020204030204" pitchFamily="34" charset="0"/>
+                <a:cs typeface="Calibri" panose="020F0502020204030204" pitchFamily="34" charset="0"/>
+              </a:rPr>
               <a:t>Task #1:</a:t>
             </a:r>
-          </a:p>
-          <a:p>
-            <a:r>
-              <a:rPr lang="en-US" smtClean="0"/>
+            <a:endParaRPr lang="uk-UA" smtClean="0">
+              <a:latin typeface="Calibri" panose="020F0502020204030204" pitchFamily="34" charset="0"/>
+              <a:ea typeface="Calibri" panose="020F0502020204030204" pitchFamily="34" charset="0"/>
+              <a:cs typeface="Calibri" panose="020F0502020204030204" pitchFamily="34" charset="0"/>
+            </a:endParaRPr>
+          </a:p>
+          <a:p>
+            <a:pPr lvl="1" algn="just"/>
+            <a:r>
+              <a:rPr lang="en-US" b="1" smtClean="0">
+                <a:latin typeface="Calibri" panose="020F0502020204030204" pitchFamily="34" charset="0"/>
+                <a:ea typeface="Calibri" panose="020F0502020204030204" pitchFamily="34" charset="0"/>
+                <a:cs typeface="Calibri" panose="020F0502020204030204" pitchFamily="34" charset="0"/>
+              </a:rPr>
+              <a:t>Predict an outside temperature after N hours (N = 1, 2, …, 24), given the lags of energy usage, outside temp</a:t>
+            </a:r>
+            <a:r>
+              <a:rPr lang="en-US" b="1">
+                <a:latin typeface="Calibri" panose="020F0502020204030204" pitchFamily="34" charset="0"/>
+                <a:ea typeface="Calibri" panose="020F0502020204030204" pitchFamily="34" charset="0"/>
+                <a:cs typeface="Calibri" panose="020F0502020204030204" pitchFamily="34" charset="0"/>
+              </a:rPr>
+              <a:t>e</a:t>
+            </a:r>
+            <a:r>
+              <a:rPr lang="en-US" b="1" smtClean="0">
+                <a:latin typeface="Calibri" panose="020F0502020204030204" pitchFamily="34" charset="0"/>
+                <a:ea typeface="Calibri" panose="020F0502020204030204" pitchFamily="34" charset="0"/>
+                <a:cs typeface="Calibri" panose="020F0502020204030204" pitchFamily="34" charset="0"/>
+              </a:rPr>
+              <a:t>rature and weather data (forecast).</a:t>
+            </a:r>
+          </a:p>
+          <a:p>
+            <a:pPr algn="just"/>
+            <a:r>
+              <a:rPr lang="en-US" smtClean="0">
+                <a:latin typeface="Calibri" panose="020F0502020204030204" pitchFamily="34" charset="0"/>
+                <a:ea typeface="Calibri" panose="020F0502020204030204" pitchFamily="34" charset="0"/>
+                <a:cs typeface="Calibri" panose="020F0502020204030204" pitchFamily="34" charset="0"/>
+              </a:rPr>
               <a:t>Task #2:</a:t>
             </a:r>
-            <a:endParaRPr lang="en-US"/>
-          </a:p>
-          <a:p>
-            <a:endParaRPr lang="uk-UA"/>
+          </a:p>
+          <a:p>
+            <a:pPr lvl="1" algn="just"/>
+            <a:r>
+              <a:rPr lang="en-US" b="1" smtClean="0">
+                <a:latin typeface="Calibri" panose="020F0502020204030204" pitchFamily="34" charset="0"/>
+                <a:ea typeface="Calibri" panose="020F0502020204030204" pitchFamily="34" charset="0"/>
+                <a:cs typeface="Calibri" panose="020F0502020204030204" pitchFamily="34" charset="0"/>
+              </a:rPr>
+              <a:t>Predict an energy consumption given the lags of weather data, building metadata and, optionally, the lags of energy consumption.</a:t>
+            </a:r>
+            <a:endParaRPr lang="en-US" b="1">
+              <a:latin typeface="Calibri" panose="020F0502020204030204" pitchFamily="34" charset="0"/>
+              <a:ea typeface="Calibri" panose="020F0502020204030204" pitchFamily="34" charset="0"/>
+              <a:cs typeface="Calibri" panose="020F0502020204030204" pitchFamily="34" charset="0"/>
+            </a:endParaRPr>
+          </a:p>
+          <a:p>
+            <a:pPr algn="just"/>
+            <a:endParaRPr lang="uk-UA">
+              <a:latin typeface="Calibri" panose="020F0502020204030204" pitchFamily="34" charset="0"/>
+              <a:ea typeface="Calibri" panose="020F0502020204030204" pitchFamily="34" charset="0"/>
+              <a:cs typeface="Calibri" panose="020F0502020204030204" pitchFamily="34" charset="0"/>
+            </a:endParaRPr>
           </a:p>
         </p:txBody>
       </p:sp>
@@ -5764,6 +5830,786 @@
     <p:extLst>
       <p:ext uri="{BB962C8B-B14F-4D97-AF65-F5344CB8AC3E}">
         <p14:creationId xmlns:p14="http://schemas.microsoft.com/office/powerpoint/2010/main" val="4243169781"/>
+      </p:ext>
+    </p:extLst>
+  </p:cSld>
+  <p:clrMapOvr>
+    <a:masterClrMapping/>
+  </p:clrMapOvr>
+</p:sld>
+</file>
+
+<file path=ppt/slides/slide6.xml><?xml version="1.0" encoding="utf-8"?>
+<p:sld xmlns:a="http://schemas.openxmlformats.org/drawingml/2006/main" xmlns:r="http://schemas.openxmlformats.org/officeDocument/2006/relationships" xmlns:p="http://schemas.openxmlformats.org/presentationml/2006/main">
+  <p:cSld>
+    <p:spTree>
+      <p:nvGrpSpPr>
+        <p:cNvPr id="1" name=""/>
+        <p:cNvGrpSpPr/>
+        <p:nvPr/>
+      </p:nvGrpSpPr>
+      <p:grpSpPr>
+        <a:xfrm>
+          <a:off x="0" y="0"/>
+          <a:ext cx="0" cy="0"/>
+          <a:chOff x="0" y="0"/>
+          <a:chExt cx="0" cy="0"/>
+        </a:xfrm>
+      </p:grpSpPr>
+      <p:sp>
+        <p:nvSpPr>
+          <p:cNvPr id="2" name="Title 1"/>
+          <p:cNvSpPr>
+            <a:spLocks noGrp="1"/>
+          </p:cNvSpPr>
+          <p:nvPr>
+            <p:ph type="title"/>
+          </p:nvPr>
+        </p:nvSpPr>
+        <p:spPr>
+          <a:xfrm>
+            <a:off x="107504" y="404664"/>
+            <a:ext cx="4680520" cy="1152128"/>
+          </a:xfrm>
+        </p:spPr>
+        <p:txBody>
+          <a:bodyPr>
+            <a:normAutofit/>
+          </a:bodyPr>
+          <a:lstStyle/>
+          <a:p>
+            <a:r>
+              <a:rPr lang="en-US" sz="3200" smtClean="0"/>
+              <a:t>Dataset preprocessing</a:t>
+            </a:r>
+            <a:endParaRPr lang="uk-UA" sz="3200"/>
+          </a:p>
+        </p:txBody>
+      </p:sp>
+      <p:sp>
+        <p:nvSpPr>
+          <p:cNvPr id="3" name="Content Placeholder 2"/>
+          <p:cNvSpPr>
+            <a:spLocks noGrp="1"/>
+          </p:cNvSpPr>
+          <p:nvPr>
+            <p:ph idx="1"/>
+          </p:nvPr>
+        </p:nvSpPr>
+        <p:spPr>
+          <a:xfrm>
+            <a:off x="611560" y="1412776"/>
+            <a:ext cx="7920880" cy="4945736"/>
+          </a:xfrm>
+        </p:spPr>
+        <p:txBody>
+          <a:bodyPr/>
+          <a:lstStyle/>
+          <a:p>
+            <a:pPr marL="109728" indent="0" algn="just">
+              <a:buNone/>
+            </a:pPr>
+            <a:r>
+              <a:rPr lang="en-US" smtClean="0">
+                <a:latin typeface="Calibri" panose="020F0502020204030204" pitchFamily="34" charset="0"/>
+                <a:ea typeface="Calibri" panose="020F0502020204030204" pitchFamily="34" charset="0"/>
+                <a:cs typeface="Calibri" panose="020F0502020204030204" pitchFamily="34" charset="0"/>
+              </a:rPr>
+              <a:t>We preprocessed the dataset to resolve its 2 main challenges:</a:t>
+            </a:r>
+          </a:p>
+          <a:p>
+            <a:pPr algn="just"/>
+            <a:r>
+              <a:rPr lang="en-US" smtClean="0">
+                <a:latin typeface="Calibri" panose="020F0502020204030204" pitchFamily="34" charset="0"/>
+                <a:ea typeface="Calibri" panose="020F0502020204030204" pitchFamily="34" charset="0"/>
+                <a:cs typeface="Calibri" panose="020F0502020204030204" pitchFamily="34" charset="0"/>
+              </a:rPr>
+              <a:t>Number of missing records</a:t>
+            </a:r>
+          </a:p>
+          <a:p>
+            <a:pPr algn="just"/>
+            <a:r>
+              <a:rPr lang="en-US" smtClean="0">
+                <a:latin typeface="Calibri" panose="020F0502020204030204" pitchFamily="34" charset="0"/>
+                <a:ea typeface="Calibri" panose="020F0502020204030204" pitchFamily="34" charset="0"/>
+                <a:cs typeface="Calibri" panose="020F0502020204030204" pitchFamily="34" charset="0"/>
+              </a:rPr>
+              <a:t>The dataset length</a:t>
+            </a:r>
+          </a:p>
+          <a:p>
+            <a:pPr marL="109728" indent="0" algn="just">
+              <a:buNone/>
+            </a:pPr>
+            <a:endParaRPr lang="en-US" smtClean="0">
+              <a:latin typeface="Calibri" panose="020F0502020204030204" pitchFamily="34" charset="0"/>
+              <a:ea typeface="Calibri" panose="020F0502020204030204" pitchFamily="34" charset="0"/>
+              <a:cs typeface="Calibri" panose="020F0502020204030204" pitchFamily="34" charset="0"/>
+            </a:endParaRPr>
+          </a:p>
+          <a:p>
+            <a:pPr marL="109728" indent="0" algn="just">
+              <a:buNone/>
+            </a:pPr>
+            <a:r>
+              <a:rPr lang="en-US" smtClean="0">
+                <a:latin typeface="Calibri" panose="020F0502020204030204" pitchFamily="34" charset="0"/>
+                <a:ea typeface="Calibri" panose="020F0502020204030204" pitchFamily="34" charset="0"/>
+                <a:cs typeface="Calibri" panose="020F0502020204030204" pitchFamily="34" charset="0"/>
+              </a:rPr>
+              <a:t>In the initial format, the dataset contained over </a:t>
+            </a:r>
+            <a:r>
+              <a:rPr lang="uk-UA" b="1" smtClean="0">
+                <a:latin typeface="Calibri" panose="020F0502020204030204" pitchFamily="34" charset="0"/>
+                <a:ea typeface="Calibri" panose="020F0502020204030204" pitchFamily="34" charset="0"/>
+                <a:cs typeface="Calibri" panose="020F0502020204030204" pitchFamily="34" charset="0"/>
+              </a:rPr>
+              <a:t>20 </a:t>
+            </a:r>
+            <a:r>
+              <a:rPr lang="en-US" b="1" smtClean="0">
+                <a:latin typeface="Calibri" panose="020F0502020204030204" pitchFamily="34" charset="0"/>
+                <a:ea typeface="Calibri" panose="020F0502020204030204" pitchFamily="34" charset="0"/>
+                <a:cs typeface="Calibri" panose="020F0502020204030204" pitchFamily="34" charset="0"/>
+              </a:rPr>
+              <a:t>million</a:t>
+            </a:r>
+            <a:r>
+              <a:rPr lang="uk-UA" b="1">
+                <a:latin typeface="Calibri" panose="020F0502020204030204" pitchFamily="34" charset="0"/>
+                <a:ea typeface="Calibri" panose="020F0502020204030204" pitchFamily="34" charset="0"/>
+                <a:cs typeface="Calibri" panose="020F0502020204030204" pitchFamily="34" charset="0"/>
+              </a:rPr>
+              <a:t> </a:t>
+            </a:r>
+            <a:r>
+              <a:rPr lang="en-US" b="1" smtClean="0">
+                <a:latin typeface="Calibri" panose="020F0502020204030204" pitchFamily="34" charset="0"/>
+                <a:ea typeface="Calibri" panose="020F0502020204030204" pitchFamily="34" charset="0"/>
+                <a:cs typeface="Calibri" panose="020F0502020204030204" pitchFamily="34" charset="0"/>
+              </a:rPr>
+              <a:t>records, </a:t>
+            </a:r>
+            <a:r>
+              <a:rPr lang="en-US" smtClean="0">
+                <a:latin typeface="Calibri" panose="020F0502020204030204" pitchFamily="34" charset="0"/>
+                <a:ea typeface="Calibri" panose="020F0502020204030204" pitchFamily="34" charset="0"/>
+                <a:cs typeface="Calibri" panose="020F0502020204030204" pitchFamily="34" charset="0"/>
+              </a:rPr>
+              <a:t>which was infeasible for the most models to handle, given the computational recourses we had available (and considering that we had to fit each model 24 times for Task #1).</a:t>
+            </a:r>
+            <a:endParaRPr lang="en-US" b="1" smtClean="0">
+              <a:latin typeface="Calibri" panose="020F0502020204030204" pitchFamily="34" charset="0"/>
+              <a:ea typeface="Calibri" panose="020F0502020204030204" pitchFamily="34" charset="0"/>
+              <a:cs typeface="Calibri" panose="020F0502020204030204" pitchFamily="34" charset="0"/>
+            </a:endParaRPr>
+          </a:p>
+          <a:p>
+            <a:pPr marL="109728" indent="0" algn="just">
+              <a:buNone/>
+            </a:pPr>
+            <a:endParaRPr lang="uk-UA">
+              <a:latin typeface="Calibri" panose="020F0502020204030204" pitchFamily="34" charset="0"/>
+              <a:ea typeface="Calibri" panose="020F0502020204030204" pitchFamily="34" charset="0"/>
+              <a:cs typeface="Calibri" panose="020F0502020204030204" pitchFamily="34" charset="0"/>
+            </a:endParaRPr>
+          </a:p>
+        </p:txBody>
+      </p:sp>
+    </p:spTree>
+    <p:extLst>
+      <p:ext uri="{BB962C8B-B14F-4D97-AF65-F5344CB8AC3E}">
+        <p14:creationId xmlns:p14="http://schemas.microsoft.com/office/powerpoint/2010/main" val="2928596012"/>
+      </p:ext>
+    </p:extLst>
+  </p:cSld>
+  <p:clrMapOvr>
+    <a:masterClrMapping/>
+  </p:clrMapOvr>
+</p:sld>
+</file>
+
+<file path=ppt/slides/slide7.xml><?xml version="1.0" encoding="utf-8"?>
+<p:sld xmlns:a="http://schemas.openxmlformats.org/drawingml/2006/main" xmlns:r="http://schemas.openxmlformats.org/officeDocument/2006/relationships" xmlns:p="http://schemas.openxmlformats.org/presentationml/2006/main">
+  <p:cSld>
+    <p:spTree>
+      <p:nvGrpSpPr>
+        <p:cNvPr id="1" name=""/>
+        <p:cNvGrpSpPr/>
+        <p:nvPr/>
+      </p:nvGrpSpPr>
+      <p:grpSpPr>
+        <a:xfrm>
+          <a:off x="0" y="0"/>
+          <a:ext cx="0" cy="0"/>
+          <a:chOff x="0" y="0"/>
+          <a:chExt cx="0" cy="0"/>
+        </a:xfrm>
+      </p:grpSpPr>
+      <p:sp>
+        <p:nvSpPr>
+          <p:cNvPr id="2" name="Title 1"/>
+          <p:cNvSpPr>
+            <a:spLocks noGrp="1"/>
+          </p:cNvSpPr>
+          <p:nvPr>
+            <p:ph type="title"/>
+          </p:nvPr>
+        </p:nvSpPr>
+        <p:spPr>
+          <a:xfrm>
+            <a:off x="107504" y="332656"/>
+            <a:ext cx="8229600" cy="936104"/>
+          </a:xfrm>
+        </p:spPr>
+        <p:txBody>
+          <a:bodyPr/>
+          <a:lstStyle/>
+          <a:p>
+            <a:r>
+              <a:rPr lang="en-US" smtClean="0"/>
+              <a:t>Missing records</a:t>
+            </a:r>
+            <a:endParaRPr lang="uk-UA"/>
+          </a:p>
+        </p:txBody>
+      </p:sp>
+      <p:pic>
+        <p:nvPicPr>
+          <p:cNvPr id="2050" name="Picture 2" descr="https://www.kaggleusercontent.com/kf/160280310/eyJhbGciOiJkaXIiLCJlbmMiOiJBMTI4Q0JDLUhTMjU2In0..W3mp4h9kbrbf0gY-gZT5hw.4wA0jLKhggPTc2Qg7dms4uxu7Kv9V_iTv7BF6amzyMMoWcSGKnSfUT7-szJcjIw-tCTxyHuvnCg7BvYMEu091_Jd4P9mEV2un_spLpO1w39O5CcYB4W9XYcbtsh5-ckbQA6oDGTdHIMrIfA-myZ77E0vqPHn3fAeIhjtmHDxsHPi3Jm_3LF7lswpaytqaN4r6Ecfg3Jz5BKarp1tvsN3tTO7helvbVh81a3-hk_adDvK-ldMAjcLsnxIFSdelSdk0HWjaCQsxsratwt9nDfju0x7_fJuFSYnyI9aMc2CcO_iSY4CBpxljnFueSpkqwRflNi20vBkDS3Y-kLSqig3RxfPELYDKbMgxAllet_V-1_gLjmQ0WP3pOrndoBtwh5m46JWZ5jsTH70RRHjaolrqD1PtHCX1SFX_ECfk7L9k9w0vZsUM0bD3Ta9wdbEYvWu6R93AGZ5z7VPzJLREsTxbmENdTDVVNXm2n6Q_sPTGk0CGkU8sURvio2ylmjNF2oUNo53A0xC3XcaGrrlnhCw_93cGR55mlWOK0SNOpjOdb6h5M-MdELjB1dA7gwOAc7T0aDMi5ya1KI8SxNJ8tnpuMebd5O4gYDBn0__QSYY1YtkFDbUx1xoLwSN4dibWXU6QjCd66ujodZ5RsOQL-YHnA.YqAomD8bh5ULvYQFQkHSrg/__results___files/__results___27_0.png"/>
+          <p:cNvPicPr>
+            <a:picLocks noChangeAspect="1" noChangeArrowheads="1"/>
+          </p:cNvPicPr>
+          <p:nvPr/>
+        </p:nvPicPr>
+        <p:blipFill>
+          <a:blip r:embed="rId2" cstate="print">
+            <a:extLst>
+              <a:ext uri="{28A0092B-C50C-407E-A947-70E740481C1C}">
+                <a14:useLocalDpi xmlns:a14="http://schemas.microsoft.com/office/drawing/2010/main" val="0"/>
+              </a:ext>
+            </a:extLst>
+          </a:blip>
+          <a:srcRect/>
+          <a:stretch>
+            <a:fillRect/>
+          </a:stretch>
+        </p:blipFill>
+        <p:spPr bwMode="auto">
+          <a:xfrm>
+            <a:off x="5025087" y="645840"/>
+            <a:ext cx="4118913" cy="6113334"/>
+          </a:xfrm>
+          <a:prstGeom prst="rect">
+            <a:avLst/>
+          </a:prstGeom>
+          <a:noFill/>
+          <a:extLst>
+            <a:ext uri="{909E8E84-426E-40DD-AFC4-6F175D3DCCD1}">
+              <a14:hiddenFill xmlns:a14="http://schemas.microsoft.com/office/drawing/2010/main">
+                <a:solidFill>
+                  <a:srgbClr val="FFFFFF"/>
+                </a:solidFill>
+              </a14:hiddenFill>
+            </a:ext>
+          </a:extLst>
+        </p:spPr>
+      </p:pic>
+      <p:sp>
+        <p:nvSpPr>
+          <p:cNvPr id="5" name="Content Placeholder 2"/>
+          <p:cNvSpPr>
+            <a:spLocks noGrp="1"/>
+          </p:cNvSpPr>
+          <p:nvPr>
+            <p:ph idx="1"/>
+          </p:nvPr>
+        </p:nvSpPr>
+        <p:spPr>
+          <a:xfrm>
+            <a:off x="107504" y="1268760"/>
+            <a:ext cx="4873174" cy="5472608"/>
+          </a:xfrm>
+        </p:spPr>
+        <p:txBody>
+          <a:bodyPr>
+            <a:normAutofit fontScale="92500" lnSpcReduction="10000"/>
+          </a:bodyPr>
+          <a:lstStyle/>
+          <a:p>
+            <a:pPr marL="109728" indent="0" algn="just">
+              <a:buNone/>
+            </a:pPr>
+            <a:r>
+              <a:rPr lang="en-US" smtClean="0">
+                <a:latin typeface="Calibri" panose="020F0502020204030204" pitchFamily="34" charset="0"/>
+                <a:ea typeface="Calibri" panose="020F0502020204030204" pitchFamily="34" charset="0"/>
+                <a:cs typeface="Calibri" panose="020F0502020204030204" pitchFamily="34" charset="0"/>
+              </a:rPr>
+              <a:t>On the right you can see a heatmap of time vs. presence of records for each building.</a:t>
+            </a:r>
+          </a:p>
+          <a:p>
+            <a:pPr marL="109728" indent="0" algn="just">
+              <a:buNone/>
+            </a:pPr>
+            <a:endParaRPr lang="en-US" smtClean="0">
+              <a:latin typeface="Calibri" panose="020F0502020204030204" pitchFamily="34" charset="0"/>
+              <a:ea typeface="Calibri" panose="020F0502020204030204" pitchFamily="34" charset="0"/>
+              <a:cs typeface="Calibri" panose="020F0502020204030204" pitchFamily="34" charset="0"/>
+            </a:endParaRPr>
+          </a:p>
+          <a:p>
+            <a:pPr marL="109728" indent="0">
+              <a:buNone/>
+            </a:pPr>
+            <a:r>
+              <a:rPr lang="en-US" b="1">
+                <a:latin typeface="Calibri" panose="020F0502020204030204" pitchFamily="34" charset="0"/>
+                <a:ea typeface="Calibri" panose="020F0502020204030204" pitchFamily="34" charset="0"/>
+                <a:cs typeface="Calibri" panose="020F0502020204030204" pitchFamily="34" charset="0"/>
+              </a:rPr>
+              <a:t>Legend:</a:t>
+            </a:r>
+            <a:endParaRPr lang="en-US">
+              <a:latin typeface="Calibri" panose="020F0502020204030204" pitchFamily="34" charset="0"/>
+              <a:ea typeface="Calibri" panose="020F0502020204030204" pitchFamily="34" charset="0"/>
+              <a:cs typeface="Calibri" panose="020F0502020204030204" pitchFamily="34" charset="0"/>
+            </a:endParaRPr>
+          </a:p>
+          <a:p>
+            <a:r>
+              <a:rPr lang="en-US">
+                <a:latin typeface="Calibri" panose="020F0502020204030204" pitchFamily="34" charset="0"/>
+                <a:ea typeface="Calibri" panose="020F0502020204030204" pitchFamily="34" charset="0"/>
+                <a:cs typeface="Calibri" panose="020F0502020204030204" pitchFamily="34" charset="0"/>
+              </a:rPr>
+              <a:t>X axis: hours elapsed since </a:t>
+            </a:r>
+            <a:r>
+              <a:rPr lang="en-US" smtClean="0">
+                <a:latin typeface="Calibri" panose="020F0502020204030204" pitchFamily="34" charset="0"/>
+                <a:ea typeface="Calibri" panose="020F0502020204030204" pitchFamily="34" charset="0"/>
+                <a:cs typeface="Calibri" panose="020F0502020204030204" pitchFamily="34" charset="0"/>
+              </a:rPr>
+              <a:t>the beginning of the dataset</a:t>
+            </a:r>
+            <a:endParaRPr lang="en-US">
+              <a:latin typeface="Calibri" panose="020F0502020204030204" pitchFamily="34" charset="0"/>
+              <a:ea typeface="Calibri" panose="020F0502020204030204" pitchFamily="34" charset="0"/>
+              <a:cs typeface="Calibri" panose="020F0502020204030204" pitchFamily="34" charset="0"/>
+            </a:endParaRPr>
+          </a:p>
+          <a:p>
+            <a:r>
+              <a:rPr lang="en-US">
+                <a:latin typeface="Calibri" panose="020F0502020204030204" pitchFamily="34" charset="0"/>
+                <a:ea typeface="Calibri" panose="020F0502020204030204" pitchFamily="34" charset="0"/>
+                <a:cs typeface="Calibri" panose="020F0502020204030204" pitchFamily="34" charset="0"/>
+              </a:rPr>
+              <a:t>Y axis: </a:t>
+            </a:r>
+            <a:r>
+              <a:rPr lang="en-US" smtClean="0">
+                <a:latin typeface="Calibri" panose="020F0502020204030204" pitchFamily="34" charset="0"/>
+                <a:ea typeface="Calibri" panose="020F0502020204030204" pitchFamily="34" charset="0"/>
+                <a:cs typeface="Calibri" panose="020F0502020204030204" pitchFamily="34" charset="0"/>
+              </a:rPr>
+              <a:t>building_id</a:t>
+            </a:r>
+          </a:p>
+          <a:p>
+            <a:endParaRPr lang="en-US">
+              <a:latin typeface="Calibri" panose="020F0502020204030204" pitchFamily="34" charset="0"/>
+              <a:ea typeface="Calibri" panose="020F0502020204030204" pitchFamily="34" charset="0"/>
+              <a:cs typeface="Calibri" panose="020F0502020204030204" pitchFamily="34" charset="0"/>
+            </a:endParaRPr>
+          </a:p>
+          <a:p>
+            <a:r>
+              <a:rPr lang="en-US">
+                <a:latin typeface="Calibri" panose="020F0502020204030204" pitchFamily="34" charset="0"/>
+                <a:ea typeface="Calibri" panose="020F0502020204030204" pitchFamily="34" charset="0"/>
+                <a:cs typeface="Calibri" panose="020F0502020204030204" pitchFamily="34" charset="0"/>
+              </a:rPr>
+              <a:t>Brown: meter reading available with non-zero value</a:t>
+            </a:r>
+          </a:p>
+          <a:p>
+            <a:r>
+              <a:rPr lang="en-US">
+                <a:latin typeface="Calibri" panose="020F0502020204030204" pitchFamily="34" charset="0"/>
+                <a:ea typeface="Calibri" panose="020F0502020204030204" pitchFamily="34" charset="0"/>
+                <a:cs typeface="Calibri" panose="020F0502020204030204" pitchFamily="34" charset="0"/>
+              </a:rPr>
+              <a:t>Light blue: meter reading available with zero value</a:t>
+            </a:r>
+          </a:p>
+          <a:p>
+            <a:r>
+              <a:rPr lang="en-US">
+                <a:latin typeface="Calibri" panose="020F0502020204030204" pitchFamily="34" charset="0"/>
+                <a:ea typeface="Calibri" panose="020F0502020204030204" pitchFamily="34" charset="0"/>
+                <a:cs typeface="Calibri" panose="020F0502020204030204" pitchFamily="34" charset="0"/>
+              </a:rPr>
+              <a:t>White: missing meter reading</a:t>
+            </a:r>
+          </a:p>
+          <a:p>
+            <a:pPr marL="109728" indent="0" algn="just">
+              <a:buNone/>
+            </a:pPr>
+            <a:endParaRPr lang="uk-UA">
+              <a:latin typeface="Calibri" panose="020F0502020204030204" pitchFamily="34" charset="0"/>
+              <a:ea typeface="Calibri" panose="020F0502020204030204" pitchFamily="34" charset="0"/>
+              <a:cs typeface="Calibri" panose="020F0502020204030204" pitchFamily="34" charset="0"/>
+            </a:endParaRPr>
+          </a:p>
+        </p:txBody>
+      </p:sp>
+    </p:spTree>
+    <p:extLst>
+      <p:ext uri="{BB962C8B-B14F-4D97-AF65-F5344CB8AC3E}">
+        <p14:creationId xmlns:p14="http://schemas.microsoft.com/office/powerpoint/2010/main" val="4191721180"/>
+      </p:ext>
+    </p:extLst>
+  </p:cSld>
+  <p:clrMapOvr>
+    <a:masterClrMapping/>
+  </p:clrMapOvr>
+</p:sld>
+</file>
+
+<file path=ppt/slides/slide8.xml><?xml version="1.0" encoding="utf-8"?>
+<p:sld xmlns:a="http://schemas.openxmlformats.org/drawingml/2006/main" xmlns:r="http://schemas.openxmlformats.org/officeDocument/2006/relationships" xmlns:p="http://schemas.openxmlformats.org/presentationml/2006/main">
+  <p:cSld>
+    <p:spTree>
+      <p:nvGrpSpPr>
+        <p:cNvPr id="1" name=""/>
+        <p:cNvGrpSpPr/>
+        <p:nvPr/>
+      </p:nvGrpSpPr>
+      <p:grpSpPr>
+        <a:xfrm>
+          <a:off x="0" y="0"/>
+          <a:ext cx="0" cy="0"/>
+          <a:chOff x="0" y="0"/>
+          <a:chExt cx="0" cy="0"/>
+        </a:xfrm>
+      </p:grpSpPr>
+      <p:sp>
+        <p:nvSpPr>
+          <p:cNvPr id="2" name="Title 1"/>
+          <p:cNvSpPr>
+            <a:spLocks noGrp="1"/>
+          </p:cNvSpPr>
+          <p:nvPr>
+            <p:ph type="title"/>
+          </p:nvPr>
+        </p:nvSpPr>
+        <p:spPr>
+          <a:xfrm>
+            <a:off x="457200" y="332656"/>
+            <a:ext cx="8229600" cy="1440160"/>
+          </a:xfrm>
+        </p:spPr>
+        <p:txBody>
+          <a:bodyPr/>
+          <a:lstStyle/>
+          <a:p>
+            <a:r>
+              <a:rPr lang="en-US" smtClean="0"/>
+              <a:t>Main preprocessing steps</a:t>
+            </a:r>
+            <a:endParaRPr lang="uk-UA"/>
+          </a:p>
+        </p:txBody>
+      </p:sp>
+      <p:sp>
+        <p:nvSpPr>
+          <p:cNvPr id="3" name="Content Placeholder 2"/>
+          <p:cNvSpPr>
+            <a:spLocks noGrp="1"/>
+          </p:cNvSpPr>
+          <p:nvPr>
+            <p:ph idx="1"/>
+          </p:nvPr>
+        </p:nvSpPr>
+        <p:spPr>
+          <a:xfrm>
+            <a:off x="0" y="1628800"/>
+            <a:ext cx="9036496" cy="5229200"/>
+          </a:xfrm>
+        </p:spPr>
+        <p:txBody>
+          <a:bodyPr>
+            <a:normAutofit fontScale="92500" lnSpcReduction="20000"/>
+          </a:bodyPr>
+          <a:lstStyle/>
+          <a:p>
+            <a:pPr marL="624078" indent="-514350" algn="just">
+              <a:buFont typeface="+mj-lt"/>
+              <a:buAutoNum type="arabicPeriod"/>
+            </a:pPr>
+            <a:r>
+              <a:rPr lang="en-US" smtClean="0">
+                <a:latin typeface="Calibri" panose="020F0502020204030204" pitchFamily="34" charset="0"/>
+                <a:ea typeface="Calibri" panose="020F0502020204030204" pitchFamily="34" charset="0"/>
+                <a:cs typeface="Calibri" panose="020F0502020204030204" pitchFamily="34" charset="0"/>
+              </a:rPr>
+              <a:t>Include records only for the electricity meter (which contains the most data).</a:t>
+            </a:r>
+          </a:p>
+          <a:p>
+            <a:pPr marL="624078" indent="-514350" algn="just">
+              <a:buFont typeface="+mj-lt"/>
+              <a:buAutoNum type="arabicPeriod"/>
+            </a:pPr>
+            <a:r>
+              <a:rPr lang="en-US" smtClean="0">
+                <a:latin typeface="Calibri" panose="020F0502020204030204" pitchFamily="34" charset="0"/>
+                <a:ea typeface="Calibri" panose="020F0502020204030204" pitchFamily="34" charset="0"/>
+                <a:cs typeface="Calibri" panose="020F0502020204030204" pitchFamily="34" charset="0"/>
+              </a:rPr>
+              <a:t>Resample the dataset to 1-hour frequency:</a:t>
+            </a:r>
+          </a:p>
+          <a:p>
+            <a:pPr marL="916686" lvl="1" indent="-514350" algn="just">
+              <a:buFont typeface="+mj-lt"/>
+              <a:buAutoNum type="arabicPeriod"/>
+            </a:pPr>
+            <a:r>
+              <a:rPr lang="en-US" smtClean="0">
+                <a:latin typeface="Calibri" panose="020F0502020204030204" pitchFamily="34" charset="0"/>
+                <a:ea typeface="Calibri" panose="020F0502020204030204" pitchFamily="34" charset="0"/>
+                <a:cs typeface="Calibri" panose="020F0502020204030204" pitchFamily="34" charset="0"/>
+              </a:rPr>
+              <a:t>Some buildings contained too little data to apply resampling, so we discard them first.</a:t>
+            </a:r>
+          </a:p>
+          <a:p>
+            <a:pPr marL="916686" lvl="1" indent="-514350" algn="just">
+              <a:buFont typeface="+mj-lt"/>
+              <a:buAutoNum type="arabicPeriod"/>
+            </a:pPr>
+            <a:r>
+              <a:rPr lang="en-US" smtClean="0">
+                <a:latin typeface="Calibri" panose="020F0502020204030204" pitchFamily="34" charset="0"/>
+                <a:ea typeface="Calibri" panose="020F0502020204030204" pitchFamily="34" charset="0"/>
+                <a:cs typeface="Calibri" panose="020F0502020204030204" pitchFamily="34" charset="0"/>
+              </a:rPr>
+              <a:t>Resample the records for the remaining buildings using linear interpolation.</a:t>
+            </a:r>
+          </a:p>
+          <a:p>
+            <a:pPr marL="624078" indent="-514350" algn="just">
+              <a:buFont typeface="+mj-lt"/>
+              <a:buAutoNum type="arabicPeriod"/>
+            </a:pPr>
+            <a:r>
+              <a:rPr lang="en-US" smtClean="0">
+                <a:latin typeface="Calibri" panose="020F0502020204030204" pitchFamily="34" charset="0"/>
+                <a:ea typeface="Calibri" panose="020F0502020204030204" pitchFamily="34" charset="0"/>
+                <a:cs typeface="Calibri" panose="020F0502020204030204" pitchFamily="34" charset="0"/>
+              </a:rPr>
+              <a:t>Select a random subsample of the remaining buildings.</a:t>
+            </a:r>
+            <a:endParaRPr lang="uk-UA" smtClean="0">
+              <a:latin typeface="Calibri" panose="020F0502020204030204" pitchFamily="34" charset="0"/>
+              <a:ea typeface="Calibri" panose="020F0502020204030204" pitchFamily="34" charset="0"/>
+              <a:cs typeface="Calibri" panose="020F0502020204030204" pitchFamily="34" charset="0"/>
+            </a:endParaRPr>
+          </a:p>
+          <a:p>
+            <a:pPr marL="624078" indent="-514350" algn="just">
+              <a:buFont typeface="+mj-lt"/>
+              <a:buAutoNum type="arabicPeriod"/>
+            </a:pPr>
+            <a:r>
+              <a:rPr lang="en-US" smtClean="0">
+                <a:latin typeface="Calibri" panose="020F0502020204030204" pitchFamily="34" charset="0"/>
+                <a:ea typeface="Calibri" panose="020F0502020204030204" pitchFamily="34" charset="0"/>
+                <a:cs typeface="Calibri" panose="020F0502020204030204" pitchFamily="34" charset="0"/>
+              </a:rPr>
+              <a:t>Clean NaNs: impute the missing values with the corresponding median values.</a:t>
+            </a:r>
+          </a:p>
+          <a:p>
+            <a:pPr marL="624078" indent="-514350" algn="just">
+              <a:buFont typeface="+mj-lt"/>
+              <a:buAutoNum type="arabicPeriod"/>
+            </a:pPr>
+            <a:r>
+              <a:rPr lang="en-US" smtClean="0">
+                <a:latin typeface="Calibri" panose="020F0502020204030204" pitchFamily="34" charset="0"/>
+                <a:ea typeface="Calibri" panose="020F0502020204030204" pitchFamily="34" charset="0"/>
+                <a:cs typeface="Calibri" panose="020F0502020204030204" pitchFamily="34" charset="0"/>
+              </a:rPr>
+              <a:t>Add some time-related features, such as hour of the day etc.</a:t>
+            </a:r>
+          </a:p>
+          <a:p>
+            <a:pPr marL="624078" indent="-514350" algn="just">
+              <a:buFont typeface="+mj-lt"/>
+              <a:buAutoNum type="arabicPeriod"/>
+            </a:pPr>
+            <a:r>
+              <a:rPr lang="en-US" smtClean="0">
+                <a:latin typeface="Calibri" panose="020F0502020204030204" pitchFamily="34" charset="0"/>
+                <a:ea typeface="Calibri" panose="020F0502020204030204" pitchFamily="34" charset="0"/>
+                <a:cs typeface="Calibri" panose="020F0502020204030204" pitchFamily="34" charset="0"/>
+              </a:rPr>
+              <a:t>Split the dataset into the training (75%) and testing (25%) sets based on the time period: May, August and November went to the testing set, and everything else was left for the training.</a:t>
+            </a:r>
+            <a:endParaRPr lang="uk-UA">
+              <a:latin typeface="Calibri" panose="020F0502020204030204" pitchFamily="34" charset="0"/>
+              <a:ea typeface="Calibri" panose="020F0502020204030204" pitchFamily="34" charset="0"/>
+              <a:cs typeface="Calibri" panose="020F0502020204030204" pitchFamily="34" charset="0"/>
+            </a:endParaRPr>
+          </a:p>
+        </p:txBody>
+      </p:sp>
+    </p:spTree>
+    <p:extLst>
+      <p:ext uri="{BB962C8B-B14F-4D97-AF65-F5344CB8AC3E}">
+        <p14:creationId xmlns:p14="http://schemas.microsoft.com/office/powerpoint/2010/main" val="2802193409"/>
+      </p:ext>
+    </p:extLst>
+  </p:cSld>
+  <p:clrMapOvr>
+    <a:masterClrMapping/>
+  </p:clrMapOvr>
+</p:sld>
+</file>
+
+<file path=ppt/slides/slide9.xml><?xml version="1.0" encoding="utf-8"?>
+<p:sld xmlns:a="http://schemas.openxmlformats.org/drawingml/2006/main" xmlns:r="http://schemas.openxmlformats.org/officeDocument/2006/relationships" xmlns:p="http://schemas.openxmlformats.org/presentationml/2006/main">
+  <p:cSld>
+    <p:spTree>
+      <p:nvGrpSpPr>
+        <p:cNvPr id="1" name=""/>
+        <p:cNvGrpSpPr/>
+        <p:nvPr/>
+      </p:nvGrpSpPr>
+      <p:grpSpPr>
+        <a:xfrm>
+          <a:off x="0" y="0"/>
+          <a:ext cx="0" cy="0"/>
+          <a:chOff x="0" y="0"/>
+          <a:chExt cx="0" cy="0"/>
+        </a:xfrm>
+      </p:grpSpPr>
+      <p:sp>
+        <p:nvSpPr>
+          <p:cNvPr id="2" name="Title 1"/>
+          <p:cNvSpPr>
+            <a:spLocks noGrp="1"/>
+          </p:cNvSpPr>
+          <p:nvPr>
+            <p:ph type="title"/>
+          </p:nvPr>
+        </p:nvSpPr>
+        <p:spPr>
+          <a:xfrm>
+            <a:off x="457200" y="404664"/>
+            <a:ext cx="8229600" cy="1512168"/>
+          </a:xfrm>
+        </p:spPr>
+        <p:txBody>
+          <a:bodyPr>
+            <a:normAutofit/>
+          </a:bodyPr>
+          <a:lstStyle/>
+          <a:p>
+            <a:r>
+              <a:rPr lang="en-US"/>
+              <a:t>Lag matrix &amp; </a:t>
+            </a:r>
+            <a:r>
+              <a:rPr lang="en-US"/>
+              <a:t>Forecast </a:t>
+            </a:r>
+            <a:r>
+              <a:rPr lang="en-US" smtClean="0"/>
+              <a:t>matrix</a:t>
+            </a:r>
+            <a:endParaRPr lang="uk-UA"/>
+          </a:p>
+        </p:txBody>
+      </p:sp>
+      <p:pic>
+        <p:nvPicPr>
+          <p:cNvPr id="1027" name="Picture 3"/>
+          <p:cNvPicPr>
+            <a:picLocks noChangeAspect="1" noChangeArrowheads="1"/>
+          </p:cNvPicPr>
+          <p:nvPr/>
+        </p:nvPicPr>
+        <p:blipFill>
+          <a:blip r:embed="rId2">
+            <a:extLst>
+              <a:ext uri="{28A0092B-C50C-407E-A947-70E740481C1C}">
+                <a14:useLocalDpi xmlns:a14="http://schemas.microsoft.com/office/drawing/2010/main" val="0"/>
+              </a:ext>
+            </a:extLst>
+          </a:blip>
+          <a:srcRect/>
+          <a:stretch>
+            <a:fillRect/>
+          </a:stretch>
+        </p:blipFill>
+        <p:spPr bwMode="auto">
+          <a:xfrm>
+            <a:off x="395536" y="1694252"/>
+            <a:ext cx="7620000" cy="2911475"/>
+          </a:xfrm>
+          <a:prstGeom prst="rect">
+            <a:avLst/>
+          </a:prstGeom>
+          <a:noFill/>
+          <a:ln>
+            <a:noFill/>
+          </a:ln>
+          <a:effectLst/>
+          <a:extLst>
+            <a:ext uri="{909E8E84-426E-40DD-AFC4-6F175D3DCCD1}">
+              <a14:hiddenFill xmlns:a14="http://schemas.microsoft.com/office/drawing/2010/main">
+                <a:solidFill>
+                  <a:schemeClr val="accent1"/>
+                </a:solidFill>
+              </a14:hiddenFill>
+            </a:ext>
+            <a:ext uri="{91240B29-F687-4F45-9708-019B960494DF}">
+              <a14:hiddenLine xmlns:a14="http://schemas.microsoft.com/office/drawing/2010/main" w="9525">
+                <a:solidFill>
+                  <a:schemeClr val="tx1"/>
+                </a:solidFill>
+                <a:miter lim="800000"/>
+                <a:headEnd/>
+                <a:tailEnd/>
+              </a14:hiddenLine>
+            </a:ext>
+            <a:ext uri="{AF507438-7753-43E0-B8FC-AC1667EBCBE1}">
+              <a14:hiddenEffects xmlns:a14="http://schemas.microsoft.com/office/drawing/2010/main">
+                <a:effectLst>
+                  <a:outerShdw dist="35921" dir="2700000" algn="ctr" rotWithShape="0">
+                    <a:schemeClr val="bg2"/>
+                  </a:outerShdw>
+                </a:effectLst>
+              </a14:hiddenEffects>
+            </a:ext>
+          </a:extLst>
+        </p:spPr>
+      </p:pic>
+    </p:spTree>
+    <p:extLst>
+      <p:ext uri="{BB962C8B-B14F-4D97-AF65-F5344CB8AC3E}">
+        <p14:creationId xmlns:p14="http://schemas.microsoft.com/office/powerpoint/2010/main" val="4068624009"/>
       </p:ext>
     </p:extLst>
   </p:cSld>

</xml_diff>